<commit_message>
Cambios documentacion y modelos BD
</commit_message>
<xml_diff>
--- a/PROYECTO FORMATIVO.pptx
+++ b/PROYECTO FORMATIVO.pptx
@@ -5,7 +5,7 @@
     <p:sldMasterId id="2147483648" r:id="rId1"/>
   </p:sldMasterIdLst>
   <p:notesMasterIdLst>
-    <p:notesMasterId r:id="rId31"/>
+    <p:notesMasterId r:id="rId32"/>
   </p:notesMasterIdLst>
   <p:sldIdLst>
     <p:sldId id="468" r:id="rId2"/>
@@ -34,9 +34,10 @@
     <p:sldId id="288" r:id="rId25"/>
     <p:sldId id="289" r:id="rId26"/>
     <p:sldId id="277" r:id="rId27"/>
-    <p:sldId id="274" r:id="rId28"/>
-    <p:sldId id="278" r:id="rId29"/>
-    <p:sldId id="264" r:id="rId30"/>
+    <p:sldId id="470" r:id="rId28"/>
+    <p:sldId id="274" r:id="rId29"/>
+    <p:sldId id="278" r:id="rId30"/>
+    <p:sldId id="264" r:id="rId31"/>
   </p:sldIdLst>
   <p:sldSz cx="12192000" cy="6858000"/>
   <p:notesSz cx="6858000" cy="9144000"/>
@@ -225,7 +226,7 @@
           <a:p>
             <a:fld id="{9660CB96-A603-FF42-AE46-F5F75F80A67B}" type="datetimeFigureOut">
               <a:rPr lang="es-CO" smtClean="0"/>
-              <a:t>17/09/2022</a:t>
+              <a:t>20/09/2022</a:t>
             </a:fld>
             <a:endParaRPr lang="es-CO"/>
           </a:p>
@@ -810,7 +811,7 @@
           <a:p>
             <a:fld id="{AB98DA6D-12AC-4BA1-8782-249E1E9419F8}" type="slidenum">
               <a:rPr lang="es-CO" smtClean="0"/>
-              <a:t>27</a:t>
+              <a:t>28</a:t>
             </a:fld>
             <a:endParaRPr lang="es-CO"/>
           </a:p>
@@ -978,7 +979,7 @@
           <a:p>
             <a:fld id="{BD986248-06F7-A441-A47A-264EBD310E11}" type="datetimeFigureOut">
               <a:rPr lang="es-CO" smtClean="0"/>
-              <a:t>17/09/2022</a:t>
+              <a:t>20/09/2022</a:t>
             </a:fld>
             <a:endParaRPr lang="es-CO"/>
           </a:p>
@@ -1178,7 +1179,7 @@
           <a:p>
             <a:fld id="{BD986248-06F7-A441-A47A-264EBD310E11}" type="datetimeFigureOut">
               <a:rPr lang="es-CO" smtClean="0"/>
-              <a:t>17/09/2022</a:t>
+              <a:t>20/09/2022</a:t>
             </a:fld>
             <a:endParaRPr lang="es-CO"/>
           </a:p>
@@ -1388,7 +1389,7 @@
           <a:p>
             <a:fld id="{BD986248-06F7-A441-A47A-264EBD310E11}" type="datetimeFigureOut">
               <a:rPr lang="es-CO" smtClean="0"/>
-              <a:t>17/09/2022</a:t>
+              <a:t>20/09/2022</a:t>
             </a:fld>
             <a:endParaRPr lang="es-CO"/>
           </a:p>
@@ -1996,7 +1997,7 @@
           <a:p>
             <a:fld id="{BD986248-06F7-A441-A47A-264EBD310E11}" type="datetimeFigureOut">
               <a:rPr lang="es-CO" smtClean="0"/>
-              <a:t>17/09/2022</a:t>
+              <a:t>20/09/2022</a:t>
             </a:fld>
             <a:endParaRPr lang="es-CO"/>
           </a:p>
@@ -2272,7 +2273,7 @@
           <a:p>
             <a:fld id="{BD986248-06F7-A441-A47A-264EBD310E11}" type="datetimeFigureOut">
               <a:rPr lang="es-CO" smtClean="0"/>
-              <a:t>17/09/2022</a:t>
+              <a:t>20/09/2022</a:t>
             </a:fld>
             <a:endParaRPr lang="es-CO"/>
           </a:p>
@@ -2540,7 +2541,7 @@
           <a:p>
             <a:fld id="{BD986248-06F7-A441-A47A-264EBD310E11}" type="datetimeFigureOut">
               <a:rPr lang="es-CO" smtClean="0"/>
-              <a:t>17/09/2022</a:t>
+              <a:t>20/09/2022</a:t>
             </a:fld>
             <a:endParaRPr lang="es-CO"/>
           </a:p>
@@ -2955,7 +2956,7 @@
           <a:p>
             <a:fld id="{BD986248-06F7-A441-A47A-264EBD310E11}" type="datetimeFigureOut">
               <a:rPr lang="es-CO" smtClean="0"/>
-              <a:t>17/09/2022</a:t>
+              <a:t>20/09/2022</a:t>
             </a:fld>
             <a:endParaRPr lang="es-CO"/>
           </a:p>
@@ -3097,7 +3098,7 @@
           <a:p>
             <a:fld id="{BD986248-06F7-A441-A47A-264EBD310E11}" type="datetimeFigureOut">
               <a:rPr lang="es-CO" smtClean="0"/>
-              <a:t>17/09/2022</a:t>
+              <a:t>20/09/2022</a:t>
             </a:fld>
             <a:endParaRPr lang="es-CO"/>
           </a:p>
@@ -3210,7 +3211,7 @@
           <a:p>
             <a:fld id="{BD986248-06F7-A441-A47A-264EBD310E11}" type="datetimeFigureOut">
               <a:rPr lang="es-CO" smtClean="0"/>
-              <a:t>17/09/2022</a:t>
+              <a:t>20/09/2022</a:t>
             </a:fld>
             <a:endParaRPr lang="es-CO"/>
           </a:p>
@@ -3523,7 +3524,7 @@
           <a:p>
             <a:fld id="{BD986248-06F7-A441-A47A-264EBD310E11}" type="datetimeFigureOut">
               <a:rPr lang="es-CO" smtClean="0"/>
-              <a:t>17/09/2022</a:t>
+              <a:t>20/09/2022</a:t>
             </a:fld>
             <a:endParaRPr lang="es-CO"/>
           </a:p>
@@ -3812,7 +3813,7 @@
           <a:p>
             <a:fld id="{BD986248-06F7-A441-A47A-264EBD310E11}" type="datetimeFigureOut">
               <a:rPr lang="es-CO" smtClean="0"/>
-              <a:t>17/09/2022</a:t>
+              <a:t>20/09/2022</a:t>
             </a:fld>
             <a:endParaRPr lang="es-CO"/>
           </a:p>
@@ -4055,7 +4056,7 @@
           <a:p>
             <a:fld id="{BD986248-06F7-A441-A47A-264EBD310E11}" type="datetimeFigureOut">
               <a:rPr lang="es-CO" smtClean="0"/>
-              <a:t>17/09/2022</a:t>
+              <a:t>20/09/2022</a:t>
             </a:fld>
             <a:endParaRPr lang="es-CO"/>
           </a:p>
@@ -5544,10 +5545,10 @@
       </p:sp>
       <p:pic>
         <p:nvPicPr>
-          <p:cNvPr id="8" name="Imagen 7">
-            <a:extLst>
-              <a:ext uri="{FF2B5EF4-FFF2-40B4-BE49-F238E27FC236}">
-                <a16:creationId xmlns:a16="http://schemas.microsoft.com/office/drawing/2014/main" id="{3FC2C8EE-71A8-9713-3AE6-46C1BB383748}"/>
+          <p:cNvPr id="3" name="Imagen 2">
+            <a:extLst>
+              <a:ext uri="{FF2B5EF4-FFF2-40B4-BE49-F238E27FC236}">
+                <a16:creationId xmlns:a16="http://schemas.microsoft.com/office/drawing/2014/main" id="{BE78A64A-7639-8908-5933-5F788C155F9F}"/>
               </a:ext>
             </a:extLst>
           </p:cNvPr>
@@ -5556,15 +5557,16 @@
           </p:cNvPicPr>
           <p:nvPr/>
         </p:nvPicPr>
-        <p:blipFill rotWithShape="1">
+        <p:blipFill>
           <a:blip r:embed="rId2"/>
-          <a:srcRect/>
-          <a:stretch/>
+          <a:stretch>
+            <a:fillRect/>
+          </a:stretch>
         </p:blipFill>
         <p:spPr>
           <a:xfrm>
-            <a:off x="1581150" y="1092989"/>
-            <a:ext cx="9029700" cy="5676900"/>
+            <a:off x="1123071" y="629564"/>
+            <a:ext cx="9945858" cy="6228436"/>
           </a:xfrm>
           <a:prstGeom prst="rect">
             <a:avLst/>
@@ -5603,10 +5605,10 @@
       </p:grpSpPr>
       <p:pic>
         <p:nvPicPr>
-          <p:cNvPr id="4" name="Imagen 3">
-            <a:extLst>
-              <a:ext uri="{FF2B5EF4-FFF2-40B4-BE49-F238E27FC236}">
-                <a16:creationId xmlns:a16="http://schemas.microsoft.com/office/drawing/2014/main" id="{279350AA-62C9-75EF-46C3-0345953F5641}"/>
+          <p:cNvPr id="3" name="Imagen 2">
+            <a:extLst>
+              <a:ext uri="{FF2B5EF4-FFF2-40B4-BE49-F238E27FC236}">
+                <a16:creationId xmlns:a16="http://schemas.microsoft.com/office/drawing/2014/main" id="{B6D05E2E-F6F7-3265-9463-A975DAD1F696}"/>
               </a:ext>
             </a:extLst>
           </p:cNvPr>
@@ -5615,15 +5617,16 @@
           </p:cNvPicPr>
           <p:nvPr/>
         </p:nvPicPr>
-        <p:blipFill rotWithShape="1">
+        <p:blipFill>
           <a:blip r:embed="rId2"/>
-          <a:srcRect t="2332"/>
-          <a:stretch/>
+          <a:stretch>
+            <a:fillRect/>
+          </a:stretch>
         </p:blipFill>
         <p:spPr>
           <a:xfrm>
-            <a:off x="668372" y="1150606"/>
-            <a:ext cx="10316539" cy="4556789"/>
+            <a:off x="1166784" y="866921"/>
+            <a:ext cx="9858432" cy="5124157"/>
           </a:xfrm>
           <a:prstGeom prst="rect">
             <a:avLst/>
@@ -5704,10 +5707,10 @@
       </p:sp>
       <p:pic>
         <p:nvPicPr>
-          <p:cNvPr id="4" name="Imagen 3">
-            <a:extLst>
-              <a:ext uri="{FF2B5EF4-FFF2-40B4-BE49-F238E27FC236}">
-                <a16:creationId xmlns:a16="http://schemas.microsoft.com/office/drawing/2014/main" id="{EBEE270C-1BCA-CA91-79D2-FA87CD55A497}"/>
+          <p:cNvPr id="3" name="Imagen 2">
+            <a:extLst>
+              <a:ext uri="{FF2B5EF4-FFF2-40B4-BE49-F238E27FC236}">
+                <a16:creationId xmlns:a16="http://schemas.microsoft.com/office/drawing/2014/main" id="{D8B262FA-29F3-F30B-F3DE-5DB64C42C194}"/>
               </a:ext>
             </a:extLst>
           </p:cNvPr>
@@ -5724,8 +5727,8 @@
         </p:blipFill>
         <p:spPr>
           <a:xfrm>
-            <a:off x="0" y="1620239"/>
-            <a:ext cx="12192000" cy="3617523"/>
+            <a:off x="0" y="1589348"/>
+            <a:ext cx="12197578" cy="3679304"/>
           </a:xfrm>
           <a:prstGeom prst="rect">
             <a:avLst/>
@@ -7316,7 +7319,7 @@
         </p:nvSpPr>
         <p:spPr>
           <a:xfrm>
-            <a:off x="556878" y="354061"/>
+            <a:off x="-210038" y="398307"/>
             <a:ext cx="11078244" cy="666786"/>
           </a:xfrm>
           <a:prstGeom prst="rect">
@@ -7342,6 +7345,36 @@
           </a:p>
         </p:txBody>
       </p:sp>
+      <p:pic>
+        <p:nvPicPr>
+          <p:cNvPr id="4" name="Imagen 3" descr="Diagrama&#10;&#10;Descripción generada automáticamente">
+            <a:extLst>
+              <a:ext uri="{FF2B5EF4-FFF2-40B4-BE49-F238E27FC236}">
+                <a16:creationId xmlns:a16="http://schemas.microsoft.com/office/drawing/2014/main" id="{98C1205F-7A38-15B7-BFD3-B9C1C09AB42E}"/>
+              </a:ext>
+            </a:extLst>
+          </p:cNvPr>
+          <p:cNvPicPr>
+            <a:picLocks noChangeAspect="1"/>
+          </p:cNvPicPr>
+          <p:nvPr/>
+        </p:nvPicPr>
+        <p:blipFill>
+          <a:blip r:embed="rId2"/>
+          <a:stretch>
+            <a:fillRect/>
+          </a:stretch>
+        </p:blipFill>
+        <p:spPr>
+          <a:xfrm>
+            <a:off x="898946" y="1049105"/>
+            <a:ext cx="10394107" cy="5808895"/>
+          </a:xfrm>
+          <a:prstGeom prst="rect">
+            <a:avLst/>
+          </a:prstGeom>
+        </p:spPr>
+      </p:pic>
     </p:spTree>
     <p:extLst>
       <p:ext uri="{BB962C8B-B14F-4D97-AF65-F5344CB8AC3E}">
@@ -7372,6 +7405,36 @@
           <a:chExt cx="0" cy="0"/>
         </a:xfrm>
       </p:grpSpPr>
+      <p:pic>
+        <p:nvPicPr>
+          <p:cNvPr id="3" name="Imagen 2">
+            <a:extLst>
+              <a:ext uri="{FF2B5EF4-FFF2-40B4-BE49-F238E27FC236}">
+                <a16:creationId xmlns:a16="http://schemas.microsoft.com/office/drawing/2014/main" id="{8A242E3A-5E54-4A9C-67E2-B7DF0AE417A5}"/>
+              </a:ext>
+            </a:extLst>
+          </p:cNvPr>
+          <p:cNvPicPr>
+            <a:picLocks noChangeAspect="1"/>
+          </p:cNvPicPr>
+          <p:nvPr/>
+        </p:nvPicPr>
+        <p:blipFill>
+          <a:blip r:embed="rId2"/>
+          <a:stretch>
+            <a:fillRect/>
+          </a:stretch>
+        </p:blipFill>
+        <p:spPr>
+          <a:xfrm>
+            <a:off x="0" y="-1"/>
+            <a:ext cx="10691446" cy="6868571"/>
+          </a:xfrm>
+          <a:prstGeom prst="rect">
+            <a:avLst/>
+          </a:prstGeom>
+        </p:spPr>
+      </p:pic>
       <p:sp>
         <p:nvSpPr>
           <p:cNvPr id="5" name="CuadroTexto 4">
@@ -7386,8 +7449,8 @@
         </p:nvSpPr>
         <p:spPr>
           <a:xfrm>
-            <a:off x="883920" y="298112"/>
-            <a:ext cx="10424160" cy="666786"/>
+            <a:off x="6096000" y="5067059"/>
+            <a:ext cx="5868571" cy="1241237"/>
           </a:xfrm>
           <a:prstGeom prst="rect">
             <a:avLst/>
@@ -7407,7 +7470,18 @@
                   <a:srgbClr val="FF6C00"/>
                 </a:solidFill>
               </a:rPr>
-              <a:t>Modelado MR (Modelo Relacional)</a:t>
+              <a:t>Modelado MR </a:t>
+            </a:r>
+          </a:p>
+          <a:p>
+            <a:pPr algn="ctr"/>
+            <a:r>
+              <a:rPr lang="es-ES" sz="3733" b="1" dirty="0">
+                <a:solidFill>
+                  <a:srgbClr val="FF6C00"/>
+                </a:solidFill>
+              </a:rPr>
+              <a:t>(Modelo Relacional)</a:t>
             </a:r>
           </a:p>
         </p:txBody>
@@ -7477,7 +7551,7 @@
                   <a:srgbClr val="FF6C00"/>
                 </a:solidFill>
               </a:rPr>
-              <a:t>Prediseño del </a:t>
+              <a:t>Diseño del </a:t>
             </a:r>
             <a:r>
               <a:rPr lang="es-ES" sz="3733" b="1" dirty="0" err="1">
@@ -7527,14 +7601,20 @@
       </p:grpSpPr>
       <p:sp>
         <p:nvSpPr>
-          <p:cNvPr id="2" name="CuadroTexto 1"/>
+          <p:cNvPr id="5" name="CuadroTexto 4">
+            <a:extLst>
+              <a:ext uri="{FF2B5EF4-FFF2-40B4-BE49-F238E27FC236}">
+                <a16:creationId xmlns:a16="http://schemas.microsoft.com/office/drawing/2014/main" id="{1BE7FA7E-C3EC-4186-AFBD-5BB81C7A131D}"/>
+              </a:ext>
+            </a:extLst>
+          </p:cNvPr>
           <p:cNvSpPr txBox="1"/>
           <p:nvPr/>
         </p:nvSpPr>
         <p:spPr>
           <a:xfrm>
-            <a:off x="510491" y="332660"/>
-            <a:ext cx="4408840" cy="830997"/>
+            <a:off x="2998383" y="421131"/>
+            <a:ext cx="6195235" cy="666786"/>
           </a:xfrm>
           <a:prstGeom prst="rect">
             <a:avLst/>
@@ -7547,113 +7627,14 @@
           </a:bodyPr>
           <a:lstStyle/>
           <a:p>
-            <a:r>
-              <a:rPr lang="es-ES" sz="4800" b="1" dirty="0">
+            <a:pPr algn="ctr"/>
+            <a:r>
+              <a:rPr lang="es-ES" sz="3733" b="1" dirty="0">
                 <a:solidFill>
-                  <a:schemeClr val="bg1"/>
+                  <a:srgbClr val="FF6C00"/>
                 </a:solidFill>
               </a:rPr>
-              <a:t>Conclusiones </a:t>
-            </a:r>
-          </a:p>
-        </p:txBody>
-      </p:sp>
-      <p:sp>
-        <p:nvSpPr>
-          <p:cNvPr id="8" name="CuadroTexto 7">
-            <a:extLst>
-              <a:ext uri="{FF2B5EF4-FFF2-40B4-BE49-F238E27FC236}">
-                <a16:creationId xmlns:a16="http://schemas.microsoft.com/office/drawing/2014/main" id="{F8C7B26D-E9A2-4838-8972-83BB0387A627}"/>
-              </a:ext>
-            </a:extLst>
-          </p:cNvPr>
-          <p:cNvSpPr txBox="1"/>
-          <p:nvPr/>
-        </p:nvSpPr>
-        <p:spPr>
-          <a:xfrm>
-            <a:off x="184424" y="1821465"/>
-            <a:ext cx="11823152" cy="3416320"/>
-          </a:xfrm>
-          <a:prstGeom prst="rect">
-            <a:avLst/>
-          </a:prstGeom>
-          <a:noFill/>
-        </p:spPr>
-        <p:txBody>
-          <a:bodyPr wrap="square" rtlCol="0">
-            <a:spAutoFit/>
-          </a:bodyPr>
-          <a:lstStyle/>
-          <a:p>
-            <a:pPr marL="380990" indent="-380990" algn="just" defTabSz="1257621" hangingPunct="0">
-              <a:buFontTx/>
-              <a:buChar char="-"/>
-            </a:pPr>
-            <a:r>
-              <a:rPr lang="es-ES" sz="2400" dirty="0">
-                <a:ea typeface="Helvetica Neue"/>
-                <a:cs typeface="Calibir"/>
-                <a:sym typeface="Helvetica Neue"/>
-              </a:rPr>
-              <a:t>Tras la documentación mostrada, podemos deducir que los objetivos planteados están dirigidos a solucionar la problemática principal de nuestro proyecto, dado que actualmente no se ve resuelta por completo en el mercado, y de allí se derivan oportunidades para </a:t>
-            </a:r>
-            <a:r>
-              <a:rPr lang="es-ES" sz="2400" dirty="0" err="1">
-                <a:ea typeface="Helvetica Neue"/>
-                <a:cs typeface="Calibir"/>
-                <a:sym typeface="Helvetica Neue"/>
-              </a:rPr>
-              <a:t>Service</a:t>
-            </a:r>
-            <a:r>
-              <a:rPr lang="es-ES" sz="2400" dirty="0">
-                <a:ea typeface="Helvetica Neue"/>
-                <a:cs typeface="Calibir"/>
-                <a:sym typeface="Helvetica Neue"/>
-              </a:rPr>
-              <a:t> </a:t>
-            </a:r>
-            <a:r>
-              <a:rPr lang="es-ES" sz="2400" dirty="0" err="1">
-                <a:ea typeface="Helvetica Neue"/>
-                <a:cs typeface="Calibir"/>
-                <a:sym typeface="Helvetica Neue"/>
-              </a:rPr>
-              <a:t>Market</a:t>
-            </a:r>
-            <a:r>
-              <a:rPr lang="es-ES" sz="2400" dirty="0">
-                <a:ea typeface="Helvetica Neue"/>
-                <a:cs typeface="Calibir"/>
-                <a:sym typeface="Helvetica Neue"/>
-              </a:rPr>
-              <a:t>.</a:t>
-            </a:r>
-          </a:p>
-          <a:p>
-            <a:pPr marL="380990" indent="-380990" algn="just" defTabSz="1257621" hangingPunct="0">
-              <a:buFontTx/>
-              <a:buChar char="-"/>
-            </a:pPr>
-            <a:endParaRPr lang="es-ES" sz="2400" dirty="0">
-              <a:ea typeface="Helvetica Neue"/>
-              <a:cs typeface="Calibir"/>
-              <a:sym typeface="Helvetica Neue"/>
-            </a:endParaRPr>
-          </a:p>
-          <a:p>
-            <a:pPr marL="380990" indent="-380990" algn="just" defTabSz="1257621" hangingPunct="0">
-              <a:buFontTx/>
-              <a:buChar char="-"/>
-            </a:pPr>
-            <a:r>
-              <a:rPr lang="es-ES" sz="2400" dirty="0">
-                <a:ea typeface="Helvetica Neue"/>
-                <a:cs typeface="Calibir"/>
-                <a:sym typeface="Helvetica Neue"/>
-              </a:rPr>
-              <a:t>Según los datos expuestos, podemos concluir que nuestra aplicación web va a ser un canal de comunicación para clientes y proveedores que estén dispuestos a dar a conocer sus servicios, generando así mas ganancias, una negociación a una escala mayor y aumentando la credibilidad de aquellos prestadores de servicios que requieran una ayuda.</a:t>
+              <a:t>Script de la base de datos</a:t>
             </a:r>
           </a:p>
         </p:txBody>
@@ -7661,7 +7642,7 @@
     </p:spTree>
     <p:extLst>
       <p:ext uri="{BB962C8B-B14F-4D97-AF65-F5344CB8AC3E}">
-        <p14:creationId xmlns:p14="http://schemas.microsoft.com/office/powerpoint/2010/main" val="224373756"/>
+        <p14:creationId xmlns:p14="http://schemas.microsoft.com/office/powerpoint/2010/main" val="3458874268"/>
       </p:ext>
     </p:extLst>
   </p:cSld>
@@ -7696,8 +7677,8 @@
         </p:nvSpPr>
         <p:spPr>
           <a:xfrm>
-            <a:off x="510489" y="332661"/>
-            <a:ext cx="9469939" cy="830997"/>
+            <a:off x="510491" y="332660"/>
+            <a:ext cx="4408840" cy="830997"/>
           </a:xfrm>
           <a:prstGeom prst="rect">
             <a:avLst/>
@@ -7716,7 +7697,7 @@
                   <a:schemeClr val="bg1"/>
                 </a:solidFill>
               </a:rPr>
-              <a:t>Referencias bibliográficas</a:t>
+              <a:t>Conclusiones </a:t>
             </a:r>
           </a:p>
         </p:txBody>
@@ -7735,8 +7716,8 @@
         </p:nvSpPr>
         <p:spPr>
           <a:xfrm>
-            <a:off x="184424" y="1806100"/>
-            <a:ext cx="11823152" cy="5015797"/>
+            <a:off x="184424" y="1821465"/>
+            <a:ext cx="11823152" cy="3416320"/>
           </a:xfrm>
           <a:prstGeom prst="rect">
             <a:avLst/>
@@ -7749,363 +7730,82 @@
           </a:bodyPr>
           <a:lstStyle/>
           <a:p>
-            <a:pPr algn="just" defTabSz="1257621" hangingPunct="0"/>
-            <a:r>
-              <a:rPr lang="es-ES" sz="2133" dirty="0">
-                <a:solidFill>
-                  <a:srgbClr val="404040"/>
-                </a:solidFill>
+            <a:pPr marL="380990" indent="-380990" algn="just" defTabSz="1257621" hangingPunct="0">
+              <a:buFontTx/>
+              <a:buChar char="-"/>
+            </a:pPr>
+            <a:r>
+              <a:rPr lang="es-ES" sz="2400" dirty="0">
                 <a:ea typeface="Helvetica Neue"/>
                 <a:cs typeface="Calibir"/>
                 <a:sym typeface="Helvetica Neue"/>
-                <a:hlinkClick r:id="rId2"/>
-              </a:rPr>
-              <a:t>https://www.ingenioempresa.com/matriz-foda/#Paso_2_Definiendo_amenazas</a:t>
-            </a:r>
-            <a:r>
-              <a:rPr lang="es-ES" sz="2133" dirty="0">
-                <a:solidFill>
-                  <a:srgbClr val="404040"/>
-                </a:solidFill>
+              </a:rPr>
+              <a:t>Tras la documentación mostrada, podemos deducir que los objetivos planteados están dirigidos a solucionar la problemática principal de nuestro proyecto, dado que actualmente no se ve resuelta por completo en el mercado, y de allí se derivan oportunidades para </a:t>
+            </a:r>
+            <a:r>
+              <a:rPr lang="es-ES" sz="2400" dirty="0" err="1">
                 <a:ea typeface="Helvetica Neue"/>
                 <a:cs typeface="Calibir"/>
                 <a:sym typeface="Helvetica Neue"/>
               </a:rPr>
+              <a:t>Service</a:t>
+            </a:r>
+            <a:r>
+              <a:rPr lang="es-ES" sz="2400" dirty="0">
+                <a:ea typeface="Helvetica Neue"/>
+                <a:cs typeface="Calibir"/>
+                <a:sym typeface="Helvetica Neue"/>
+              </a:rPr>
               <a:t> </a:t>
             </a:r>
-          </a:p>
-          <a:p>
-            <a:pPr algn="just" defTabSz="1257621" hangingPunct="0"/>
-            <a:r>
-              <a:rPr lang="es-ES" sz="2133" dirty="0"/>
-              <a:t>Betancourt, D. F. (19 de abril de 2018). </a:t>
-            </a:r>
-            <a:r>
-              <a:rPr lang="es-ES" sz="2133" i="1" dirty="0"/>
-              <a:t>Cómo hacer el análisis FODA (matriz FADO) paso a paso</a:t>
-            </a:r>
-            <a:endParaRPr lang="es-ES" sz="2133" dirty="0">
+            <a:r>
+              <a:rPr lang="es-ES" sz="2400" dirty="0" err="1">
+                <a:ea typeface="Helvetica Neue"/>
+                <a:cs typeface="Calibir"/>
+                <a:sym typeface="Helvetica Neue"/>
+              </a:rPr>
+              <a:t>Market</a:t>
+            </a:r>
+            <a:r>
+              <a:rPr lang="es-ES" sz="2400" dirty="0">
+                <a:ea typeface="Helvetica Neue"/>
+                <a:cs typeface="Calibir"/>
+                <a:sym typeface="Helvetica Neue"/>
+              </a:rPr>
+              <a:t>.</a:t>
+            </a:r>
+          </a:p>
+          <a:p>
+            <a:pPr marL="380990" indent="-380990" algn="just" defTabSz="1257621" hangingPunct="0">
+              <a:buFontTx/>
+              <a:buChar char="-"/>
+            </a:pPr>
+            <a:endParaRPr lang="es-ES" sz="2400" dirty="0">
               <a:ea typeface="Helvetica Neue"/>
               <a:cs typeface="Calibir"/>
               <a:sym typeface="Helvetica Neue"/>
             </a:endParaRPr>
           </a:p>
           <a:p>
-            <a:pPr algn="just" defTabSz="1257621" hangingPunct="0"/>
-            <a:r>
-              <a:rPr lang="es-ES" sz="2133" dirty="0">
-                <a:solidFill>
-                  <a:srgbClr val="404040"/>
-                </a:solidFill>
+            <a:pPr marL="380990" indent="-380990" algn="just" defTabSz="1257621" hangingPunct="0">
+              <a:buFontTx/>
+              <a:buChar char="-"/>
+            </a:pPr>
+            <a:r>
+              <a:rPr lang="es-ES" sz="2400" dirty="0">
                 <a:ea typeface="Helvetica Neue"/>
                 <a:cs typeface="Calibir"/>
                 <a:sym typeface="Helvetica Neue"/>
-                <a:hlinkClick r:id="rId3"/>
-              </a:rPr>
-              <a:t>https://www.ingenioempresa.com/arbol-de-objetivos/</a:t>
-            </a:r>
-            <a:endParaRPr lang="es-ES" sz="2133" dirty="0">
-              <a:solidFill>
-                <a:srgbClr val="404040"/>
-              </a:solidFill>
-              <a:ea typeface="Helvetica Neue"/>
-              <a:cs typeface="Calibir"/>
-              <a:sym typeface="Helvetica Neue"/>
-            </a:endParaRPr>
-          </a:p>
-          <a:p>
-            <a:pPr algn="just" defTabSz="1257621" hangingPunct="0"/>
-            <a:r>
-              <a:rPr lang="es-ES" sz="2133" dirty="0"/>
-              <a:t>BETANCOURT, Diego. </a:t>
-            </a:r>
-            <a:r>
-              <a:rPr lang="es-ES" sz="2133" i="1" dirty="0"/>
-              <a:t>Cómo hacer un árbol de objetivos(09 de AGOSTO de 2016)</a:t>
-            </a:r>
-            <a:endParaRPr lang="es-ES" sz="2133" dirty="0">
-              <a:ea typeface="Helvetica Neue"/>
-              <a:cs typeface="Calibir"/>
-              <a:sym typeface="Helvetica Neue"/>
-            </a:endParaRPr>
-          </a:p>
-          <a:p>
-            <a:pPr algn="just" defTabSz="1257621" hangingPunct="0"/>
-            <a:r>
-              <a:rPr lang="es-ES" sz="2133" dirty="0">
-                <a:solidFill>
-                  <a:srgbClr val="404040"/>
-                </a:solidFill>
-                <a:ea typeface="Helvetica Neue"/>
-                <a:cs typeface="Calibir"/>
-                <a:sym typeface="Helvetica Neue"/>
-                <a:hlinkClick r:id="rId4"/>
-              </a:rPr>
-              <a:t>https://www.ingenioempresa.com/arbol-de-problemas/</a:t>
-            </a:r>
-            <a:endParaRPr lang="es-ES" sz="2133" dirty="0">
-              <a:solidFill>
-                <a:srgbClr val="404040"/>
-              </a:solidFill>
-              <a:ea typeface="Helvetica Neue"/>
-              <a:cs typeface="Calibir"/>
-              <a:sym typeface="Helvetica Neue"/>
-            </a:endParaRPr>
-          </a:p>
-          <a:p>
-            <a:pPr algn="just" defTabSz="1257621" hangingPunct="0"/>
-            <a:r>
-              <a:rPr lang="es-ES" sz="2133" dirty="0"/>
-              <a:t>Betancourt, D. F. (05 de julio de 2016). </a:t>
-            </a:r>
-            <a:r>
-              <a:rPr lang="es-ES" sz="2133" i="1" dirty="0"/>
-              <a:t>Cómo hacer un árbol de problemas:</a:t>
-            </a:r>
-            <a:endParaRPr lang="es-ES" sz="2133" dirty="0">
-              <a:ea typeface="Helvetica Neue"/>
-              <a:cs typeface="Calibir"/>
-              <a:sym typeface="Helvetica Neue"/>
-            </a:endParaRPr>
-          </a:p>
-          <a:p>
-            <a:pPr algn="just" defTabSz="1257621" hangingPunct="0"/>
-            <a:r>
-              <a:rPr lang="es-ES" sz="2133" dirty="0">
-                <a:solidFill>
-                  <a:srgbClr val="404040"/>
-                </a:solidFill>
-                <a:ea typeface="Helvetica Neue"/>
-                <a:cs typeface="Calibir"/>
-                <a:sym typeface="Helvetica Neue"/>
-                <a:hlinkClick r:id="rId5"/>
-              </a:rPr>
-              <a:t>https://www.ejemplos.co/verbos-para-objetivos-generales-y-especificos/</a:t>
-            </a:r>
-            <a:endParaRPr lang="es-ES" sz="2133" dirty="0">
-              <a:solidFill>
-                <a:srgbClr val="404040"/>
-              </a:solidFill>
-              <a:ea typeface="Helvetica Neue"/>
-              <a:cs typeface="Calibir"/>
-              <a:sym typeface="Helvetica Neue"/>
-            </a:endParaRPr>
-          </a:p>
-          <a:p>
-            <a:pPr algn="just" defTabSz="1257621" hangingPunct="0"/>
-            <a:r>
-              <a:rPr lang="es-ES" sz="2133" dirty="0"/>
-              <a:t>Enciclopedia de Ejemplos (2022). "Verbos para Objetivos Generales y Específicos". </a:t>
-            </a:r>
-            <a:endParaRPr lang="es-ES" sz="2133" dirty="0">
-              <a:ea typeface="Helvetica Neue"/>
-              <a:cs typeface="Calibir"/>
-              <a:sym typeface="Helvetica Neue"/>
-            </a:endParaRPr>
-          </a:p>
-          <a:p>
-            <a:pPr algn="just" defTabSz="1257621" hangingPunct="0"/>
-            <a:r>
-              <a:rPr lang="es-ES" sz="2133" dirty="0">
-                <a:solidFill>
-                  <a:srgbClr val="404040"/>
-                </a:solidFill>
-                <a:ea typeface="Helvetica Neue"/>
-                <a:cs typeface="Calibir"/>
-                <a:sym typeface="Helvetica Neue"/>
-                <a:hlinkClick r:id="rId6"/>
-              </a:rPr>
-              <a:t>https://neetwork.com/wp-content/uploads/2019/10/que-es-la-negociacion.jpg</a:t>
-            </a:r>
-            <a:r>
-              <a:rPr lang="es-ES" sz="2133" dirty="0">
-                <a:solidFill>
-                  <a:srgbClr val="404040"/>
-                </a:solidFill>
-                <a:ea typeface="Helvetica Neue"/>
-                <a:cs typeface="Calibir"/>
-                <a:sym typeface="Helvetica Neue"/>
-              </a:rPr>
-              <a:t> </a:t>
-            </a:r>
-            <a:r>
-              <a:rPr lang="es-ES" sz="2133" dirty="0">
-                <a:ea typeface="Helvetica Neue"/>
-                <a:cs typeface="Calibir"/>
-                <a:sym typeface="Helvetica Neue"/>
-              </a:rPr>
-              <a:t>(Imagen referente)</a:t>
-            </a:r>
-          </a:p>
-          <a:p>
-            <a:pPr algn="just" defTabSz="1257621" hangingPunct="0"/>
-            <a:r>
-              <a:rPr lang="es-ES" sz="2133" dirty="0">
-                <a:solidFill>
-                  <a:srgbClr val="404040"/>
-                </a:solidFill>
-                <a:ea typeface="Helvetica Neue"/>
-                <a:cs typeface="Calibir"/>
-                <a:sym typeface="Helvetica Neue"/>
-                <a:hlinkClick r:id="rId7"/>
-              </a:rPr>
-              <a:t>https://www.protopie.io/</a:t>
-            </a:r>
-            <a:r>
-              <a:rPr lang="es-ES" sz="2133" dirty="0">
-                <a:solidFill>
-                  <a:srgbClr val="404040"/>
-                </a:solidFill>
-                <a:ea typeface="Helvetica Neue"/>
-                <a:cs typeface="Calibir"/>
-                <a:sym typeface="Helvetica Neue"/>
-              </a:rPr>
-              <a:t> </a:t>
-            </a:r>
-            <a:r>
-              <a:rPr lang="es-ES" sz="2133" dirty="0">
-                <a:ea typeface="Helvetica Neue"/>
-                <a:cs typeface="Calibir"/>
-                <a:sym typeface="Helvetica Neue"/>
-              </a:rPr>
-              <a:t>(Plataforma interactiva de wireframe)</a:t>
-            </a:r>
-          </a:p>
-          <a:p>
-            <a:pPr algn="just" defTabSz="1257621" hangingPunct="0"/>
-            <a:r>
-              <a:rPr lang="es-ES" sz="2133" dirty="0">
-                <a:solidFill>
-                  <a:srgbClr val="404040"/>
-                </a:solidFill>
-                <a:ea typeface="Helvetica Neue"/>
-                <a:cs typeface="Calibir"/>
-                <a:sym typeface="Helvetica Neue"/>
-                <a:hlinkClick r:id="rId8"/>
-              </a:rPr>
-              <a:t>https://www.flaticon.es/?k=1629421547935</a:t>
-            </a:r>
-            <a:r>
-              <a:rPr lang="es-ES" sz="2133" dirty="0">
-                <a:solidFill>
-                  <a:srgbClr val="404040"/>
-                </a:solidFill>
-                <a:ea typeface="Helvetica Neue"/>
-                <a:cs typeface="Calibir"/>
-                <a:sym typeface="Helvetica Neue"/>
-              </a:rPr>
-              <a:t> </a:t>
-            </a:r>
-            <a:r>
-              <a:rPr lang="es-ES" sz="2133" dirty="0">
-                <a:ea typeface="Helvetica Neue"/>
-                <a:cs typeface="Calibir"/>
-                <a:sym typeface="Helvetica Neue"/>
-              </a:rPr>
-              <a:t>(Iconos)</a:t>
-            </a:r>
-          </a:p>
-          <a:p>
-            <a:pPr algn="just" defTabSz="1257621" hangingPunct="0"/>
-            <a:r>
-              <a:rPr lang="es-ES" sz="2133" dirty="0">
-                <a:solidFill>
-                  <a:srgbClr val="404040"/>
-                </a:solidFill>
-                <a:ea typeface="Helvetica Neue"/>
-                <a:cs typeface="Calibir"/>
-                <a:sym typeface="Helvetica Neue"/>
-                <a:hlinkClick r:id="rId9"/>
-              </a:rPr>
-              <a:t>https://studio.tailorbrands.com/</a:t>
-            </a:r>
-            <a:r>
-              <a:rPr lang="es-ES" sz="2133" dirty="0">
-                <a:solidFill>
-                  <a:srgbClr val="404040"/>
-                </a:solidFill>
-                <a:ea typeface="Helvetica Neue"/>
-                <a:cs typeface="Calibir"/>
-                <a:sym typeface="Helvetica Neue"/>
-              </a:rPr>
-              <a:t> </a:t>
-            </a:r>
-            <a:r>
-              <a:rPr lang="es-ES" sz="2133" dirty="0">
-                <a:ea typeface="Helvetica Neue"/>
-                <a:cs typeface="Calibir"/>
-                <a:sym typeface="Helvetica Neue"/>
-              </a:rPr>
-              <a:t>(Diseño de Logo)</a:t>
-            </a:r>
-          </a:p>
-          <a:p>
-            <a:pPr algn="just" defTabSz="1257621" hangingPunct="0"/>
-            <a:r>
-              <a:rPr lang="es-ES" sz="2133" dirty="0">
-                <a:solidFill>
-                  <a:srgbClr val="404040"/>
-                </a:solidFill>
-                <a:latin typeface="Calibir"/>
-                <a:ea typeface="Helvetica Neue"/>
-                <a:cs typeface="Calibir"/>
-                <a:sym typeface="Helvetica Neue"/>
-                <a:hlinkClick r:id="rId10"/>
-              </a:rPr>
-              <a:t>https://www.ingenioempresa.com/mapa-de-empatia/</a:t>
-            </a:r>
-            <a:r>
-              <a:rPr lang="es-ES" sz="2133" dirty="0">
-                <a:solidFill>
-                  <a:srgbClr val="404040"/>
-                </a:solidFill>
-                <a:latin typeface="Calibir"/>
-                <a:ea typeface="Helvetica Neue"/>
-                <a:cs typeface="Calibir"/>
-                <a:sym typeface="Helvetica Neue"/>
-              </a:rPr>
-              <a:t> </a:t>
-            </a:r>
-            <a:r>
-              <a:rPr lang="es-ES" sz="2133" dirty="0">
-                <a:latin typeface="Calibir"/>
-                <a:ea typeface="Helvetica Neue"/>
-                <a:cs typeface="Calibir"/>
-                <a:sym typeface="Helvetica Neue"/>
-              </a:rPr>
-              <a:t>Ingenio Empresa. “Mapa de empatía”</a:t>
-            </a:r>
-          </a:p>
-          <a:p>
-            <a:pPr algn="just" defTabSz="1257621" hangingPunct="0"/>
-            <a:endParaRPr lang="es-ES" sz="2133" dirty="0">
-              <a:solidFill>
-                <a:srgbClr val="404040"/>
-              </a:solidFill>
-              <a:latin typeface="Calibir"/>
-              <a:ea typeface="Helvetica Neue"/>
-              <a:cs typeface="Calibir"/>
-              <a:sym typeface="Helvetica Neue"/>
-            </a:endParaRPr>
-          </a:p>
-          <a:p>
-            <a:pPr algn="just" defTabSz="1257621" hangingPunct="0"/>
-            <a:endParaRPr lang="es-ES" sz="2133" b="1" dirty="0">
-              <a:solidFill>
-                <a:srgbClr val="404040"/>
-              </a:solidFill>
-              <a:latin typeface="Calibir"/>
-              <a:ea typeface="Helvetica Neue"/>
-              <a:cs typeface="Calibir"/>
-              <a:sym typeface="Helvetica Neue"/>
-            </a:endParaRPr>
+              </a:rPr>
+              <a:t>Según los datos expuestos, podemos concluir que nuestra aplicación web va a ser un canal de comunicación para clientes y proveedores que estén dispuestos a dar a conocer sus servicios, generando así mas ganancias, una negociación a una escala mayor y aumentando la credibilidad de aquellos prestadores de servicios que requieran una ayuda.</a:t>
+            </a:r>
           </a:p>
         </p:txBody>
       </p:sp>
     </p:spTree>
     <p:extLst>
       <p:ext uri="{BB962C8B-B14F-4D97-AF65-F5344CB8AC3E}">
-        <p14:creationId xmlns:p14="http://schemas.microsoft.com/office/powerpoint/2010/main" val="2449997532"/>
+        <p14:creationId xmlns:p14="http://schemas.microsoft.com/office/powerpoint/2010/main" val="224373756"/>
       </p:ext>
     </p:extLst>
   </p:cSld>
@@ -8132,40 +7832,424 @@
           <a:chExt cx="0" cy="0"/>
         </a:xfrm>
       </p:grpSpPr>
-      <p:pic>
-        <p:nvPicPr>
-          <p:cNvPr id="3" name="Imagen 3">
-            <a:extLst>
-              <a:ext uri="{FF2B5EF4-FFF2-40B4-BE49-F238E27FC236}">
-                <a16:creationId xmlns:a16="http://schemas.microsoft.com/office/drawing/2014/main" id="{E42CE7DD-1B5C-489F-A503-80B34D37FB80}"/>
-              </a:ext>
-            </a:extLst>
-          </p:cNvPr>
-          <p:cNvPicPr>
-            <a:picLocks noChangeAspect="1"/>
-          </p:cNvPicPr>
+      <p:sp>
+        <p:nvSpPr>
+          <p:cNvPr id="2" name="CuadroTexto 1"/>
+          <p:cNvSpPr txBox="1"/>
           <p:nvPr/>
-        </p:nvPicPr>
-        <p:blipFill>
-          <a:blip r:embed="rId2"/>
-          <a:stretch>
-            <a:fillRect/>
-          </a:stretch>
-        </p:blipFill>
-        <p:spPr>
-          <a:xfrm>
-            <a:off x="-10659" y="-589"/>
-            <a:ext cx="12212442" cy="6859178"/>
+        </p:nvSpPr>
+        <p:spPr>
+          <a:xfrm>
+            <a:off x="510489" y="332661"/>
+            <a:ext cx="9469939" cy="830997"/>
           </a:xfrm>
           <a:prstGeom prst="rect">
             <a:avLst/>
           </a:prstGeom>
-        </p:spPr>
-      </p:pic>
+          <a:noFill/>
+        </p:spPr>
+        <p:txBody>
+          <a:bodyPr wrap="square" rtlCol="0">
+            <a:spAutoFit/>
+          </a:bodyPr>
+          <a:lstStyle/>
+          <a:p>
+            <a:r>
+              <a:rPr lang="es-ES" sz="4800" b="1" dirty="0">
+                <a:solidFill>
+                  <a:schemeClr val="bg1"/>
+                </a:solidFill>
+              </a:rPr>
+              <a:t>Referencias bibliográficas</a:t>
+            </a:r>
+          </a:p>
+        </p:txBody>
+      </p:sp>
+      <p:sp>
+        <p:nvSpPr>
+          <p:cNvPr id="8" name="CuadroTexto 7">
+            <a:extLst>
+              <a:ext uri="{FF2B5EF4-FFF2-40B4-BE49-F238E27FC236}">
+                <a16:creationId xmlns:a16="http://schemas.microsoft.com/office/drawing/2014/main" id="{F8C7B26D-E9A2-4838-8972-83BB0387A627}"/>
+              </a:ext>
+            </a:extLst>
+          </p:cNvPr>
+          <p:cNvSpPr txBox="1"/>
+          <p:nvPr/>
+        </p:nvSpPr>
+        <p:spPr>
+          <a:xfrm>
+            <a:off x="184424" y="1806100"/>
+            <a:ext cx="11823152" cy="5015797"/>
+          </a:xfrm>
+          <a:prstGeom prst="rect">
+            <a:avLst/>
+          </a:prstGeom>
+          <a:noFill/>
+        </p:spPr>
+        <p:txBody>
+          <a:bodyPr wrap="square" rtlCol="0">
+            <a:spAutoFit/>
+          </a:bodyPr>
+          <a:lstStyle/>
+          <a:p>
+            <a:pPr algn="just" defTabSz="1257621" hangingPunct="0"/>
+            <a:r>
+              <a:rPr lang="es-ES" sz="2133" dirty="0">
+                <a:solidFill>
+                  <a:srgbClr val="404040"/>
+                </a:solidFill>
+                <a:ea typeface="Helvetica Neue"/>
+                <a:cs typeface="Calibir"/>
+                <a:sym typeface="Helvetica Neue"/>
+                <a:hlinkClick r:id="rId2"/>
+              </a:rPr>
+              <a:t>https://www.ingenioempresa.com/matriz-foda/#Paso_2_Definiendo_amenazas</a:t>
+            </a:r>
+            <a:r>
+              <a:rPr lang="es-ES" sz="2133" dirty="0">
+                <a:solidFill>
+                  <a:srgbClr val="404040"/>
+                </a:solidFill>
+                <a:ea typeface="Helvetica Neue"/>
+                <a:cs typeface="Calibir"/>
+                <a:sym typeface="Helvetica Neue"/>
+              </a:rPr>
+              <a:t> </a:t>
+            </a:r>
+          </a:p>
+          <a:p>
+            <a:pPr algn="just" defTabSz="1257621" hangingPunct="0"/>
+            <a:r>
+              <a:rPr lang="es-ES" sz="2133" dirty="0"/>
+              <a:t>Betancourt, D. F. (19 de abril de 2018). </a:t>
+            </a:r>
+            <a:r>
+              <a:rPr lang="es-ES" sz="2133" i="1" dirty="0"/>
+              <a:t>Cómo hacer el análisis FODA (matriz FADO) paso a paso</a:t>
+            </a:r>
+            <a:endParaRPr lang="es-ES" sz="2133" dirty="0">
+              <a:ea typeface="Helvetica Neue"/>
+              <a:cs typeface="Calibir"/>
+              <a:sym typeface="Helvetica Neue"/>
+            </a:endParaRPr>
+          </a:p>
+          <a:p>
+            <a:pPr algn="just" defTabSz="1257621" hangingPunct="0"/>
+            <a:r>
+              <a:rPr lang="es-ES" sz="2133" dirty="0">
+                <a:solidFill>
+                  <a:srgbClr val="404040"/>
+                </a:solidFill>
+                <a:ea typeface="Helvetica Neue"/>
+                <a:cs typeface="Calibir"/>
+                <a:sym typeface="Helvetica Neue"/>
+                <a:hlinkClick r:id="rId3"/>
+              </a:rPr>
+              <a:t>https://www.ingenioempresa.com/arbol-de-objetivos/</a:t>
+            </a:r>
+            <a:endParaRPr lang="es-ES" sz="2133" dirty="0">
+              <a:solidFill>
+                <a:srgbClr val="404040"/>
+              </a:solidFill>
+              <a:ea typeface="Helvetica Neue"/>
+              <a:cs typeface="Calibir"/>
+              <a:sym typeface="Helvetica Neue"/>
+            </a:endParaRPr>
+          </a:p>
+          <a:p>
+            <a:pPr algn="just" defTabSz="1257621" hangingPunct="0"/>
+            <a:r>
+              <a:rPr lang="es-ES" sz="2133" dirty="0"/>
+              <a:t>BETANCOURT, Diego. </a:t>
+            </a:r>
+            <a:r>
+              <a:rPr lang="es-ES" sz="2133" i="1" dirty="0"/>
+              <a:t>Cómo hacer un árbol de objetivos(09 de AGOSTO de 2016)</a:t>
+            </a:r>
+            <a:endParaRPr lang="es-ES" sz="2133" dirty="0">
+              <a:ea typeface="Helvetica Neue"/>
+              <a:cs typeface="Calibir"/>
+              <a:sym typeface="Helvetica Neue"/>
+            </a:endParaRPr>
+          </a:p>
+          <a:p>
+            <a:pPr algn="just" defTabSz="1257621" hangingPunct="0"/>
+            <a:r>
+              <a:rPr lang="es-ES" sz="2133" dirty="0">
+                <a:solidFill>
+                  <a:srgbClr val="404040"/>
+                </a:solidFill>
+                <a:ea typeface="Helvetica Neue"/>
+                <a:cs typeface="Calibir"/>
+                <a:sym typeface="Helvetica Neue"/>
+                <a:hlinkClick r:id="rId4"/>
+              </a:rPr>
+              <a:t>https://www.ingenioempresa.com/arbol-de-problemas/</a:t>
+            </a:r>
+            <a:endParaRPr lang="es-ES" sz="2133" dirty="0">
+              <a:solidFill>
+                <a:srgbClr val="404040"/>
+              </a:solidFill>
+              <a:ea typeface="Helvetica Neue"/>
+              <a:cs typeface="Calibir"/>
+              <a:sym typeface="Helvetica Neue"/>
+            </a:endParaRPr>
+          </a:p>
+          <a:p>
+            <a:pPr algn="just" defTabSz="1257621" hangingPunct="0"/>
+            <a:r>
+              <a:rPr lang="es-ES" sz="2133" dirty="0"/>
+              <a:t>Betancourt, D. F. (05 de julio de 2016). </a:t>
+            </a:r>
+            <a:r>
+              <a:rPr lang="es-ES" sz="2133" i="1" dirty="0"/>
+              <a:t>Cómo hacer un árbol de problemas:</a:t>
+            </a:r>
+            <a:endParaRPr lang="es-ES" sz="2133" dirty="0">
+              <a:ea typeface="Helvetica Neue"/>
+              <a:cs typeface="Calibir"/>
+              <a:sym typeface="Helvetica Neue"/>
+            </a:endParaRPr>
+          </a:p>
+          <a:p>
+            <a:pPr algn="just" defTabSz="1257621" hangingPunct="0"/>
+            <a:r>
+              <a:rPr lang="es-ES" sz="2133" dirty="0">
+                <a:solidFill>
+                  <a:srgbClr val="404040"/>
+                </a:solidFill>
+                <a:ea typeface="Helvetica Neue"/>
+                <a:cs typeface="Calibir"/>
+                <a:sym typeface="Helvetica Neue"/>
+                <a:hlinkClick r:id="rId5"/>
+              </a:rPr>
+              <a:t>https://www.ejemplos.co/verbos-para-objetivos-generales-y-especificos/</a:t>
+            </a:r>
+            <a:endParaRPr lang="es-ES" sz="2133" dirty="0">
+              <a:solidFill>
+                <a:srgbClr val="404040"/>
+              </a:solidFill>
+              <a:ea typeface="Helvetica Neue"/>
+              <a:cs typeface="Calibir"/>
+              <a:sym typeface="Helvetica Neue"/>
+            </a:endParaRPr>
+          </a:p>
+          <a:p>
+            <a:pPr algn="just" defTabSz="1257621" hangingPunct="0"/>
+            <a:r>
+              <a:rPr lang="es-ES" sz="2133" dirty="0"/>
+              <a:t>Enciclopedia de Ejemplos (2022). "Verbos para Objetivos Generales y Específicos". </a:t>
+            </a:r>
+            <a:endParaRPr lang="es-ES" sz="2133" dirty="0">
+              <a:ea typeface="Helvetica Neue"/>
+              <a:cs typeface="Calibir"/>
+              <a:sym typeface="Helvetica Neue"/>
+            </a:endParaRPr>
+          </a:p>
+          <a:p>
+            <a:pPr algn="just" defTabSz="1257621" hangingPunct="0"/>
+            <a:r>
+              <a:rPr lang="es-ES" sz="2133" dirty="0">
+                <a:solidFill>
+                  <a:srgbClr val="404040"/>
+                </a:solidFill>
+                <a:ea typeface="Helvetica Neue"/>
+                <a:cs typeface="Calibir"/>
+                <a:sym typeface="Helvetica Neue"/>
+                <a:hlinkClick r:id="rId6"/>
+              </a:rPr>
+              <a:t>https://neetwork.com/wp-content/uploads/2019/10/que-es-la-negociacion.jpg</a:t>
+            </a:r>
+            <a:r>
+              <a:rPr lang="es-ES" sz="2133" dirty="0">
+                <a:solidFill>
+                  <a:srgbClr val="404040"/>
+                </a:solidFill>
+                <a:ea typeface="Helvetica Neue"/>
+                <a:cs typeface="Calibir"/>
+                <a:sym typeface="Helvetica Neue"/>
+              </a:rPr>
+              <a:t> </a:t>
+            </a:r>
+            <a:r>
+              <a:rPr lang="es-ES" sz="2133" dirty="0">
+                <a:ea typeface="Helvetica Neue"/>
+                <a:cs typeface="Calibir"/>
+                <a:sym typeface="Helvetica Neue"/>
+              </a:rPr>
+              <a:t>(Imagen referente)</a:t>
+            </a:r>
+          </a:p>
+          <a:p>
+            <a:pPr algn="just" defTabSz="1257621" hangingPunct="0"/>
+            <a:r>
+              <a:rPr lang="es-ES" sz="2133" dirty="0">
+                <a:solidFill>
+                  <a:srgbClr val="404040"/>
+                </a:solidFill>
+                <a:ea typeface="Helvetica Neue"/>
+                <a:cs typeface="Calibir"/>
+                <a:sym typeface="Helvetica Neue"/>
+                <a:hlinkClick r:id="rId7"/>
+              </a:rPr>
+              <a:t>https://www.protopie.io/</a:t>
+            </a:r>
+            <a:r>
+              <a:rPr lang="es-ES" sz="2133" dirty="0">
+                <a:solidFill>
+                  <a:srgbClr val="404040"/>
+                </a:solidFill>
+                <a:ea typeface="Helvetica Neue"/>
+                <a:cs typeface="Calibir"/>
+                <a:sym typeface="Helvetica Neue"/>
+              </a:rPr>
+              <a:t> </a:t>
+            </a:r>
+            <a:r>
+              <a:rPr lang="es-ES" sz="2133" dirty="0">
+                <a:ea typeface="Helvetica Neue"/>
+                <a:cs typeface="Calibir"/>
+                <a:sym typeface="Helvetica Neue"/>
+              </a:rPr>
+              <a:t>(Plataforma interactiva de wireframe)</a:t>
+            </a:r>
+          </a:p>
+          <a:p>
+            <a:pPr algn="just" defTabSz="1257621" hangingPunct="0"/>
+            <a:r>
+              <a:rPr lang="es-ES" sz="2133" dirty="0">
+                <a:solidFill>
+                  <a:srgbClr val="404040"/>
+                </a:solidFill>
+                <a:ea typeface="Helvetica Neue"/>
+                <a:cs typeface="Calibir"/>
+                <a:sym typeface="Helvetica Neue"/>
+                <a:hlinkClick r:id="rId8"/>
+              </a:rPr>
+              <a:t>https://www.flaticon.es/?k=1629421547935</a:t>
+            </a:r>
+            <a:r>
+              <a:rPr lang="es-ES" sz="2133" dirty="0">
+                <a:solidFill>
+                  <a:srgbClr val="404040"/>
+                </a:solidFill>
+                <a:ea typeface="Helvetica Neue"/>
+                <a:cs typeface="Calibir"/>
+                <a:sym typeface="Helvetica Neue"/>
+              </a:rPr>
+              <a:t> </a:t>
+            </a:r>
+            <a:r>
+              <a:rPr lang="es-ES" sz="2133" dirty="0">
+                <a:ea typeface="Helvetica Neue"/>
+                <a:cs typeface="Calibir"/>
+                <a:sym typeface="Helvetica Neue"/>
+              </a:rPr>
+              <a:t>(Iconos)</a:t>
+            </a:r>
+          </a:p>
+          <a:p>
+            <a:pPr algn="just" defTabSz="1257621" hangingPunct="0"/>
+            <a:r>
+              <a:rPr lang="es-ES" sz="2133" dirty="0">
+                <a:solidFill>
+                  <a:srgbClr val="404040"/>
+                </a:solidFill>
+                <a:ea typeface="Helvetica Neue"/>
+                <a:cs typeface="Calibir"/>
+                <a:sym typeface="Helvetica Neue"/>
+                <a:hlinkClick r:id="rId9"/>
+              </a:rPr>
+              <a:t>https://studio.tailorbrands.com/</a:t>
+            </a:r>
+            <a:r>
+              <a:rPr lang="es-ES" sz="2133" dirty="0">
+                <a:solidFill>
+                  <a:srgbClr val="404040"/>
+                </a:solidFill>
+                <a:ea typeface="Helvetica Neue"/>
+                <a:cs typeface="Calibir"/>
+                <a:sym typeface="Helvetica Neue"/>
+              </a:rPr>
+              <a:t> </a:t>
+            </a:r>
+            <a:r>
+              <a:rPr lang="es-ES" sz="2133" dirty="0">
+                <a:ea typeface="Helvetica Neue"/>
+                <a:cs typeface="Calibir"/>
+                <a:sym typeface="Helvetica Neue"/>
+              </a:rPr>
+              <a:t>(Diseño de Logo)</a:t>
+            </a:r>
+          </a:p>
+          <a:p>
+            <a:pPr algn="just" defTabSz="1257621" hangingPunct="0"/>
+            <a:r>
+              <a:rPr lang="es-ES" sz="2133" dirty="0">
+                <a:solidFill>
+                  <a:srgbClr val="404040"/>
+                </a:solidFill>
+                <a:latin typeface="Calibir"/>
+                <a:ea typeface="Helvetica Neue"/>
+                <a:cs typeface="Calibir"/>
+                <a:sym typeface="Helvetica Neue"/>
+                <a:hlinkClick r:id="rId10"/>
+              </a:rPr>
+              <a:t>https://www.ingenioempresa.com/mapa-de-empatia/</a:t>
+            </a:r>
+            <a:r>
+              <a:rPr lang="es-ES" sz="2133" dirty="0">
+                <a:solidFill>
+                  <a:srgbClr val="404040"/>
+                </a:solidFill>
+                <a:latin typeface="Calibir"/>
+                <a:ea typeface="Helvetica Neue"/>
+                <a:cs typeface="Calibir"/>
+                <a:sym typeface="Helvetica Neue"/>
+              </a:rPr>
+              <a:t> </a:t>
+            </a:r>
+            <a:r>
+              <a:rPr lang="es-ES" sz="2133" dirty="0">
+                <a:latin typeface="Calibir"/>
+                <a:ea typeface="Helvetica Neue"/>
+                <a:cs typeface="Calibir"/>
+                <a:sym typeface="Helvetica Neue"/>
+              </a:rPr>
+              <a:t>Ingenio Empresa. “Mapa de empatía”</a:t>
+            </a:r>
+          </a:p>
+          <a:p>
+            <a:pPr algn="just" defTabSz="1257621" hangingPunct="0"/>
+            <a:endParaRPr lang="es-ES" sz="2133" dirty="0">
+              <a:solidFill>
+                <a:srgbClr val="404040"/>
+              </a:solidFill>
+              <a:latin typeface="Calibir"/>
+              <a:ea typeface="Helvetica Neue"/>
+              <a:cs typeface="Calibir"/>
+              <a:sym typeface="Helvetica Neue"/>
+            </a:endParaRPr>
+          </a:p>
+          <a:p>
+            <a:pPr algn="just" defTabSz="1257621" hangingPunct="0"/>
+            <a:endParaRPr lang="es-ES" sz="2133" b="1" dirty="0">
+              <a:solidFill>
+                <a:srgbClr val="404040"/>
+              </a:solidFill>
+              <a:latin typeface="Calibir"/>
+              <a:ea typeface="Helvetica Neue"/>
+              <a:cs typeface="Calibir"/>
+              <a:sym typeface="Helvetica Neue"/>
+            </a:endParaRPr>
+          </a:p>
+        </p:txBody>
+      </p:sp>
     </p:spTree>
     <p:extLst>
       <p:ext uri="{BB962C8B-B14F-4D97-AF65-F5344CB8AC3E}">
-        <p14:creationId xmlns:p14="http://schemas.microsoft.com/office/powerpoint/2010/main" val="2776220320"/>
+        <p14:creationId xmlns:p14="http://schemas.microsoft.com/office/powerpoint/2010/main" val="2449997532"/>
       </p:ext>
     </p:extLst>
   </p:cSld>
@@ -8352,6 +8436,66 @@
     <p:extLst>
       <p:ext uri="{BB962C8B-B14F-4D97-AF65-F5344CB8AC3E}">
         <p14:creationId xmlns:p14="http://schemas.microsoft.com/office/powerpoint/2010/main" val="1947881636"/>
+      </p:ext>
+    </p:extLst>
+  </p:cSld>
+  <p:clrMapOvr>
+    <a:masterClrMapping/>
+  </p:clrMapOvr>
+</p:sld>
+</file>
+
+<file path=ppt/slides/slide30.xml><?xml version="1.0" encoding="utf-8"?>
+<p:sld xmlns:a="http://schemas.openxmlformats.org/drawingml/2006/main" xmlns:r="http://schemas.openxmlformats.org/officeDocument/2006/relationships" xmlns:p="http://schemas.openxmlformats.org/presentationml/2006/main">
+  <p:cSld>
+    <p:spTree>
+      <p:nvGrpSpPr>
+        <p:cNvPr id="1" name=""/>
+        <p:cNvGrpSpPr/>
+        <p:nvPr/>
+      </p:nvGrpSpPr>
+      <p:grpSpPr>
+        <a:xfrm>
+          <a:off x="0" y="0"/>
+          <a:ext cx="0" cy="0"/>
+          <a:chOff x="0" y="0"/>
+          <a:chExt cx="0" cy="0"/>
+        </a:xfrm>
+      </p:grpSpPr>
+      <p:pic>
+        <p:nvPicPr>
+          <p:cNvPr id="3" name="Imagen 3">
+            <a:extLst>
+              <a:ext uri="{FF2B5EF4-FFF2-40B4-BE49-F238E27FC236}">
+                <a16:creationId xmlns:a16="http://schemas.microsoft.com/office/drawing/2014/main" id="{E42CE7DD-1B5C-489F-A503-80B34D37FB80}"/>
+              </a:ext>
+            </a:extLst>
+          </p:cNvPr>
+          <p:cNvPicPr>
+            <a:picLocks noChangeAspect="1"/>
+          </p:cNvPicPr>
+          <p:nvPr/>
+        </p:nvPicPr>
+        <p:blipFill>
+          <a:blip r:embed="rId2"/>
+          <a:stretch>
+            <a:fillRect/>
+          </a:stretch>
+        </p:blipFill>
+        <p:spPr>
+          <a:xfrm>
+            <a:off x="-10659" y="-589"/>
+            <a:ext cx="12212442" cy="6859178"/>
+          </a:xfrm>
+          <a:prstGeom prst="rect">
+            <a:avLst/>
+          </a:prstGeom>
+        </p:spPr>
+      </p:pic>
+    </p:spTree>
+    <p:extLst>
+      <p:ext uri="{BB962C8B-B14F-4D97-AF65-F5344CB8AC3E}">
+        <p14:creationId xmlns:p14="http://schemas.microsoft.com/office/powerpoint/2010/main" val="2776220320"/>
       </p:ext>
     </p:extLst>
   </p:cSld>
@@ -9991,7 +10135,7 @@
         </p:nvSpPr>
         <p:spPr>
           <a:xfrm>
-            <a:off x="92150" y="2972659"/>
+            <a:off x="92146" y="2860871"/>
             <a:ext cx="3104708" cy="3046988"/>
           </a:xfrm>
           <a:prstGeom prst="rect">
@@ -10111,7 +10255,7 @@
         </p:nvSpPr>
         <p:spPr>
           <a:xfrm>
-            <a:off x="3317358" y="3206619"/>
+            <a:off x="3317358" y="3167076"/>
             <a:ext cx="3827717" cy="2434577"/>
           </a:xfrm>
           <a:prstGeom prst="rect">
@@ -10253,7 +10397,7 @@
         </p:nvSpPr>
         <p:spPr>
           <a:xfrm>
-            <a:off x="7265582" y="4132663"/>
+            <a:off x="7265575" y="4023714"/>
             <a:ext cx="4834268" cy="2554545"/>
           </a:xfrm>
           <a:prstGeom prst="rect">
@@ -10712,23 +10856,7 @@
                 <a:ea typeface="Calibri" panose="020F0502020204030204" pitchFamily="34" charset="0"/>
                 <a:cs typeface="Calibri" panose="020F0502020204030204" pitchFamily="34" charset="0"/>
               </a:rPr>
-              <a:t>$10 </a:t>
-            </a:r>
-            <a:r>
-              <a:rPr lang="es-ES" sz="1600" dirty="0" err="1">
-                <a:latin typeface="Calibri" panose="020F0502020204030204" pitchFamily="34" charset="0"/>
-                <a:ea typeface="Calibri" panose="020F0502020204030204" pitchFamily="34" charset="0"/>
-                <a:cs typeface="Calibri" panose="020F0502020204030204" pitchFamily="34" charset="0"/>
-              </a:rPr>
-              <a:t>dolares</a:t>
-            </a:r>
-            <a:r>
-              <a:rPr lang="es-ES" sz="1600" dirty="0">
-                <a:latin typeface="Calibri" panose="020F0502020204030204" pitchFamily="34" charset="0"/>
-                <a:ea typeface="Calibri" panose="020F0502020204030204" pitchFamily="34" charset="0"/>
-                <a:cs typeface="Calibri" panose="020F0502020204030204" pitchFamily="34" charset="0"/>
-              </a:rPr>
-              <a:t>.</a:t>
+              <a:t>$10 dólares.</a:t>
             </a:r>
           </a:p>
           <a:p>

</xml_diff>

<commit_message>
Diagrama de clases - Organizar diapositivas
</commit_message>
<xml_diff>
--- a/PROYECTO FORMATIVO.pptx
+++ b/PROYECTO FORMATIVO.pptx
@@ -7214,8 +7214,8 @@
         </p:nvSpPr>
         <p:spPr>
           <a:xfrm>
-            <a:off x="3548385" y="139758"/>
-            <a:ext cx="5095229" cy="666786"/>
+            <a:off x="7346663" y="1687204"/>
+            <a:ext cx="4845338" cy="666786"/>
           </a:xfrm>
           <a:prstGeom prst="rect">
             <a:avLst/>
@@ -7242,6 +7242,36 @@
           </a:p>
         </p:txBody>
       </p:sp>
+      <p:pic>
+        <p:nvPicPr>
+          <p:cNvPr id="3" name="Imagen 2" descr="Diagrama&#10;&#10;Descripción generada automáticamente">
+            <a:extLst>
+              <a:ext uri="{FF2B5EF4-FFF2-40B4-BE49-F238E27FC236}">
+                <a16:creationId xmlns:a16="http://schemas.microsoft.com/office/drawing/2014/main" id="{F47A5656-144F-C656-4BEA-7D79C5A4E8B8}"/>
+              </a:ext>
+            </a:extLst>
+          </p:cNvPr>
+          <p:cNvPicPr>
+            <a:picLocks noChangeAspect="1"/>
+          </p:cNvPicPr>
+          <p:nvPr/>
+        </p:nvPicPr>
+        <p:blipFill>
+          <a:blip r:embed="rId2"/>
+          <a:stretch>
+            <a:fillRect/>
+          </a:stretch>
+        </p:blipFill>
+        <p:spPr>
+          <a:xfrm>
+            <a:off x="0" y="0"/>
+            <a:ext cx="7456173" cy="6858000"/>
+          </a:xfrm>
+          <a:prstGeom prst="rect">
+            <a:avLst/>
+          </a:prstGeom>
+        </p:spPr>
+      </p:pic>
     </p:spTree>
     <p:extLst>
       <p:ext uri="{BB962C8B-B14F-4D97-AF65-F5344CB8AC3E}">
@@ -8208,8 +8238,8 @@
         </p:blipFill>
         <p:spPr>
           <a:xfrm>
-            <a:off x="1167539" y="1551940"/>
-            <a:ext cx="10214696" cy="3484083"/>
+            <a:off x="0" y="1754703"/>
+            <a:ext cx="12192000" cy="4158512"/>
           </a:xfrm>
           <a:prstGeom prst="rect">
             <a:avLst/>
@@ -8268,8 +8298,8 @@
         </p:blipFill>
         <p:spPr>
           <a:xfrm>
-            <a:off x="757117" y="1787857"/>
-            <a:ext cx="10472716" cy="2951328"/>
+            <a:off x="0" y="1711079"/>
+            <a:ext cx="12192000" cy="3435841"/>
           </a:xfrm>
           <a:prstGeom prst="rect">
             <a:avLst/>

</xml_diff>

<commit_message>
Encuesta - Historias de usuario
</commit_message>
<xml_diff>
--- a/PROYECTO FORMATIVO.pptx
+++ b/PROYECTO FORMATIVO.pptx
@@ -5271,10 +5271,10 @@
       </p:sp>
       <p:pic>
         <p:nvPicPr>
-          <p:cNvPr id="4" name="Imagen 3" descr="Diagrama&#10;&#10;Descripción generada automáticamente">
-            <a:extLst>
-              <a:ext uri="{FF2B5EF4-FFF2-40B4-BE49-F238E27FC236}">
-                <a16:creationId xmlns:a16="http://schemas.microsoft.com/office/drawing/2014/main" id="{978D1420-CD5B-07B0-AC2A-730A77D9173E}"/>
+          <p:cNvPr id="4" name="Imagen 3">
+            <a:extLst>
+              <a:ext uri="{FF2B5EF4-FFF2-40B4-BE49-F238E27FC236}">
+                <a16:creationId xmlns:a16="http://schemas.microsoft.com/office/drawing/2014/main" id="{FFBE1CDB-E22F-9FE7-4C72-44B1DDE9939E}"/>
               </a:ext>
             </a:extLst>
           </p:cNvPr>
@@ -5291,8 +5291,8 @@
         </p:blipFill>
         <p:spPr>
           <a:xfrm>
-            <a:off x="113413" y="0"/>
-            <a:ext cx="5821168" cy="6858000"/>
+            <a:off x="-106162" y="0"/>
+            <a:ext cx="6327628" cy="6858000"/>
           </a:xfrm>
           <a:prstGeom prst="rect">
             <a:avLst/>
@@ -6338,10 +6338,10 @@
       </p:sp>
       <p:pic>
         <p:nvPicPr>
-          <p:cNvPr id="3" name="Imagen 2">
-            <a:extLst>
-              <a:ext uri="{FF2B5EF4-FFF2-40B4-BE49-F238E27FC236}">
-                <a16:creationId xmlns:a16="http://schemas.microsoft.com/office/drawing/2014/main" id="{BE78A64A-7639-8908-5933-5F788C155F9F}"/>
+          <p:cNvPr id="4" name="Imagen 3">
+            <a:extLst>
+              <a:ext uri="{FF2B5EF4-FFF2-40B4-BE49-F238E27FC236}">
+                <a16:creationId xmlns:a16="http://schemas.microsoft.com/office/drawing/2014/main" id="{58DCDC87-7B13-3B41-203B-514B9E3CB76F}"/>
               </a:ext>
             </a:extLst>
           </p:cNvPr>
@@ -6358,8 +6358,8 @@
         </p:blipFill>
         <p:spPr>
           <a:xfrm>
-            <a:off x="1123071" y="629564"/>
-            <a:ext cx="9945858" cy="6228436"/>
+            <a:off x="1143180" y="666975"/>
+            <a:ext cx="9905640" cy="6191025"/>
           </a:xfrm>
           <a:prstGeom prst="rect">
             <a:avLst/>
@@ -6398,10 +6398,10 @@
       </p:grpSpPr>
       <p:pic>
         <p:nvPicPr>
-          <p:cNvPr id="3" name="Imagen 2">
-            <a:extLst>
-              <a:ext uri="{FF2B5EF4-FFF2-40B4-BE49-F238E27FC236}">
-                <a16:creationId xmlns:a16="http://schemas.microsoft.com/office/drawing/2014/main" id="{B6D05E2E-F6F7-3265-9463-A975DAD1F696}"/>
+          <p:cNvPr id="4" name="Imagen 3">
+            <a:extLst>
+              <a:ext uri="{FF2B5EF4-FFF2-40B4-BE49-F238E27FC236}">
+                <a16:creationId xmlns:a16="http://schemas.microsoft.com/office/drawing/2014/main" id="{180FC71E-B77C-6436-161D-407FF47D1B9E}"/>
               </a:ext>
             </a:extLst>
           </p:cNvPr>
@@ -6418,8 +6418,8 @@
         </p:blipFill>
         <p:spPr>
           <a:xfrm>
-            <a:off x="1166784" y="866921"/>
-            <a:ext cx="9858432" cy="5124157"/>
+            <a:off x="792774" y="1060316"/>
+            <a:ext cx="10606452" cy="5243806"/>
           </a:xfrm>
           <a:prstGeom prst="rect">
             <a:avLst/>
@@ -6498,36 +6498,6 @@
           </a:p>
         </p:txBody>
       </p:sp>
-      <p:pic>
-        <p:nvPicPr>
-          <p:cNvPr id="3" name="Imagen 2">
-            <a:extLst>
-              <a:ext uri="{FF2B5EF4-FFF2-40B4-BE49-F238E27FC236}">
-                <a16:creationId xmlns:a16="http://schemas.microsoft.com/office/drawing/2014/main" id="{D8B262FA-29F3-F30B-F3DE-5DB64C42C194}"/>
-              </a:ext>
-            </a:extLst>
-          </p:cNvPr>
-          <p:cNvPicPr>
-            <a:picLocks noChangeAspect="1"/>
-          </p:cNvPicPr>
-          <p:nvPr/>
-        </p:nvPicPr>
-        <p:blipFill>
-          <a:blip r:embed="rId2"/>
-          <a:stretch>
-            <a:fillRect/>
-          </a:stretch>
-        </p:blipFill>
-        <p:spPr>
-          <a:xfrm>
-            <a:off x="0" y="1589348"/>
-            <a:ext cx="12197578" cy="3679304"/>
-          </a:xfrm>
-          <a:prstGeom prst="rect">
-            <a:avLst/>
-          </a:prstGeom>
-        </p:spPr>
-      </p:pic>
     </p:spTree>
     <p:extLst>
       <p:ext uri="{BB962C8B-B14F-4D97-AF65-F5344CB8AC3E}">

</xml_diff>

<commit_message>
Documentacion - Mas informacion de un servicio
</commit_message>
<xml_diff>
--- a/PROYECTO FORMATIVO.pptx
+++ b/PROYECTO FORMATIVO.pptx
@@ -5,7 +5,7 @@
     <p:sldMasterId id="2147483648" r:id="rId1"/>
   </p:sldMasterIdLst>
   <p:notesMasterIdLst>
-    <p:notesMasterId r:id="rId39"/>
+    <p:notesMasterId r:id="rId37"/>
   </p:notesMasterIdLst>
   <p:sldIdLst>
     <p:sldId id="468" r:id="rId2"/>
@@ -26,25 +26,23 @@
     <p:sldId id="472" r:id="rId17"/>
     <p:sldId id="473" r:id="rId18"/>
     <p:sldId id="474" r:id="rId19"/>
-    <p:sldId id="475" r:id="rId20"/>
-    <p:sldId id="298" r:id="rId21"/>
-    <p:sldId id="301" r:id="rId22"/>
-    <p:sldId id="299" r:id="rId23"/>
-    <p:sldId id="476" r:id="rId24"/>
-    <p:sldId id="477" r:id="rId25"/>
-    <p:sldId id="284" r:id="rId26"/>
-    <p:sldId id="296" r:id="rId27"/>
-    <p:sldId id="297" r:id="rId28"/>
-    <p:sldId id="300" r:id="rId29"/>
-    <p:sldId id="286" r:id="rId30"/>
-    <p:sldId id="287" r:id="rId31"/>
-    <p:sldId id="288" r:id="rId32"/>
-    <p:sldId id="289" r:id="rId33"/>
-    <p:sldId id="277" r:id="rId34"/>
-    <p:sldId id="470" r:id="rId35"/>
-    <p:sldId id="274" r:id="rId36"/>
-    <p:sldId id="278" r:id="rId37"/>
-    <p:sldId id="264" r:id="rId38"/>
+    <p:sldId id="298" r:id="rId20"/>
+    <p:sldId id="301" r:id="rId21"/>
+    <p:sldId id="299" r:id="rId22"/>
+    <p:sldId id="476" r:id="rId23"/>
+    <p:sldId id="477" r:id="rId24"/>
+    <p:sldId id="284" r:id="rId25"/>
+    <p:sldId id="296" r:id="rId26"/>
+    <p:sldId id="297" r:id="rId27"/>
+    <p:sldId id="300" r:id="rId28"/>
+    <p:sldId id="286" r:id="rId29"/>
+    <p:sldId id="287" r:id="rId30"/>
+    <p:sldId id="288" r:id="rId31"/>
+    <p:sldId id="289" r:id="rId32"/>
+    <p:sldId id="470" r:id="rId33"/>
+    <p:sldId id="274" r:id="rId34"/>
+    <p:sldId id="278" r:id="rId35"/>
+    <p:sldId id="264" r:id="rId36"/>
   </p:sldIdLst>
   <p:sldSz cx="12192000" cy="6858000"/>
   <p:notesSz cx="6858000" cy="9144000"/>
@@ -233,7 +231,7 @@
           <a:p>
             <a:fld id="{9660CB96-A603-FF42-AE46-F5F75F80A67B}" type="datetimeFigureOut">
               <a:rPr lang="es-CO" smtClean="0"/>
-              <a:t>18/11/2022</a:t>
+              <a:t>21/11/2022</a:t>
             </a:fld>
             <a:endParaRPr lang="es-CO"/>
           </a:p>
@@ -734,7 +732,7 @@
           <a:p>
             <a:fld id="{AB98DA6D-12AC-4BA1-8782-249E1E9419F8}" type="slidenum">
               <a:rPr lang="es-CO" smtClean="0"/>
-              <a:t>29</a:t>
+              <a:t>28</a:t>
             </a:fld>
             <a:endParaRPr lang="es-CO"/>
           </a:p>
@@ -818,7 +816,7 @@
           <a:p>
             <a:fld id="{AB98DA6D-12AC-4BA1-8782-249E1E9419F8}" type="slidenum">
               <a:rPr lang="es-CO" smtClean="0"/>
-              <a:t>35</a:t>
+              <a:t>33</a:t>
             </a:fld>
             <a:endParaRPr lang="es-CO"/>
           </a:p>
@@ -986,7 +984,7 @@
           <a:p>
             <a:fld id="{BD986248-06F7-A441-A47A-264EBD310E11}" type="datetimeFigureOut">
               <a:rPr lang="es-CO" smtClean="0"/>
-              <a:t>18/11/2022</a:t>
+              <a:t>21/11/2022</a:t>
             </a:fld>
             <a:endParaRPr lang="es-CO"/>
           </a:p>
@@ -1186,7 +1184,7 @@
           <a:p>
             <a:fld id="{BD986248-06F7-A441-A47A-264EBD310E11}" type="datetimeFigureOut">
               <a:rPr lang="es-CO" smtClean="0"/>
-              <a:t>18/11/2022</a:t>
+              <a:t>21/11/2022</a:t>
             </a:fld>
             <a:endParaRPr lang="es-CO"/>
           </a:p>
@@ -1396,7 +1394,7 @@
           <a:p>
             <a:fld id="{BD986248-06F7-A441-A47A-264EBD310E11}" type="datetimeFigureOut">
               <a:rPr lang="es-CO" smtClean="0"/>
-              <a:t>18/11/2022</a:t>
+              <a:t>21/11/2022</a:t>
             </a:fld>
             <a:endParaRPr lang="es-CO"/>
           </a:p>
@@ -2004,7 +2002,7 @@
           <a:p>
             <a:fld id="{BD986248-06F7-A441-A47A-264EBD310E11}" type="datetimeFigureOut">
               <a:rPr lang="es-CO" smtClean="0"/>
-              <a:t>18/11/2022</a:t>
+              <a:t>21/11/2022</a:t>
             </a:fld>
             <a:endParaRPr lang="es-CO"/>
           </a:p>
@@ -2280,7 +2278,7 @@
           <a:p>
             <a:fld id="{BD986248-06F7-A441-A47A-264EBD310E11}" type="datetimeFigureOut">
               <a:rPr lang="es-CO" smtClean="0"/>
-              <a:t>18/11/2022</a:t>
+              <a:t>21/11/2022</a:t>
             </a:fld>
             <a:endParaRPr lang="es-CO"/>
           </a:p>
@@ -2548,7 +2546,7 @@
           <a:p>
             <a:fld id="{BD986248-06F7-A441-A47A-264EBD310E11}" type="datetimeFigureOut">
               <a:rPr lang="es-CO" smtClean="0"/>
-              <a:t>18/11/2022</a:t>
+              <a:t>21/11/2022</a:t>
             </a:fld>
             <a:endParaRPr lang="es-CO"/>
           </a:p>
@@ -2963,7 +2961,7 @@
           <a:p>
             <a:fld id="{BD986248-06F7-A441-A47A-264EBD310E11}" type="datetimeFigureOut">
               <a:rPr lang="es-CO" smtClean="0"/>
-              <a:t>18/11/2022</a:t>
+              <a:t>21/11/2022</a:t>
             </a:fld>
             <a:endParaRPr lang="es-CO"/>
           </a:p>
@@ -3105,7 +3103,7 @@
           <a:p>
             <a:fld id="{BD986248-06F7-A441-A47A-264EBD310E11}" type="datetimeFigureOut">
               <a:rPr lang="es-CO" smtClean="0"/>
-              <a:t>18/11/2022</a:t>
+              <a:t>21/11/2022</a:t>
             </a:fld>
             <a:endParaRPr lang="es-CO"/>
           </a:p>
@@ -3218,7 +3216,7 @@
           <a:p>
             <a:fld id="{BD986248-06F7-A441-A47A-264EBD310E11}" type="datetimeFigureOut">
               <a:rPr lang="es-CO" smtClean="0"/>
-              <a:t>18/11/2022</a:t>
+              <a:t>21/11/2022</a:t>
             </a:fld>
             <a:endParaRPr lang="es-CO"/>
           </a:p>
@@ -3531,7 +3529,7 @@
           <a:p>
             <a:fld id="{BD986248-06F7-A441-A47A-264EBD310E11}" type="datetimeFigureOut">
               <a:rPr lang="es-CO" smtClean="0"/>
-              <a:t>18/11/2022</a:t>
+              <a:t>21/11/2022</a:t>
             </a:fld>
             <a:endParaRPr lang="es-CO"/>
           </a:p>
@@ -3820,7 +3818,7 @@
           <a:p>
             <a:fld id="{BD986248-06F7-A441-A47A-264EBD310E11}" type="datetimeFigureOut">
               <a:rPr lang="es-CO" smtClean="0"/>
-              <a:t>18/11/2022</a:t>
+              <a:t>21/11/2022</a:t>
             </a:fld>
             <a:endParaRPr lang="es-CO"/>
           </a:p>
@@ -4063,7 +4061,7 @@
           <a:p>
             <a:fld id="{BD986248-06F7-A441-A47A-264EBD310E11}" type="datetimeFigureOut">
               <a:rPr lang="es-CO" smtClean="0"/>
-              <a:t>18/11/2022</a:t>
+              <a:t>21/11/2022</a:t>
             </a:fld>
             <a:endParaRPr lang="es-CO"/>
           </a:p>
@@ -5896,7 +5894,7 @@
         </p:blipFill>
         <p:spPr>
           <a:xfrm>
-            <a:off x="2920031" y="211540"/>
+            <a:off x="314325" y="281878"/>
             <a:ext cx="5781675" cy="2286000"/>
           </a:xfrm>
           <a:prstGeom prst="rect">
@@ -5926,7 +5924,7 @@
         </p:blipFill>
         <p:spPr>
           <a:xfrm>
-            <a:off x="657843" y="3678072"/>
+            <a:off x="6188265" y="3678072"/>
             <a:ext cx="5153025" cy="1495425"/>
           </a:xfrm>
           <a:prstGeom prst="rect">
@@ -5956,7 +5954,7 @@
         </p:blipFill>
         <p:spPr>
           <a:xfrm>
-            <a:off x="6381134" y="3429000"/>
+            <a:off x="6662488" y="446650"/>
             <a:ext cx="4400505" cy="1406248"/>
           </a:xfrm>
           <a:prstGeom prst="rect">
@@ -5964,6 +5962,74 @@
           </a:prstGeom>
         </p:spPr>
       </p:pic>
+      <p:pic>
+        <p:nvPicPr>
+          <p:cNvPr id="3" name="Imagen 2">
+            <a:extLst>
+              <a:ext uri="{FF2B5EF4-FFF2-40B4-BE49-F238E27FC236}">
+                <a16:creationId xmlns:a16="http://schemas.microsoft.com/office/drawing/2014/main" id="{35929DA0-03A4-E8BC-D8F6-6118F79D9DD1}"/>
+              </a:ext>
+            </a:extLst>
+          </p:cNvPr>
+          <p:cNvPicPr>
+            <a:picLocks noChangeAspect="1"/>
+          </p:cNvPicPr>
+          <p:nvPr/>
+        </p:nvPicPr>
+        <p:blipFill>
+          <a:blip r:embed="rId5"/>
+          <a:stretch>
+            <a:fillRect/>
+          </a:stretch>
+        </p:blipFill>
+        <p:spPr>
+          <a:xfrm>
+            <a:off x="314325" y="3636157"/>
+            <a:ext cx="4919839" cy="1841474"/>
+          </a:xfrm>
+          <a:prstGeom prst="rect">
+            <a:avLst/>
+          </a:prstGeom>
+        </p:spPr>
+      </p:pic>
+      <p:cxnSp>
+        <p:nvCxnSpPr>
+          <p:cNvPr id="6" name="Conector recto 5">
+            <a:extLst>
+              <a:ext uri="{FF2B5EF4-FFF2-40B4-BE49-F238E27FC236}">
+                <a16:creationId xmlns:a16="http://schemas.microsoft.com/office/drawing/2014/main" id="{D9395532-17BA-8F2C-F3B9-5088DC7708E1}"/>
+              </a:ext>
+            </a:extLst>
+          </p:cNvPr>
+          <p:cNvCxnSpPr>
+            <a:cxnSpLocks/>
+          </p:cNvCxnSpPr>
+          <p:nvPr/>
+        </p:nvCxnSpPr>
+        <p:spPr>
+          <a:xfrm>
+            <a:off x="5770273" y="3179928"/>
+            <a:ext cx="0" cy="3138985"/>
+          </a:xfrm>
+          <a:prstGeom prst="line">
+            <a:avLst/>
+          </a:prstGeom>
+        </p:spPr>
+        <p:style>
+          <a:lnRef idx="1">
+            <a:schemeClr val="dk1"/>
+          </a:lnRef>
+          <a:fillRef idx="0">
+            <a:schemeClr val="dk1"/>
+          </a:fillRef>
+          <a:effectRef idx="0">
+            <a:schemeClr val="dk1"/>
+          </a:effectRef>
+          <a:fontRef idx="minor">
+            <a:schemeClr val="tx1"/>
+          </a:fontRef>
+        </p:style>
+      </p:cxnSp>
     </p:spTree>
     <p:extLst>
       <p:ext uri="{BB962C8B-B14F-4D97-AF65-F5344CB8AC3E}">
@@ -5994,12 +6060,54 @@
           <a:chExt cx="0" cy="0"/>
         </a:xfrm>
       </p:grpSpPr>
+      <p:sp>
+        <p:nvSpPr>
+          <p:cNvPr id="5" name="CuadroTexto 4">
+            <a:extLst>
+              <a:ext uri="{FF2B5EF4-FFF2-40B4-BE49-F238E27FC236}">
+                <a16:creationId xmlns:a16="http://schemas.microsoft.com/office/drawing/2014/main" id="{1BE7FA7E-C3EC-4186-AFBD-5BB81C7A131D}"/>
+              </a:ext>
+            </a:extLst>
+          </p:cNvPr>
+          <p:cNvSpPr txBox="1"/>
+          <p:nvPr/>
+        </p:nvSpPr>
+        <p:spPr>
+          <a:xfrm>
+            <a:off x="1811074" y="88112"/>
+            <a:ext cx="8569853" cy="666786"/>
+          </a:xfrm>
+          <a:prstGeom prst="rect">
+            <a:avLst/>
+          </a:prstGeom>
+          <a:noFill/>
+        </p:spPr>
+        <p:txBody>
+          <a:bodyPr wrap="square" rtlCol="0">
+            <a:spAutoFit/>
+          </a:bodyPr>
+          <a:lstStyle/>
+          <a:p>
+            <a:pPr algn="ctr"/>
+            <a:r>
+              <a:rPr lang="es-ES" sz="3733" b="1" dirty="0">
+                <a:solidFill>
+                  <a:srgbClr val="FF6C00"/>
+                </a:solidFill>
+                <a:latin typeface="Calibri" panose="020F0502020204030204" pitchFamily="34" charset="0"/>
+                <a:cs typeface="Calibri" panose="020F0502020204030204" pitchFamily="34" charset="0"/>
+              </a:rPr>
+              <a:t>Guiones de casos de uso</a:t>
+            </a:r>
+          </a:p>
+        </p:txBody>
+      </p:sp>
       <p:pic>
         <p:nvPicPr>
-          <p:cNvPr id="11" name="Imagen 10">
-            <a:extLst>
-              <a:ext uri="{FF2B5EF4-FFF2-40B4-BE49-F238E27FC236}">
-                <a16:creationId xmlns:a16="http://schemas.microsoft.com/office/drawing/2014/main" id="{1088D8E4-1346-87C2-5DF9-940F2F4594F1}"/>
+          <p:cNvPr id="4" name="Imagen 3">
+            <a:extLst>
+              <a:ext uri="{FF2B5EF4-FFF2-40B4-BE49-F238E27FC236}">
+                <a16:creationId xmlns:a16="http://schemas.microsoft.com/office/drawing/2014/main" id="{58DCDC87-7B13-3B41-203B-514B9E3CB76F}"/>
               </a:ext>
             </a:extLst>
           </p:cNvPr>
@@ -6016,8 +6124,8 @@
         </p:blipFill>
         <p:spPr>
           <a:xfrm>
-            <a:off x="2659633" y="1619178"/>
-            <a:ext cx="6564574" cy="2457091"/>
+            <a:off x="1143180" y="666975"/>
+            <a:ext cx="9905640" cy="6191025"/>
           </a:xfrm>
           <a:prstGeom prst="rect">
             <a:avLst/>
@@ -6027,7 +6135,7 @@
     </p:spTree>
     <p:extLst>
       <p:ext uri="{BB962C8B-B14F-4D97-AF65-F5344CB8AC3E}">
-        <p14:creationId xmlns:p14="http://schemas.microsoft.com/office/powerpoint/2010/main" val="4145250102"/>
+        <p14:creationId xmlns:p14="http://schemas.microsoft.com/office/powerpoint/2010/main" val="272382116"/>
       </p:ext>
     </p:extLst>
   </p:cSld>
@@ -6251,54 +6359,12 @@
           <a:chExt cx="0" cy="0"/>
         </a:xfrm>
       </p:grpSpPr>
-      <p:sp>
-        <p:nvSpPr>
-          <p:cNvPr id="5" name="CuadroTexto 4">
-            <a:extLst>
-              <a:ext uri="{FF2B5EF4-FFF2-40B4-BE49-F238E27FC236}">
-                <a16:creationId xmlns:a16="http://schemas.microsoft.com/office/drawing/2014/main" id="{1BE7FA7E-C3EC-4186-AFBD-5BB81C7A131D}"/>
-              </a:ext>
-            </a:extLst>
-          </p:cNvPr>
-          <p:cNvSpPr txBox="1"/>
-          <p:nvPr/>
-        </p:nvSpPr>
-        <p:spPr>
-          <a:xfrm>
-            <a:off x="1811074" y="88112"/>
-            <a:ext cx="8569853" cy="666786"/>
-          </a:xfrm>
-          <a:prstGeom prst="rect">
-            <a:avLst/>
-          </a:prstGeom>
-          <a:noFill/>
-        </p:spPr>
-        <p:txBody>
-          <a:bodyPr wrap="square" rtlCol="0">
-            <a:spAutoFit/>
-          </a:bodyPr>
-          <a:lstStyle/>
-          <a:p>
-            <a:pPr algn="ctr"/>
-            <a:r>
-              <a:rPr lang="es-ES" sz="3733" b="1" dirty="0">
-                <a:solidFill>
-                  <a:srgbClr val="FF6C00"/>
-                </a:solidFill>
-                <a:latin typeface="Calibri" panose="020F0502020204030204" pitchFamily="34" charset="0"/>
-                <a:cs typeface="Calibri" panose="020F0502020204030204" pitchFamily="34" charset="0"/>
-              </a:rPr>
-              <a:t>Guiones de casos de uso</a:t>
-            </a:r>
-          </a:p>
-        </p:txBody>
-      </p:sp>
       <p:pic>
         <p:nvPicPr>
           <p:cNvPr id="4" name="Imagen 3">
             <a:extLst>
               <a:ext uri="{FF2B5EF4-FFF2-40B4-BE49-F238E27FC236}">
-                <a16:creationId xmlns:a16="http://schemas.microsoft.com/office/drawing/2014/main" id="{58DCDC87-7B13-3B41-203B-514B9E3CB76F}"/>
+                <a16:creationId xmlns:a16="http://schemas.microsoft.com/office/drawing/2014/main" id="{180FC71E-B77C-6436-161D-407FF47D1B9E}"/>
               </a:ext>
             </a:extLst>
           </p:cNvPr>
@@ -6315,8 +6381,8 @@
         </p:blipFill>
         <p:spPr>
           <a:xfrm>
-            <a:off x="1143180" y="666975"/>
-            <a:ext cx="9905640" cy="6191025"/>
+            <a:off x="792774" y="1060316"/>
+            <a:ext cx="10606452" cy="5243806"/>
           </a:xfrm>
           <a:prstGeom prst="rect">
             <a:avLst/>
@@ -6326,7 +6392,7 @@
     </p:spTree>
     <p:extLst>
       <p:ext uri="{BB962C8B-B14F-4D97-AF65-F5344CB8AC3E}">
-        <p14:creationId xmlns:p14="http://schemas.microsoft.com/office/powerpoint/2010/main" val="272382116"/>
+        <p14:creationId xmlns:p14="http://schemas.microsoft.com/office/powerpoint/2010/main" val="1122807157"/>
       </p:ext>
     </p:extLst>
   </p:cSld>
@@ -6353,12 +6419,54 @@
           <a:chExt cx="0" cy="0"/>
         </a:xfrm>
       </p:grpSpPr>
+      <p:sp>
+        <p:nvSpPr>
+          <p:cNvPr id="5" name="CuadroTexto 4">
+            <a:extLst>
+              <a:ext uri="{FF2B5EF4-FFF2-40B4-BE49-F238E27FC236}">
+                <a16:creationId xmlns:a16="http://schemas.microsoft.com/office/drawing/2014/main" id="{1BE7FA7E-C3EC-4186-AFBD-5BB81C7A131D}"/>
+              </a:ext>
+            </a:extLst>
+          </p:cNvPr>
+          <p:cNvSpPr txBox="1"/>
+          <p:nvPr/>
+        </p:nvSpPr>
+        <p:spPr>
+          <a:xfrm>
+            <a:off x="1811074" y="436925"/>
+            <a:ext cx="8569853" cy="666786"/>
+          </a:xfrm>
+          <a:prstGeom prst="rect">
+            <a:avLst/>
+          </a:prstGeom>
+          <a:noFill/>
+        </p:spPr>
+        <p:txBody>
+          <a:bodyPr wrap="square" rtlCol="0">
+            <a:spAutoFit/>
+          </a:bodyPr>
+          <a:lstStyle/>
+          <a:p>
+            <a:pPr algn="ctr"/>
+            <a:r>
+              <a:rPr lang="es-ES" sz="3733" b="1" dirty="0">
+                <a:solidFill>
+                  <a:srgbClr val="FF6C00"/>
+                </a:solidFill>
+                <a:latin typeface="Calibri" panose="020F0502020204030204" pitchFamily="34" charset="0"/>
+                <a:cs typeface="Calibri" panose="020F0502020204030204" pitchFamily="34" charset="0"/>
+              </a:rPr>
+              <a:t>Historias de usuario</a:t>
+            </a:r>
+          </a:p>
+        </p:txBody>
+      </p:sp>
       <p:pic>
         <p:nvPicPr>
-          <p:cNvPr id="4" name="Imagen 3">
-            <a:extLst>
-              <a:ext uri="{FF2B5EF4-FFF2-40B4-BE49-F238E27FC236}">
-                <a16:creationId xmlns:a16="http://schemas.microsoft.com/office/drawing/2014/main" id="{180FC71E-B77C-6436-161D-407FF47D1B9E}"/>
+          <p:cNvPr id="3" name="Imagen 2">
+            <a:extLst>
+              <a:ext uri="{FF2B5EF4-FFF2-40B4-BE49-F238E27FC236}">
+                <a16:creationId xmlns:a16="http://schemas.microsoft.com/office/drawing/2014/main" id="{91E43095-B1D3-D4C2-7F2B-E39ABEE8DC01}"/>
               </a:ext>
             </a:extLst>
           </p:cNvPr>
@@ -6375,8 +6483,68 @@
         </p:blipFill>
         <p:spPr>
           <a:xfrm>
-            <a:off x="792774" y="1060316"/>
-            <a:ext cx="10606452" cy="5243806"/>
+            <a:off x="333008" y="1776412"/>
+            <a:ext cx="3648075" cy="3305175"/>
+          </a:xfrm>
+          <a:prstGeom prst="rect">
+            <a:avLst/>
+          </a:prstGeom>
+        </p:spPr>
+      </p:pic>
+      <p:pic>
+        <p:nvPicPr>
+          <p:cNvPr id="6" name="Imagen 5">
+            <a:extLst>
+              <a:ext uri="{FF2B5EF4-FFF2-40B4-BE49-F238E27FC236}">
+                <a16:creationId xmlns:a16="http://schemas.microsoft.com/office/drawing/2014/main" id="{25D2FD95-AC27-6C7F-4052-9436A1CFFDFF}"/>
+              </a:ext>
+            </a:extLst>
+          </p:cNvPr>
+          <p:cNvPicPr>
+            <a:picLocks noChangeAspect="1"/>
+          </p:cNvPicPr>
+          <p:nvPr/>
+        </p:nvPicPr>
+        <p:blipFill>
+          <a:blip r:embed="rId3"/>
+          <a:stretch>
+            <a:fillRect/>
+          </a:stretch>
+        </p:blipFill>
+        <p:spPr>
+          <a:xfrm>
+            <a:off x="4117217" y="1776412"/>
+            <a:ext cx="3648075" cy="3257550"/>
+          </a:xfrm>
+          <a:prstGeom prst="rect">
+            <a:avLst/>
+          </a:prstGeom>
+        </p:spPr>
+      </p:pic>
+      <p:pic>
+        <p:nvPicPr>
+          <p:cNvPr id="8" name="Imagen 7">
+            <a:extLst>
+              <a:ext uri="{FF2B5EF4-FFF2-40B4-BE49-F238E27FC236}">
+                <a16:creationId xmlns:a16="http://schemas.microsoft.com/office/drawing/2014/main" id="{F1D95CAE-41C2-B9BC-AFA6-82B67BCFDF03}"/>
+              </a:ext>
+            </a:extLst>
+          </p:cNvPr>
+          <p:cNvPicPr>
+            <a:picLocks noChangeAspect="1"/>
+          </p:cNvPicPr>
+          <p:nvPr/>
+        </p:nvPicPr>
+        <p:blipFill>
+          <a:blip r:embed="rId4"/>
+          <a:stretch>
+            <a:fillRect/>
+          </a:stretch>
+        </p:blipFill>
+        <p:spPr>
+          <a:xfrm>
+            <a:off x="7901426" y="1785937"/>
+            <a:ext cx="3657600" cy="3295650"/>
           </a:xfrm>
           <a:prstGeom prst="rect">
             <a:avLst/>
@@ -6386,7 +6554,7 @@
     </p:spTree>
     <p:extLst>
       <p:ext uri="{BB962C8B-B14F-4D97-AF65-F5344CB8AC3E}">
-        <p14:creationId xmlns:p14="http://schemas.microsoft.com/office/powerpoint/2010/main" val="1122807157"/>
+        <p14:creationId xmlns:p14="http://schemas.microsoft.com/office/powerpoint/2010/main" val="1203761740"/>
       </p:ext>
     </p:extLst>
   </p:cSld>
@@ -6457,10 +6625,10 @@
       </p:sp>
       <p:pic>
         <p:nvPicPr>
-          <p:cNvPr id="3" name="Imagen 2">
-            <a:extLst>
-              <a:ext uri="{FF2B5EF4-FFF2-40B4-BE49-F238E27FC236}">
-                <a16:creationId xmlns:a16="http://schemas.microsoft.com/office/drawing/2014/main" id="{91E43095-B1D3-D4C2-7F2B-E39ABEE8DC01}"/>
+          <p:cNvPr id="4" name="Imagen 3">
+            <a:extLst>
+              <a:ext uri="{FF2B5EF4-FFF2-40B4-BE49-F238E27FC236}">
+                <a16:creationId xmlns:a16="http://schemas.microsoft.com/office/drawing/2014/main" id="{90E791EB-5027-58C9-5CAE-363ACA68635F}"/>
               </a:ext>
             </a:extLst>
           </p:cNvPr>
@@ -6477,8 +6645,8 @@
         </p:blipFill>
         <p:spPr>
           <a:xfrm>
-            <a:off x="333008" y="1776412"/>
-            <a:ext cx="3648075" cy="3305175"/>
+            <a:off x="412871" y="1804987"/>
+            <a:ext cx="3629025" cy="3248025"/>
           </a:xfrm>
           <a:prstGeom prst="rect">
             <a:avLst/>
@@ -6487,10 +6655,10 @@
       </p:pic>
       <p:pic>
         <p:nvPicPr>
-          <p:cNvPr id="6" name="Imagen 5">
-            <a:extLst>
-              <a:ext uri="{FF2B5EF4-FFF2-40B4-BE49-F238E27FC236}">
-                <a16:creationId xmlns:a16="http://schemas.microsoft.com/office/drawing/2014/main" id="{25D2FD95-AC27-6C7F-4052-9436A1CFFDFF}"/>
+          <p:cNvPr id="11" name="Imagen 10">
+            <a:extLst>
+              <a:ext uri="{FF2B5EF4-FFF2-40B4-BE49-F238E27FC236}">
+                <a16:creationId xmlns:a16="http://schemas.microsoft.com/office/drawing/2014/main" id="{D5095B3B-36E3-94EA-1AD4-A7CBEA0964C1}"/>
               </a:ext>
             </a:extLst>
           </p:cNvPr>
@@ -6507,8 +6675,8 @@
         </p:blipFill>
         <p:spPr>
           <a:xfrm>
-            <a:off x="4117217" y="1776412"/>
-            <a:ext cx="3648075" cy="3257550"/>
+            <a:off x="4281487" y="1790699"/>
+            <a:ext cx="3629025" cy="3276600"/>
           </a:xfrm>
           <a:prstGeom prst="rect">
             <a:avLst/>
@@ -6517,10 +6685,10 @@
       </p:pic>
       <p:pic>
         <p:nvPicPr>
-          <p:cNvPr id="8" name="Imagen 7">
-            <a:extLst>
-              <a:ext uri="{FF2B5EF4-FFF2-40B4-BE49-F238E27FC236}">
-                <a16:creationId xmlns:a16="http://schemas.microsoft.com/office/drawing/2014/main" id="{F1D95CAE-41C2-B9BC-AFA6-82B67BCFDF03}"/>
+          <p:cNvPr id="13" name="Imagen 12">
+            <a:extLst>
+              <a:ext uri="{FF2B5EF4-FFF2-40B4-BE49-F238E27FC236}">
+                <a16:creationId xmlns:a16="http://schemas.microsoft.com/office/drawing/2014/main" id="{C6FFDE6B-8D85-00E8-00BD-CE456CEC1995}"/>
               </a:ext>
             </a:extLst>
           </p:cNvPr>
@@ -6537,8 +6705,8 @@
         </p:blipFill>
         <p:spPr>
           <a:xfrm>
-            <a:off x="7901426" y="1785937"/>
-            <a:ext cx="3657600" cy="3295650"/>
+            <a:off x="8150103" y="1804987"/>
+            <a:ext cx="3638550" cy="3276600"/>
           </a:xfrm>
           <a:prstGeom prst="rect">
             <a:avLst/>
@@ -6548,7 +6716,7 @@
     </p:spTree>
     <p:extLst>
       <p:ext uri="{BB962C8B-B14F-4D97-AF65-F5344CB8AC3E}">
-        <p14:creationId xmlns:p14="http://schemas.microsoft.com/office/powerpoint/2010/main" val="1203761740"/>
+        <p14:creationId xmlns:p14="http://schemas.microsoft.com/office/powerpoint/2010/main" val="1679267791"/>
       </p:ext>
     </p:extLst>
   </p:cSld>
@@ -6619,10 +6787,10 @@
       </p:sp>
       <p:pic>
         <p:nvPicPr>
-          <p:cNvPr id="4" name="Imagen 3">
-            <a:extLst>
-              <a:ext uri="{FF2B5EF4-FFF2-40B4-BE49-F238E27FC236}">
-                <a16:creationId xmlns:a16="http://schemas.microsoft.com/office/drawing/2014/main" id="{90E791EB-5027-58C9-5CAE-363ACA68635F}"/>
+          <p:cNvPr id="3" name="Imagen 2">
+            <a:extLst>
+              <a:ext uri="{FF2B5EF4-FFF2-40B4-BE49-F238E27FC236}">
+                <a16:creationId xmlns:a16="http://schemas.microsoft.com/office/drawing/2014/main" id="{DD4910DA-CA74-5376-D00C-AE98A077DFF0}"/>
               </a:ext>
             </a:extLst>
           </p:cNvPr>
@@ -6639,8 +6807,8 @@
         </p:blipFill>
         <p:spPr>
           <a:xfrm>
-            <a:off x="412871" y="1804987"/>
-            <a:ext cx="3629025" cy="3248025"/>
+            <a:off x="2194707" y="1692226"/>
+            <a:ext cx="3638550" cy="3276600"/>
           </a:xfrm>
           <a:prstGeom prst="rect">
             <a:avLst/>
@@ -6649,10 +6817,10 @@
       </p:pic>
       <p:pic>
         <p:nvPicPr>
-          <p:cNvPr id="11" name="Imagen 10">
-            <a:extLst>
-              <a:ext uri="{FF2B5EF4-FFF2-40B4-BE49-F238E27FC236}">
-                <a16:creationId xmlns:a16="http://schemas.microsoft.com/office/drawing/2014/main" id="{D5095B3B-36E3-94EA-1AD4-A7CBEA0964C1}"/>
+          <p:cNvPr id="7" name="Imagen 6">
+            <a:extLst>
+              <a:ext uri="{FF2B5EF4-FFF2-40B4-BE49-F238E27FC236}">
+                <a16:creationId xmlns:a16="http://schemas.microsoft.com/office/drawing/2014/main" id="{22570AF0-8334-3F4A-935E-E61CEDA98395}"/>
               </a:ext>
             </a:extLst>
           </p:cNvPr>
@@ -6669,37 +6837,7 @@
         </p:blipFill>
         <p:spPr>
           <a:xfrm>
-            <a:off x="4281487" y="1790699"/>
-            <a:ext cx="3629025" cy="3276600"/>
-          </a:xfrm>
-          <a:prstGeom prst="rect">
-            <a:avLst/>
-          </a:prstGeom>
-        </p:spPr>
-      </p:pic>
-      <p:pic>
-        <p:nvPicPr>
-          <p:cNvPr id="13" name="Imagen 12">
-            <a:extLst>
-              <a:ext uri="{FF2B5EF4-FFF2-40B4-BE49-F238E27FC236}">
-                <a16:creationId xmlns:a16="http://schemas.microsoft.com/office/drawing/2014/main" id="{C6FFDE6B-8D85-00E8-00BD-CE456CEC1995}"/>
-              </a:ext>
-            </a:extLst>
-          </p:cNvPr>
-          <p:cNvPicPr>
-            <a:picLocks noChangeAspect="1"/>
-          </p:cNvPicPr>
-          <p:nvPr/>
-        </p:nvPicPr>
-        <p:blipFill>
-          <a:blip r:embed="rId4"/>
-          <a:stretch>
-            <a:fillRect/>
-          </a:stretch>
-        </p:blipFill>
-        <p:spPr>
-          <a:xfrm>
-            <a:off x="8150103" y="1804987"/>
+            <a:off x="6358745" y="1692226"/>
             <a:ext cx="3638550" cy="3276600"/>
           </a:xfrm>
           <a:prstGeom prst="rect">
@@ -6710,7 +6848,7 @@
     </p:spTree>
     <p:extLst>
       <p:ext uri="{BB962C8B-B14F-4D97-AF65-F5344CB8AC3E}">
-        <p14:creationId xmlns:p14="http://schemas.microsoft.com/office/powerpoint/2010/main" val="1679267791"/>
+        <p14:creationId xmlns:p14="http://schemas.microsoft.com/office/powerpoint/2010/main" val="1268355955"/>
       </p:ext>
     </p:extLst>
   </p:cSld>
@@ -6751,8 +6889,8 @@
         </p:nvSpPr>
         <p:spPr>
           <a:xfrm>
-            <a:off x="1811074" y="436925"/>
-            <a:ext cx="8569853" cy="666786"/>
+            <a:off x="5358793" y="1341416"/>
+            <a:ext cx="6195235" cy="1241237"/>
           </a:xfrm>
           <a:prstGeom prst="rect">
             <a:avLst/>
@@ -6774,7 +6912,20 @@
                 <a:latin typeface="Calibri" panose="020F0502020204030204" pitchFamily="34" charset="0"/>
                 <a:cs typeface="Calibri" panose="020F0502020204030204" pitchFamily="34" charset="0"/>
               </a:rPr>
-              <a:t>Historias de usuario</a:t>
+              <a:t>Diagrama de actividades</a:t>
+            </a:r>
+          </a:p>
+          <a:p>
+            <a:pPr algn="ctr"/>
+            <a:r>
+              <a:rPr lang="es-ES" sz="3733" b="1" dirty="0">
+                <a:solidFill>
+                  <a:srgbClr val="FF6C00"/>
+                </a:solidFill>
+                <a:latin typeface="Calibri" panose="020F0502020204030204" pitchFamily="34" charset="0"/>
+                <a:cs typeface="Calibri" panose="020F0502020204030204" pitchFamily="34" charset="0"/>
+              </a:rPr>
+              <a:t>Cliente</a:t>
             </a:r>
           </a:p>
         </p:txBody>
@@ -6784,7 +6935,7 @@
           <p:cNvPr id="3" name="Imagen 2">
             <a:extLst>
               <a:ext uri="{FF2B5EF4-FFF2-40B4-BE49-F238E27FC236}">
-                <a16:creationId xmlns:a16="http://schemas.microsoft.com/office/drawing/2014/main" id="{DD4910DA-CA74-5376-D00C-AE98A077DFF0}"/>
+                <a16:creationId xmlns:a16="http://schemas.microsoft.com/office/drawing/2014/main" id="{68B5A894-F361-CB2E-B0C1-693910414228}"/>
               </a:ext>
             </a:extLst>
           </p:cNvPr>
@@ -6801,38 +6952,8 @@
         </p:blipFill>
         <p:spPr>
           <a:xfrm>
-            <a:off x="2194707" y="1692226"/>
-            <a:ext cx="3638550" cy="3276600"/>
-          </a:xfrm>
-          <a:prstGeom prst="rect">
-            <a:avLst/>
-          </a:prstGeom>
-        </p:spPr>
-      </p:pic>
-      <p:pic>
-        <p:nvPicPr>
-          <p:cNvPr id="7" name="Imagen 6">
-            <a:extLst>
-              <a:ext uri="{FF2B5EF4-FFF2-40B4-BE49-F238E27FC236}">
-                <a16:creationId xmlns:a16="http://schemas.microsoft.com/office/drawing/2014/main" id="{22570AF0-8334-3F4A-935E-E61CEDA98395}"/>
-              </a:ext>
-            </a:extLst>
-          </p:cNvPr>
-          <p:cNvPicPr>
-            <a:picLocks noChangeAspect="1"/>
-          </p:cNvPicPr>
-          <p:nvPr/>
-        </p:nvPicPr>
-        <p:blipFill>
-          <a:blip r:embed="rId3"/>
-          <a:stretch>
-            <a:fillRect/>
-          </a:stretch>
-        </p:blipFill>
-        <p:spPr>
-          <a:xfrm>
-            <a:off x="6358745" y="1692226"/>
-            <a:ext cx="3638550" cy="3276600"/>
+            <a:off x="637972" y="0"/>
+            <a:ext cx="4470179" cy="6858000"/>
           </a:xfrm>
           <a:prstGeom prst="rect">
             <a:avLst/>
@@ -6842,7 +6963,7 @@
     </p:spTree>
     <p:extLst>
       <p:ext uri="{BB962C8B-B14F-4D97-AF65-F5344CB8AC3E}">
-        <p14:creationId xmlns:p14="http://schemas.microsoft.com/office/powerpoint/2010/main" val="1268355955"/>
+        <p14:creationId xmlns:p14="http://schemas.microsoft.com/office/powerpoint/2010/main" val="135588775"/>
       </p:ext>
     </p:extLst>
   </p:cSld>
@@ -6883,7 +7004,7 @@
         </p:nvSpPr>
         <p:spPr>
           <a:xfrm>
-            <a:off x="5358793" y="1341416"/>
+            <a:off x="5273733" y="1341415"/>
             <a:ext cx="6195235" cy="1241237"/>
           </a:xfrm>
           <a:prstGeom prst="rect">
@@ -6919,17 +7040,17 @@
                 <a:latin typeface="Calibri" panose="020F0502020204030204" pitchFamily="34" charset="0"/>
                 <a:cs typeface="Calibri" panose="020F0502020204030204" pitchFamily="34" charset="0"/>
               </a:rPr>
-              <a:t>Cliente</a:t>
+              <a:t>Proveedor</a:t>
             </a:r>
           </a:p>
         </p:txBody>
       </p:sp>
       <p:pic>
         <p:nvPicPr>
-          <p:cNvPr id="3" name="Imagen 2">
-            <a:extLst>
-              <a:ext uri="{FF2B5EF4-FFF2-40B4-BE49-F238E27FC236}">
-                <a16:creationId xmlns:a16="http://schemas.microsoft.com/office/drawing/2014/main" id="{68B5A894-F361-CB2E-B0C1-693910414228}"/>
+          <p:cNvPr id="4" name="Imagen 3" descr="Diagrama&#10;&#10;Descripción generada automáticamente">
+            <a:extLst>
+              <a:ext uri="{FF2B5EF4-FFF2-40B4-BE49-F238E27FC236}">
+                <a16:creationId xmlns:a16="http://schemas.microsoft.com/office/drawing/2014/main" id="{AEADA765-C4FF-9659-82FD-7AD43FC04A52}"/>
               </a:ext>
             </a:extLst>
           </p:cNvPr>
@@ -6946,8 +7067,8 @@
         </p:blipFill>
         <p:spPr>
           <a:xfrm>
-            <a:off x="637972" y="0"/>
-            <a:ext cx="4470179" cy="6858000"/>
+            <a:off x="241541" y="0"/>
+            <a:ext cx="4629691" cy="6858000"/>
           </a:xfrm>
           <a:prstGeom prst="rect">
             <a:avLst/>
@@ -6957,7 +7078,7 @@
     </p:spTree>
     <p:extLst>
       <p:ext uri="{BB962C8B-B14F-4D97-AF65-F5344CB8AC3E}">
-        <p14:creationId xmlns:p14="http://schemas.microsoft.com/office/powerpoint/2010/main" val="135588775"/>
+        <p14:creationId xmlns:p14="http://schemas.microsoft.com/office/powerpoint/2010/main" val="3960931863"/>
       </p:ext>
     </p:extLst>
   </p:cSld>
@@ -6998,7 +7119,7 @@
         </p:nvSpPr>
         <p:spPr>
           <a:xfrm>
-            <a:off x="5273733" y="1341415"/>
+            <a:off x="6507109" y="1610773"/>
             <a:ext cx="6195235" cy="1241237"/>
           </a:xfrm>
           <a:prstGeom prst="rect">
@@ -7034,17 +7155,17 @@
                 <a:latin typeface="Calibri" panose="020F0502020204030204" pitchFamily="34" charset="0"/>
                 <a:cs typeface="Calibri" panose="020F0502020204030204" pitchFamily="34" charset="0"/>
               </a:rPr>
-              <a:t>Proveedor</a:t>
+              <a:t>Administrador</a:t>
             </a:r>
           </a:p>
         </p:txBody>
       </p:sp>
       <p:pic>
         <p:nvPicPr>
-          <p:cNvPr id="4" name="Imagen 3" descr="Diagrama&#10;&#10;Descripción generada automáticamente">
-            <a:extLst>
-              <a:ext uri="{FF2B5EF4-FFF2-40B4-BE49-F238E27FC236}">
-                <a16:creationId xmlns:a16="http://schemas.microsoft.com/office/drawing/2014/main" id="{AEADA765-C4FF-9659-82FD-7AD43FC04A52}"/>
+          <p:cNvPr id="3" name="Imagen 2">
+            <a:extLst>
+              <a:ext uri="{FF2B5EF4-FFF2-40B4-BE49-F238E27FC236}">
+                <a16:creationId xmlns:a16="http://schemas.microsoft.com/office/drawing/2014/main" id="{3A326373-7FA2-40EF-60A1-93DBE9010477}"/>
               </a:ext>
             </a:extLst>
           </p:cNvPr>
@@ -7061,8 +7182,8 @@
         </p:blipFill>
         <p:spPr>
           <a:xfrm>
-            <a:off x="241541" y="0"/>
-            <a:ext cx="4629691" cy="6858000"/>
+            <a:off x="0" y="-9140"/>
+            <a:ext cx="7109952" cy="6858000"/>
           </a:xfrm>
           <a:prstGeom prst="rect">
             <a:avLst/>
@@ -7072,7 +7193,7 @@
     </p:spTree>
     <p:extLst>
       <p:ext uri="{BB962C8B-B14F-4D97-AF65-F5344CB8AC3E}">
-        <p14:creationId xmlns:p14="http://schemas.microsoft.com/office/powerpoint/2010/main" val="3960931863"/>
+        <p14:creationId xmlns:p14="http://schemas.microsoft.com/office/powerpoint/2010/main" val="3212968141"/>
       </p:ext>
     </p:extLst>
   </p:cSld>
@@ -7113,8 +7234,8 @@
         </p:nvSpPr>
         <p:spPr>
           <a:xfrm>
-            <a:off x="6507109" y="1610773"/>
-            <a:ext cx="6195235" cy="1241237"/>
+            <a:off x="7346663" y="1687204"/>
+            <a:ext cx="4845338" cy="666786"/>
           </a:xfrm>
           <a:prstGeom prst="rect">
             <a:avLst/>
@@ -7136,58 +7257,15 @@
                 <a:latin typeface="Calibri" panose="020F0502020204030204" pitchFamily="34" charset="0"/>
                 <a:cs typeface="Calibri" panose="020F0502020204030204" pitchFamily="34" charset="0"/>
               </a:rPr>
-              <a:t>Diagrama de actividades</a:t>
-            </a:r>
-          </a:p>
-          <a:p>
-            <a:pPr algn="ctr"/>
-            <a:r>
-              <a:rPr lang="es-ES" sz="3733" b="1" dirty="0">
-                <a:solidFill>
-                  <a:srgbClr val="FF6C00"/>
-                </a:solidFill>
-                <a:latin typeface="Calibri" panose="020F0502020204030204" pitchFamily="34" charset="0"/>
-                <a:cs typeface="Calibri" panose="020F0502020204030204" pitchFamily="34" charset="0"/>
-              </a:rPr>
-              <a:t>Administrador</a:t>
-            </a:r>
-          </a:p>
-        </p:txBody>
-      </p:sp>
-      <p:pic>
-        <p:nvPicPr>
-          <p:cNvPr id="3" name="Imagen 2">
-            <a:extLst>
-              <a:ext uri="{FF2B5EF4-FFF2-40B4-BE49-F238E27FC236}">
-                <a16:creationId xmlns:a16="http://schemas.microsoft.com/office/drawing/2014/main" id="{3A326373-7FA2-40EF-60A1-93DBE9010477}"/>
-              </a:ext>
-            </a:extLst>
-          </p:cNvPr>
-          <p:cNvPicPr>
-            <a:picLocks noChangeAspect="1"/>
-          </p:cNvPicPr>
-          <p:nvPr/>
-        </p:nvPicPr>
-        <p:blipFill>
-          <a:blip r:embed="rId2"/>
-          <a:stretch>
-            <a:fillRect/>
-          </a:stretch>
-        </p:blipFill>
-        <p:spPr>
-          <a:xfrm>
-            <a:off x="0" y="-9140"/>
-            <a:ext cx="7109952" cy="6858000"/>
-          </a:xfrm>
-          <a:prstGeom prst="rect">
-            <a:avLst/>
-          </a:prstGeom>
-        </p:spPr>
-      </p:pic>
+              <a:t>Diagrama de clases</a:t>
+            </a:r>
+          </a:p>
+        </p:txBody>
+      </p:sp>
     </p:spTree>
     <p:extLst>
       <p:ext uri="{BB962C8B-B14F-4D97-AF65-F5344CB8AC3E}">
-        <p14:creationId xmlns:p14="http://schemas.microsoft.com/office/powerpoint/2010/main" val="3212968141"/>
+        <p14:creationId xmlns:p14="http://schemas.microsoft.com/office/powerpoint/2010/main" val="408438049"/>
       </p:ext>
     </p:extLst>
   </p:cSld>
@@ -7228,8 +7306,8 @@
         </p:nvSpPr>
         <p:spPr>
           <a:xfrm>
-            <a:off x="7346663" y="1687204"/>
-            <a:ext cx="4845338" cy="666786"/>
+            <a:off x="2998381" y="11793"/>
+            <a:ext cx="6195235" cy="666786"/>
           </a:xfrm>
           <a:prstGeom prst="rect">
             <a:avLst/>
@@ -7251,15 +7329,817 @@
                 <a:latin typeface="Calibri" panose="020F0502020204030204" pitchFamily="34" charset="0"/>
                 <a:cs typeface="Calibri" panose="020F0502020204030204" pitchFamily="34" charset="0"/>
               </a:rPr>
-              <a:t>Diagrama de clases</a:t>
-            </a:r>
-          </a:p>
-        </p:txBody>
-      </p:sp>
+              <a:t>Mapa de empatía </a:t>
+            </a:r>
+          </a:p>
+        </p:txBody>
+      </p:sp>
+      <p:sp>
+        <p:nvSpPr>
+          <p:cNvPr id="8" name="CuadroTexto 7">
+            <a:extLst>
+              <a:ext uri="{FF2B5EF4-FFF2-40B4-BE49-F238E27FC236}">
+                <a16:creationId xmlns:a16="http://schemas.microsoft.com/office/drawing/2014/main" id="{38EFDFD8-1179-6024-C86B-C405673F365F}"/>
+              </a:ext>
+            </a:extLst>
+          </p:cNvPr>
+          <p:cNvSpPr txBox="1"/>
+          <p:nvPr/>
+        </p:nvSpPr>
+        <p:spPr>
+          <a:xfrm>
+            <a:off x="8276756" y="2167177"/>
+            <a:ext cx="4024829" cy="1569660"/>
+          </a:xfrm>
+          <a:prstGeom prst="rect">
+            <a:avLst/>
+          </a:prstGeom>
+          <a:noFill/>
+        </p:spPr>
+        <p:txBody>
+          <a:bodyPr wrap="square" rtlCol="0">
+            <a:spAutoFit/>
+          </a:bodyPr>
+          <a:lstStyle/>
+          <a:p>
+            <a:r>
+              <a:rPr lang="es-ES" sz="1600" b="1" dirty="0">
+                <a:latin typeface="+mj-lt"/>
+              </a:rPr>
+              <a:t>¿QUÉ VE?</a:t>
+            </a:r>
+          </a:p>
+          <a:p>
+            <a:r>
+              <a:rPr lang="es-ES" sz="1600" b="1" dirty="0">
+                <a:latin typeface="+mj-lt"/>
+              </a:rPr>
+              <a:t>Cliente: </a:t>
+            </a:r>
+            <a:r>
+              <a:rPr lang="es-ES" sz="1600" dirty="0">
+                <a:latin typeface="+mj-lt"/>
+              </a:rPr>
+              <a:t>- Servicios mal realizados</a:t>
+            </a:r>
+          </a:p>
+          <a:p>
+            <a:r>
+              <a:rPr lang="es-ES" sz="1600" dirty="0">
+                <a:latin typeface="+mj-lt"/>
+              </a:rPr>
+              <a:t>- Robos y perdidas de dinero</a:t>
+            </a:r>
+          </a:p>
+          <a:p>
+            <a:r>
+              <a:rPr lang="es-ES" sz="1600" b="1" dirty="0">
+                <a:latin typeface="+mj-lt"/>
+              </a:rPr>
+              <a:t>Proveedor: </a:t>
+            </a:r>
+            <a:r>
+              <a:rPr lang="es-ES" sz="1600" dirty="0">
+                <a:latin typeface="+mj-lt"/>
+              </a:rPr>
+              <a:t>- Poca publicidad en su emprendimiento</a:t>
+            </a:r>
+          </a:p>
+          <a:p>
+            <a:r>
+              <a:rPr lang="es-ES" sz="1600" dirty="0">
+                <a:latin typeface="+mj-lt"/>
+              </a:rPr>
+              <a:t>- Desconfianza en la contratación</a:t>
+            </a:r>
+          </a:p>
+        </p:txBody>
+      </p:sp>
+      <p:sp>
+        <p:nvSpPr>
+          <p:cNvPr id="13" name="CuadroTexto 12">
+            <a:extLst>
+              <a:ext uri="{FF2B5EF4-FFF2-40B4-BE49-F238E27FC236}">
+                <a16:creationId xmlns:a16="http://schemas.microsoft.com/office/drawing/2014/main" id="{2AB2A075-E71E-C5BA-2D4A-CE49B29A35E6}"/>
+              </a:ext>
+            </a:extLst>
+          </p:cNvPr>
+          <p:cNvSpPr txBox="1"/>
+          <p:nvPr/>
+        </p:nvSpPr>
+        <p:spPr>
+          <a:xfrm>
+            <a:off x="3790693" y="628244"/>
+            <a:ext cx="5402924" cy="1569660"/>
+          </a:xfrm>
+          <a:prstGeom prst="rect">
+            <a:avLst/>
+          </a:prstGeom>
+          <a:noFill/>
+        </p:spPr>
+        <p:txBody>
+          <a:bodyPr wrap="square" rtlCol="0">
+            <a:spAutoFit/>
+          </a:bodyPr>
+          <a:lstStyle/>
+          <a:p>
+            <a:r>
+              <a:rPr lang="es-ES" sz="1600" b="1" dirty="0">
+                <a:latin typeface="+mj-lt"/>
+              </a:rPr>
+              <a:t>¿QUÉ PIENSA Y SIENTE?</a:t>
+            </a:r>
+          </a:p>
+          <a:p>
+            <a:r>
+              <a:rPr lang="es-ES" sz="1600" b="1" dirty="0">
+                <a:latin typeface="+mj-lt"/>
+              </a:rPr>
+              <a:t>Cliente: </a:t>
+            </a:r>
+            <a:r>
+              <a:rPr lang="es-ES" sz="1600" dirty="0">
+                <a:latin typeface="+mj-lt"/>
+              </a:rPr>
+              <a:t>- Desconfianza e inseguridad en el momento de adquirir servicios en línea</a:t>
+            </a:r>
+          </a:p>
+          <a:p>
+            <a:r>
+              <a:rPr lang="es-ES" sz="1600" b="1" dirty="0">
+                <a:latin typeface="+mj-lt"/>
+              </a:rPr>
+              <a:t>Proveedor: </a:t>
+            </a:r>
+            <a:r>
+              <a:rPr lang="es-ES" sz="1600" dirty="0">
+                <a:latin typeface="+mj-lt"/>
+              </a:rPr>
+              <a:t>- Poca cobertura en su emprendimiento</a:t>
+            </a:r>
+          </a:p>
+          <a:p>
+            <a:r>
+              <a:rPr lang="es-ES" sz="1600" dirty="0">
+                <a:latin typeface="+mj-lt"/>
+              </a:rPr>
+              <a:t>- Generar mayores ingresos</a:t>
+            </a:r>
+          </a:p>
+          <a:p>
+            <a:r>
+              <a:rPr lang="es-ES" sz="1600" dirty="0">
+                <a:latin typeface="+mj-lt"/>
+              </a:rPr>
+              <a:t>- Mejorar su calidad de vida</a:t>
+            </a:r>
+          </a:p>
+        </p:txBody>
+      </p:sp>
+      <p:pic>
+        <p:nvPicPr>
+          <p:cNvPr id="15" name="Imagen 14">
+            <a:extLst>
+              <a:ext uri="{FF2B5EF4-FFF2-40B4-BE49-F238E27FC236}">
+                <a16:creationId xmlns:a16="http://schemas.microsoft.com/office/drawing/2014/main" id="{1406FFEF-3BF6-0F2C-F859-3394149D2C43}"/>
+              </a:ext>
+            </a:extLst>
+          </p:cNvPr>
+          <p:cNvPicPr>
+            <a:picLocks noChangeAspect="1"/>
+          </p:cNvPicPr>
+          <p:nvPr/>
+        </p:nvPicPr>
+        <p:blipFill>
+          <a:blip r:embed="rId3"/>
+          <a:stretch>
+            <a:fillRect/>
+          </a:stretch>
+        </p:blipFill>
+        <p:spPr>
+          <a:xfrm>
+            <a:off x="8167171" y="1209229"/>
+            <a:ext cx="607236" cy="607236"/>
+          </a:xfrm>
+          <a:prstGeom prst="rect">
+            <a:avLst/>
+          </a:prstGeom>
+        </p:spPr>
+      </p:pic>
+      <p:pic>
+        <p:nvPicPr>
+          <p:cNvPr id="17" name="Imagen 16">
+            <a:extLst>
+              <a:ext uri="{FF2B5EF4-FFF2-40B4-BE49-F238E27FC236}">
+                <a16:creationId xmlns:a16="http://schemas.microsoft.com/office/drawing/2014/main" id="{DFEE1F78-67F5-E96C-2743-B1AFDA904C61}"/>
+              </a:ext>
+            </a:extLst>
+          </p:cNvPr>
+          <p:cNvPicPr>
+            <a:picLocks noChangeAspect="1"/>
+          </p:cNvPicPr>
+          <p:nvPr/>
+        </p:nvPicPr>
+        <p:blipFill>
+          <a:blip r:embed="rId4"/>
+          <a:stretch>
+            <a:fillRect/>
+          </a:stretch>
+        </p:blipFill>
+        <p:spPr>
+          <a:xfrm>
+            <a:off x="11340910" y="2753291"/>
+            <a:ext cx="675709" cy="675709"/>
+          </a:xfrm>
+          <a:prstGeom prst="rect">
+            <a:avLst/>
+          </a:prstGeom>
+        </p:spPr>
+      </p:pic>
+      <p:sp>
+        <p:nvSpPr>
+          <p:cNvPr id="7" name="CuadroTexto 6">
+            <a:extLst>
+              <a:ext uri="{FF2B5EF4-FFF2-40B4-BE49-F238E27FC236}">
+                <a16:creationId xmlns:a16="http://schemas.microsoft.com/office/drawing/2014/main" id="{ACD346F2-5647-BAA5-39E3-D66DDF78D20A}"/>
+              </a:ext>
+            </a:extLst>
+          </p:cNvPr>
+          <p:cNvSpPr txBox="1"/>
+          <p:nvPr/>
+        </p:nvSpPr>
+        <p:spPr>
+          <a:xfrm>
+            <a:off x="3915246" y="3767616"/>
+            <a:ext cx="4152981" cy="1077218"/>
+          </a:xfrm>
+          <a:prstGeom prst="rect">
+            <a:avLst/>
+          </a:prstGeom>
+          <a:noFill/>
+        </p:spPr>
+        <p:txBody>
+          <a:bodyPr wrap="square" rtlCol="0">
+            <a:spAutoFit/>
+          </a:bodyPr>
+          <a:lstStyle/>
+          <a:p>
+            <a:r>
+              <a:rPr lang="es-ES" sz="1600" b="1" dirty="0">
+                <a:latin typeface="+mj-lt"/>
+              </a:rPr>
+              <a:t>¿QUE ES LO QUE DICE Y HACE?</a:t>
+            </a:r>
+          </a:p>
+          <a:p>
+            <a:r>
+              <a:rPr lang="es-ES" sz="1600" b="1" dirty="0">
+                <a:latin typeface="+mj-lt"/>
+              </a:rPr>
+              <a:t>Cliente: </a:t>
+            </a:r>
+            <a:r>
+              <a:rPr lang="es-ES" sz="1600" dirty="0">
+                <a:latin typeface="+mj-lt"/>
+              </a:rPr>
+              <a:t>- Busca opiniones en su comunidad</a:t>
+            </a:r>
+          </a:p>
+          <a:p>
+            <a:r>
+              <a:rPr lang="es-ES" sz="1600" b="1" dirty="0">
+                <a:latin typeface="+mj-lt"/>
+              </a:rPr>
+              <a:t>Proveedor: </a:t>
+            </a:r>
+            <a:r>
+              <a:rPr lang="es-ES" sz="1600" dirty="0">
+                <a:latin typeface="+mj-lt"/>
+              </a:rPr>
+              <a:t>- Presta servicios de buena calidad acordé a sus conocimientos</a:t>
+            </a:r>
+          </a:p>
+        </p:txBody>
+      </p:sp>
+      <p:pic>
+        <p:nvPicPr>
+          <p:cNvPr id="9" name="Imagen 8">
+            <a:extLst>
+              <a:ext uri="{FF2B5EF4-FFF2-40B4-BE49-F238E27FC236}">
+                <a16:creationId xmlns:a16="http://schemas.microsoft.com/office/drawing/2014/main" id="{32A66AC8-AC60-027E-56CD-720039D61A2D}"/>
+              </a:ext>
+            </a:extLst>
+          </p:cNvPr>
+          <p:cNvPicPr>
+            <a:picLocks noChangeAspect="1"/>
+          </p:cNvPicPr>
+          <p:nvPr/>
+        </p:nvPicPr>
+        <p:blipFill>
+          <a:blip r:embed="rId5"/>
+          <a:stretch>
+            <a:fillRect/>
+          </a:stretch>
+        </p:blipFill>
+        <p:spPr>
+          <a:xfrm>
+            <a:off x="8013144" y="4074979"/>
+            <a:ext cx="493269" cy="493269"/>
+          </a:xfrm>
+          <a:prstGeom prst="rect">
+            <a:avLst/>
+          </a:prstGeom>
+        </p:spPr>
+      </p:pic>
+      <p:sp>
+        <p:nvSpPr>
+          <p:cNvPr id="10" name="CuadroTexto 9">
+            <a:extLst>
+              <a:ext uri="{FF2B5EF4-FFF2-40B4-BE49-F238E27FC236}">
+                <a16:creationId xmlns:a16="http://schemas.microsoft.com/office/drawing/2014/main" id="{895EC70C-EC0C-E100-6F6F-28E95B433653}"/>
+              </a:ext>
+            </a:extLst>
+          </p:cNvPr>
+          <p:cNvSpPr txBox="1"/>
+          <p:nvPr/>
+        </p:nvSpPr>
+        <p:spPr>
+          <a:xfrm>
+            <a:off x="232214" y="2283572"/>
+            <a:ext cx="3245036" cy="1323439"/>
+          </a:xfrm>
+          <a:prstGeom prst="rect">
+            <a:avLst/>
+          </a:prstGeom>
+          <a:noFill/>
+        </p:spPr>
+        <p:txBody>
+          <a:bodyPr wrap="square" rtlCol="0">
+            <a:spAutoFit/>
+          </a:bodyPr>
+          <a:lstStyle/>
+          <a:p>
+            <a:r>
+              <a:rPr lang="es-ES" sz="1600" b="1" dirty="0">
+                <a:latin typeface="+mj-lt"/>
+              </a:rPr>
+              <a:t>¿QUE ES LO QUE OYE?</a:t>
+            </a:r>
+          </a:p>
+          <a:p>
+            <a:r>
+              <a:rPr lang="es-ES" sz="1600" b="1" dirty="0">
+                <a:latin typeface="+mj-lt"/>
+              </a:rPr>
+              <a:t>Cliente: </a:t>
+            </a:r>
+            <a:r>
+              <a:rPr lang="es-ES" sz="1600" dirty="0">
+                <a:latin typeface="+mj-lt"/>
+              </a:rPr>
+              <a:t>- Realización de servicios de baja calidad</a:t>
+            </a:r>
+          </a:p>
+          <a:p>
+            <a:r>
+              <a:rPr lang="es-ES" sz="1600" b="1" dirty="0">
+                <a:latin typeface="+mj-lt"/>
+              </a:rPr>
+              <a:t>Proveedor: </a:t>
+            </a:r>
+            <a:r>
+              <a:rPr lang="es-ES" sz="1600" dirty="0">
+                <a:latin typeface="+mj-lt"/>
+              </a:rPr>
+              <a:t>- Oportunidades escasas </a:t>
+            </a:r>
+          </a:p>
+          <a:p>
+            <a:r>
+              <a:rPr lang="es-ES" sz="1600" dirty="0">
+                <a:latin typeface="+mj-lt"/>
+              </a:rPr>
+              <a:t>-Falta de apoyo</a:t>
+            </a:r>
+          </a:p>
+        </p:txBody>
+      </p:sp>
+      <p:pic>
+        <p:nvPicPr>
+          <p:cNvPr id="11" name="Imagen 10">
+            <a:extLst>
+              <a:ext uri="{FF2B5EF4-FFF2-40B4-BE49-F238E27FC236}">
+                <a16:creationId xmlns:a16="http://schemas.microsoft.com/office/drawing/2014/main" id="{9F682A5E-D7ED-6087-D88A-4407AFCB5364}"/>
+              </a:ext>
+            </a:extLst>
+          </p:cNvPr>
+          <p:cNvPicPr>
+            <a:picLocks noChangeAspect="1"/>
+          </p:cNvPicPr>
+          <p:nvPr/>
+        </p:nvPicPr>
+        <p:blipFill>
+          <a:blip r:embed="rId6"/>
+          <a:stretch>
+            <a:fillRect/>
+          </a:stretch>
+        </p:blipFill>
+        <p:spPr>
+          <a:xfrm>
+            <a:off x="3685779" y="2513834"/>
+            <a:ext cx="675711" cy="675711"/>
+          </a:xfrm>
+          <a:prstGeom prst="rect">
+            <a:avLst/>
+          </a:prstGeom>
+        </p:spPr>
+      </p:pic>
+      <p:cxnSp>
+        <p:nvCxnSpPr>
+          <p:cNvPr id="3" name="Conector recto 2">
+            <a:extLst>
+              <a:ext uri="{FF2B5EF4-FFF2-40B4-BE49-F238E27FC236}">
+                <a16:creationId xmlns:a16="http://schemas.microsoft.com/office/drawing/2014/main" id="{E1A5093F-4A92-EC09-2310-355323C2AC97}"/>
+              </a:ext>
+            </a:extLst>
+          </p:cNvPr>
+          <p:cNvCxnSpPr>
+            <a:cxnSpLocks/>
+          </p:cNvCxnSpPr>
+          <p:nvPr/>
+        </p:nvCxnSpPr>
+        <p:spPr>
+          <a:xfrm>
+            <a:off x="44069" y="782885"/>
+            <a:ext cx="12147932" cy="4270184"/>
+          </a:xfrm>
+          <a:prstGeom prst="line">
+            <a:avLst/>
+          </a:prstGeom>
+        </p:spPr>
+        <p:style>
+          <a:lnRef idx="1">
+            <a:schemeClr val="dk1"/>
+          </a:lnRef>
+          <a:fillRef idx="0">
+            <a:schemeClr val="dk1"/>
+          </a:fillRef>
+          <a:effectRef idx="0">
+            <a:schemeClr val="dk1"/>
+          </a:effectRef>
+          <a:fontRef idx="minor">
+            <a:schemeClr val="tx1"/>
+          </a:fontRef>
+        </p:style>
+      </p:cxnSp>
+      <p:cxnSp>
+        <p:nvCxnSpPr>
+          <p:cNvPr id="14" name="Conector recto 13">
+            <a:extLst>
+              <a:ext uri="{FF2B5EF4-FFF2-40B4-BE49-F238E27FC236}">
+                <a16:creationId xmlns:a16="http://schemas.microsoft.com/office/drawing/2014/main" id="{8B73BF79-FB72-C8F9-DEFA-78ECC4197BBB}"/>
+              </a:ext>
+            </a:extLst>
+          </p:cNvPr>
+          <p:cNvCxnSpPr>
+            <a:cxnSpLocks/>
+          </p:cNvCxnSpPr>
+          <p:nvPr/>
+        </p:nvCxnSpPr>
+        <p:spPr>
+          <a:xfrm flipH="1">
+            <a:off x="-45595" y="782885"/>
+            <a:ext cx="12237595" cy="4270184"/>
+          </a:xfrm>
+          <a:prstGeom prst="line">
+            <a:avLst/>
+          </a:prstGeom>
+        </p:spPr>
+        <p:style>
+          <a:lnRef idx="1">
+            <a:schemeClr val="dk1"/>
+          </a:lnRef>
+          <a:fillRef idx="0">
+            <a:schemeClr val="dk1"/>
+          </a:fillRef>
+          <a:effectRef idx="0">
+            <a:schemeClr val="dk1"/>
+          </a:effectRef>
+          <a:fontRef idx="minor">
+            <a:schemeClr val="tx1"/>
+          </a:fontRef>
+        </p:style>
+      </p:cxnSp>
+      <p:cxnSp>
+        <p:nvCxnSpPr>
+          <p:cNvPr id="36" name="Conector recto 35">
+            <a:extLst>
+              <a:ext uri="{FF2B5EF4-FFF2-40B4-BE49-F238E27FC236}">
+                <a16:creationId xmlns:a16="http://schemas.microsoft.com/office/drawing/2014/main" id="{5A048461-5561-3ABE-ECEF-C0F2C6896E59}"/>
+              </a:ext>
+            </a:extLst>
+          </p:cNvPr>
+          <p:cNvCxnSpPr>
+            <a:cxnSpLocks/>
+          </p:cNvCxnSpPr>
+          <p:nvPr/>
+        </p:nvCxnSpPr>
+        <p:spPr>
+          <a:xfrm flipV="1">
+            <a:off x="44068" y="5082467"/>
+            <a:ext cx="12139707" cy="14671"/>
+          </a:xfrm>
+          <a:prstGeom prst="line">
+            <a:avLst/>
+          </a:prstGeom>
+        </p:spPr>
+        <p:style>
+          <a:lnRef idx="1">
+            <a:schemeClr val="dk1"/>
+          </a:lnRef>
+          <a:fillRef idx="0">
+            <a:schemeClr val="dk1"/>
+          </a:fillRef>
+          <a:effectRef idx="0">
+            <a:schemeClr val="dk1"/>
+          </a:effectRef>
+          <a:fontRef idx="minor">
+            <a:schemeClr val="tx1"/>
+          </a:fontRef>
+        </p:style>
+      </p:cxnSp>
+      <p:sp>
+        <p:nvSpPr>
+          <p:cNvPr id="44" name="CuadroTexto 43">
+            <a:extLst>
+              <a:ext uri="{FF2B5EF4-FFF2-40B4-BE49-F238E27FC236}">
+                <a16:creationId xmlns:a16="http://schemas.microsoft.com/office/drawing/2014/main" id="{C43C6928-0F5E-B932-CA55-0AEE5E2C42A8}"/>
+              </a:ext>
+            </a:extLst>
+          </p:cNvPr>
+          <p:cNvSpPr txBox="1"/>
+          <p:nvPr/>
+        </p:nvSpPr>
+        <p:spPr>
+          <a:xfrm>
+            <a:off x="6073203" y="5185620"/>
+            <a:ext cx="5577949" cy="1569660"/>
+          </a:xfrm>
+          <a:prstGeom prst="rect">
+            <a:avLst/>
+          </a:prstGeom>
+          <a:noFill/>
+        </p:spPr>
+        <p:txBody>
+          <a:bodyPr wrap="square" rtlCol="0">
+            <a:spAutoFit/>
+          </a:bodyPr>
+          <a:lstStyle/>
+          <a:p>
+            <a:r>
+              <a:rPr lang="es-ES" sz="1600" b="1" dirty="0">
+                <a:latin typeface="+mj-lt"/>
+              </a:rPr>
+              <a:t>RESULTADOS</a:t>
+            </a:r>
+          </a:p>
+          <a:p>
+            <a:r>
+              <a:rPr lang="es-ES" sz="1600" b="1" dirty="0">
+                <a:latin typeface="+mj-lt"/>
+              </a:rPr>
+              <a:t>Cliente: </a:t>
+            </a:r>
+            <a:r>
+              <a:rPr lang="es-ES" sz="1600" dirty="0">
+                <a:latin typeface="+mj-lt"/>
+              </a:rPr>
+              <a:t>- Servicios adquiridos de excelente calidad</a:t>
+            </a:r>
+          </a:p>
+          <a:p>
+            <a:r>
+              <a:rPr lang="es-ES" sz="1600" b="1" dirty="0">
+                <a:latin typeface="+mj-lt"/>
+              </a:rPr>
+              <a:t>Proveedor: </a:t>
+            </a:r>
+            <a:r>
+              <a:rPr lang="es-ES" sz="1600" dirty="0">
+                <a:latin typeface="+mj-lt"/>
+              </a:rPr>
+              <a:t>- Emprendimiento a gran escala</a:t>
+            </a:r>
+          </a:p>
+          <a:p>
+            <a:r>
+              <a:rPr lang="es-ES" sz="1600" dirty="0">
+                <a:latin typeface="+mj-lt"/>
+              </a:rPr>
+              <a:t>- Superación personal </a:t>
+            </a:r>
+          </a:p>
+          <a:p>
+            <a:r>
+              <a:rPr lang="es-ES" sz="1600" dirty="0">
+                <a:latin typeface="+mj-lt"/>
+              </a:rPr>
+              <a:t>- Más recomendaciones de sus clientes</a:t>
+            </a:r>
+          </a:p>
+          <a:p>
+            <a:r>
+              <a:rPr lang="es-ES" sz="1600" dirty="0">
+                <a:latin typeface="+mj-lt"/>
+              </a:rPr>
+              <a:t>- Éxito en la prestación de servicios</a:t>
+            </a:r>
+          </a:p>
+        </p:txBody>
+      </p:sp>
+      <p:pic>
+        <p:nvPicPr>
+          <p:cNvPr id="47" name="Imagen 46">
+            <a:extLst>
+              <a:ext uri="{FF2B5EF4-FFF2-40B4-BE49-F238E27FC236}">
+                <a16:creationId xmlns:a16="http://schemas.microsoft.com/office/drawing/2014/main" id="{4859D8F0-D5A4-AD92-367C-61E7CC5F4D56}"/>
+              </a:ext>
+            </a:extLst>
+          </p:cNvPr>
+          <p:cNvPicPr>
+            <a:picLocks noChangeAspect="1"/>
+          </p:cNvPicPr>
+          <p:nvPr/>
+        </p:nvPicPr>
+        <p:blipFill>
+          <a:blip r:embed="rId7"/>
+          <a:stretch>
+            <a:fillRect/>
+          </a:stretch>
+        </p:blipFill>
+        <p:spPr>
+          <a:xfrm>
+            <a:off x="11475417" y="5764846"/>
+            <a:ext cx="672516" cy="672516"/>
+          </a:xfrm>
+          <a:prstGeom prst="rect">
+            <a:avLst/>
+          </a:prstGeom>
+        </p:spPr>
+      </p:pic>
+      <p:cxnSp>
+        <p:nvCxnSpPr>
+          <p:cNvPr id="49" name="Conector recto 48">
+            <a:extLst>
+              <a:ext uri="{FF2B5EF4-FFF2-40B4-BE49-F238E27FC236}">
+                <a16:creationId xmlns:a16="http://schemas.microsoft.com/office/drawing/2014/main" id="{8F56039C-1692-4FEA-E302-615D52FD5E24}"/>
+              </a:ext>
+            </a:extLst>
+          </p:cNvPr>
+          <p:cNvCxnSpPr>
+            <a:cxnSpLocks/>
+          </p:cNvCxnSpPr>
+          <p:nvPr/>
+        </p:nvCxnSpPr>
+        <p:spPr>
+          <a:xfrm>
+            <a:off x="5915943" y="5126535"/>
+            <a:ext cx="1893" cy="1718612"/>
+          </a:xfrm>
+          <a:prstGeom prst="line">
+            <a:avLst/>
+          </a:prstGeom>
+        </p:spPr>
+        <p:style>
+          <a:lnRef idx="1">
+            <a:schemeClr val="dk1"/>
+          </a:lnRef>
+          <a:fillRef idx="0">
+            <a:schemeClr val="dk1"/>
+          </a:fillRef>
+          <a:effectRef idx="0">
+            <a:schemeClr val="dk1"/>
+          </a:effectRef>
+          <a:fontRef idx="minor">
+            <a:schemeClr val="tx1"/>
+          </a:fontRef>
+        </p:style>
+      </p:cxnSp>
+      <p:sp>
+        <p:nvSpPr>
+          <p:cNvPr id="52" name="CuadroTexto 51">
+            <a:extLst>
+              <a:ext uri="{FF2B5EF4-FFF2-40B4-BE49-F238E27FC236}">
+                <a16:creationId xmlns:a16="http://schemas.microsoft.com/office/drawing/2014/main" id="{82FD7941-C039-8395-2138-C1E7ABB86D71}"/>
+              </a:ext>
+            </a:extLst>
+          </p:cNvPr>
+          <p:cNvSpPr txBox="1"/>
+          <p:nvPr/>
+        </p:nvSpPr>
+        <p:spPr>
+          <a:xfrm>
+            <a:off x="44068" y="5300749"/>
+            <a:ext cx="4906179" cy="1323439"/>
+          </a:xfrm>
+          <a:prstGeom prst="rect">
+            <a:avLst/>
+          </a:prstGeom>
+          <a:noFill/>
+        </p:spPr>
+        <p:txBody>
+          <a:bodyPr wrap="square" rtlCol="0">
+            <a:spAutoFit/>
+          </a:bodyPr>
+          <a:lstStyle/>
+          <a:p>
+            <a:r>
+              <a:rPr lang="es-ES" sz="1600" b="1" dirty="0">
+                <a:latin typeface="+mj-lt"/>
+              </a:rPr>
+              <a:t>ESFUERZOS</a:t>
+            </a:r>
+          </a:p>
+          <a:p>
+            <a:r>
+              <a:rPr lang="es-ES" sz="1600" b="1" dirty="0">
+                <a:latin typeface="+mj-lt"/>
+              </a:rPr>
+              <a:t>Cliente: </a:t>
+            </a:r>
+            <a:r>
+              <a:rPr lang="es-ES" sz="1600" dirty="0">
+                <a:latin typeface="+mj-lt"/>
+              </a:rPr>
+              <a:t>- No hay soluciones a sus necesidades</a:t>
+            </a:r>
+          </a:p>
+          <a:p>
+            <a:r>
+              <a:rPr lang="es-ES" sz="1600" b="1" dirty="0">
+                <a:latin typeface="+mj-lt"/>
+              </a:rPr>
+              <a:t>Proveedor: </a:t>
+            </a:r>
+            <a:r>
+              <a:rPr lang="es-ES" sz="1600" dirty="0">
+                <a:latin typeface="+mj-lt"/>
+              </a:rPr>
+              <a:t>- No alcanzar sus metas propuestas</a:t>
+            </a:r>
+          </a:p>
+          <a:p>
+            <a:r>
+              <a:rPr lang="es-ES" sz="1600" dirty="0">
+                <a:latin typeface="+mj-lt"/>
+              </a:rPr>
+              <a:t>- Dificultad para darse a conocer</a:t>
+            </a:r>
+          </a:p>
+          <a:p>
+            <a:r>
+              <a:rPr lang="es-ES" sz="1600" dirty="0">
+                <a:latin typeface="+mj-lt"/>
+              </a:rPr>
+              <a:t>- Miedo al fracaso</a:t>
+            </a:r>
+          </a:p>
+        </p:txBody>
+      </p:sp>
+      <p:pic>
+        <p:nvPicPr>
+          <p:cNvPr id="53" name="Imagen 52">
+            <a:extLst>
+              <a:ext uri="{FF2B5EF4-FFF2-40B4-BE49-F238E27FC236}">
+                <a16:creationId xmlns:a16="http://schemas.microsoft.com/office/drawing/2014/main" id="{09DC1441-E76F-7767-EFCB-062CF21A205B}"/>
+              </a:ext>
+            </a:extLst>
+          </p:cNvPr>
+          <p:cNvPicPr>
+            <a:picLocks noChangeAspect="1"/>
+          </p:cNvPicPr>
+          <p:nvPr/>
+        </p:nvPicPr>
+        <p:blipFill>
+          <a:blip r:embed="rId8"/>
+          <a:stretch>
+            <a:fillRect/>
+          </a:stretch>
+        </p:blipFill>
+        <p:spPr>
+          <a:xfrm>
+            <a:off x="4546508" y="5718955"/>
+            <a:ext cx="807477" cy="807477"/>
+          </a:xfrm>
+          <a:prstGeom prst="rect">
+            <a:avLst/>
+          </a:prstGeom>
+        </p:spPr>
+      </p:pic>
     </p:spTree>
     <p:extLst>
       <p:ext uri="{BB962C8B-B14F-4D97-AF65-F5344CB8AC3E}">
-        <p14:creationId xmlns:p14="http://schemas.microsoft.com/office/powerpoint/2010/main" val="408438049"/>
+        <p14:creationId xmlns:p14="http://schemas.microsoft.com/office/powerpoint/2010/main" val="3622025240"/>
       </p:ext>
     </p:extLst>
   </p:cSld>
@@ -7300,7 +8180,7 @@
         </p:nvSpPr>
         <p:spPr>
           <a:xfrm>
-            <a:off x="2998381" y="11793"/>
+            <a:off x="3012560" y="421131"/>
             <a:ext cx="6195235" cy="666786"/>
           </a:xfrm>
           <a:prstGeom prst="rect">
@@ -7320,820 +8200,16 @@
                 <a:solidFill>
                   <a:srgbClr val="FF6C00"/>
                 </a:solidFill>
-                <a:latin typeface="Calibri" panose="020F0502020204030204" pitchFamily="34" charset="0"/>
-                <a:cs typeface="Calibri" panose="020F0502020204030204" pitchFamily="34" charset="0"/>
-              </a:rPr>
-              <a:t>Mapa de empatía </a:t>
-            </a:r>
-          </a:p>
-        </p:txBody>
-      </p:sp>
-      <p:sp>
-        <p:nvSpPr>
-          <p:cNvPr id="8" name="CuadroTexto 7">
-            <a:extLst>
-              <a:ext uri="{FF2B5EF4-FFF2-40B4-BE49-F238E27FC236}">
-                <a16:creationId xmlns:a16="http://schemas.microsoft.com/office/drawing/2014/main" id="{38EFDFD8-1179-6024-C86B-C405673F365F}"/>
-              </a:ext>
-            </a:extLst>
-          </p:cNvPr>
-          <p:cNvSpPr txBox="1"/>
-          <p:nvPr/>
-        </p:nvSpPr>
-        <p:spPr>
-          <a:xfrm>
-            <a:off x="8276756" y="2167177"/>
-            <a:ext cx="4024829" cy="1569660"/>
-          </a:xfrm>
-          <a:prstGeom prst="rect">
-            <a:avLst/>
-          </a:prstGeom>
-          <a:noFill/>
-        </p:spPr>
-        <p:txBody>
-          <a:bodyPr wrap="square" rtlCol="0">
-            <a:spAutoFit/>
-          </a:bodyPr>
-          <a:lstStyle/>
-          <a:p>
-            <a:r>
-              <a:rPr lang="es-ES" sz="1600" b="1" dirty="0">
-                <a:latin typeface="+mj-lt"/>
-              </a:rPr>
-              <a:t>¿QUÉ VE?</a:t>
-            </a:r>
-          </a:p>
-          <a:p>
-            <a:r>
-              <a:rPr lang="es-ES" sz="1600" b="1" dirty="0">
-                <a:latin typeface="+mj-lt"/>
-              </a:rPr>
-              <a:t>Cliente: </a:t>
-            </a:r>
-            <a:r>
-              <a:rPr lang="es-ES" sz="1600" dirty="0">
-                <a:latin typeface="+mj-lt"/>
-              </a:rPr>
-              <a:t>- Servicios mal realizados</a:t>
-            </a:r>
-          </a:p>
-          <a:p>
-            <a:r>
-              <a:rPr lang="es-ES" sz="1600" dirty="0">
-                <a:latin typeface="+mj-lt"/>
-              </a:rPr>
-              <a:t>- Robos y perdidas de dinero</a:t>
-            </a:r>
-          </a:p>
-          <a:p>
-            <a:r>
-              <a:rPr lang="es-ES" sz="1600" b="1" dirty="0">
-                <a:latin typeface="+mj-lt"/>
-              </a:rPr>
-              <a:t>Proveedor: </a:t>
-            </a:r>
-            <a:r>
-              <a:rPr lang="es-ES" sz="1600" dirty="0">
-                <a:latin typeface="+mj-lt"/>
-              </a:rPr>
-              <a:t>- Poca publicidad en su emprendimiento</a:t>
-            </a:r>
-          </a:p>
-          <a:p>
-            <a:r>
-              <a:rPr lang="es-ES" sz="1600" dirty="0">
-                <a:latin typeface="+mj-lt"/>
-              </a:rPr>
-              <a:t>- Desconfianza en la contratación</a:t>
-            </a:r>
-          </a:p>
-        </p:txBody>
-      </p:sp>
-      <p:sp>
-        <p:nvSpPr>
-          <p:cNvPr id="13" name="CuadroTexto 12">
-            <a:extLst>
-              <a:ext uri="{FF2B5EF4-FFF2-40B4-BE49-F238E27FC236}">
-                <a16:creationId xmlns:a16="http://schemas.microsoft.com/office/drawing/2014/main" id="{2AB2A075-E71E-C5BA-2D4A-CE49B29A35E6}"/>
-              </a:ext>
-            </a:extLst>
-          </p:cNvPr>
-          <p:cNvSpPr txBox="1"/>
-          <p:nvPr/>
-        </p:nvSpPr>
-        <p:spPr>
-          <a:xfrm>
-            <a:off x="3790693" y="628244"/>
-            <a:ext cx="5402924" cy="1569660"/>
-          </a:xfrm>
-          <a:prstGeom prst="rect">
-            <a:avLst/>
-          </a:prstGeom>
-          <a:noFill/>
-        </p:spPr>
-        <p:txBody>
-          <a:bodyPr wrap="square" rtlCol="0">
-            <a:spAutoFit/>
-          </a:bodyPr>
-          <a:lstStyle/>
-          <a:p>
-            <a:r>
-              <a:rPr lang="es-ES" sz="1600" b="1" dirty="0">
-                <a:latin typeface="+mj-lt"/>
-              </a:rPr>
-              <a:t>¿QUÉ PIENSA Y SIENTE?</a:t>
-            </a:r>
-          </a:p>
-          <a:p>
-            <a:r>
-              <a:rPr lang="es-ES" sz="1600" b="1" dirty="0">
-                <a:latin typeface="+mj-lt"/>
-              </a:rPr>
-              <a:t>Cliente: </a:t>
-            </a:r>
-            <a:r>
-              <a:rPr lang="es-ES" sz="1600" dirty="0">
-                <a:latin typeface="+mj-lt"/>
-              </a:rPr>
-              <a:t>- Desconfianza e inseguridad en el momento de adquirir servicios en línea</a:t>
-            </a:r>
-          </a:p>
-          <a:p>
-            <a:r>
-              <a:rPr lang="es-ES" sz="1600" b="1" dirty="0">
-                <a:latin typeface="+mj-lt"/>
-              </a:rPr>
-              <a:t>Proveedor: </a:t>
-            </a:r>
-            <a:r>
-              <a:rPr lang="es-ES" sz="1600" dirty="0">
-                <a:latin typeface="+mj-lt"/>
-              </a:rPr>
-              <a:t>- Poca cobertura en su emprendimiento</a:t>
-            </a:r>
-          </a:p>
-          <a:p>
-            <a:r>
-              <a:rPr lang="es-ES" sz="1600" dirty="0">
-                <a:latin typeface="+mj-lt"/>
-              </a:rPr>
-              <a:t>- Generar mayores ingresos</a:t>
-            </a:r>
-          </a:p>
-          <a:p>
-            <a:r>
-              <a:rPr lang="es-ES" sz="1600" dirty="0">
-                <a:latin typeface="+mj-lt"/>
-              </a:rPr>
-              <a:t>- Mejorar su calidad de vida</a:t>
-            </a:r>
-          </a:p>
-        </p:txBody>
-      </p:sp>
-      <p:pic>
-        <p:nvPicPr>
-          <p:cNvPr id="15" name="Imagen 14">
-            <a:extLst>
-              <a:ext uri="{FF2B5EF4-FFF2-40B4-BE49-F238E27FC236}">
-                <a16:creationId xmlns:a16="http://schemas.microsoft.com/office/drawing/2014/main" id="{1406FFEF-3BF6-0F2C-F859-3394149D2C43}"/>
-              </a:ext>
-            </a:extLst>
-          </p:cNvPr>
-          <p:cNvPicPr>
-            <a:picLocks noChangeAspect="1"/>
-          </p:cNvPicPr>
-          <p:nvPr/>
-        </p:nvPicPr>
-        <p:blipFill>
-          <a:blip r:embed="rId3"/>
-          <a:stretch>
-            <a:fillRect/>
-          </a:stretch>
-        </p:blipFill>
-        <p:spPr>
-          <a:xfrm>
-            <a:off x="8167171" y="1209229"/>
-            <a:ext cx="607236" cy="607236"/>
-          </a:xfrm>
-          <a:prstGeom prst="rect">
-            <a:avLst/>
-          </a:prstGeom>
-        </p:spPr>
-      </p:pic>
-      <p:pic>
-        <p:nvPicPr>
-          <p:cNvPr id="17" name="Imagen 16">
-            <a:extLst>
-              <a:ext uri="{FF2B5EF4-FFF2-40B4-BE49-F238E27FC236}">
-                <a16:creationId xmlns:a16="http://schemas.microsoft.com/office/drawing/2014/main" id="{DFEE1F78-67F5-E96C-2743-B1AFDA904C61}"/>
-              </a:ext>
-            </a:extLst>
-          </p:cNvPr>
-          <p:cNvPicPr>
-            <a:picLocks noChangeAspect="1"/>
-          </p:cNvPicPr>
-          <p:nvPr/>
-        </p:nvPicPr>
-        <p:blipFill>
-          <a:blip r:embed="rId4"/>
-          <a:stretch>
-            <a:fillRect/>
-          </a:stretch>
-        </p:blipFill>
-        <p:spPr>
-          <a:xfrm>
-            <a:off x="11340910" y="2753291"/>
-            <a:ext cx="675709" cy="675709"/>
-          </a:xfrm>
-          <a:prstGeom prst="rect">
-            <a:avLst/>
-          </a:prstGeom>
-        </p:spPr>
-      </p:pic>
-      <p:sp>
-        <p:nvSpPr>
-          <p:cNvPr id="7" name="CuadroTexto 6">
-            <a:extLst>
-              <a:ext uri="{FF2B5EF4-FFF2-40B4-BE49-F238E27FC236}">
-                <a16:creationId xmlns:a16="http://schemas.microsoft.com/office/drawing/2014/main" id="{ACD346F2-5647-BAA5-39E3-D66DDF78D20A}"/>
-              </a:ext>
-            </a:extLst>
-          </p:cNvPr>
-          <p:cNvSpPr txBox="1"/>
-          <p:nvPr/>
-        </p:nvSpPr>
-        <p:spPr>
-          <a:xfrm>
-            <a:off x="3915246" y="3767616"/>
-            <a:ext cx="4152981" cy="1077218"/>
-          </a:xfrm>
-          <a:prstGeom prst="rect">
-            <a:avLst/>
-          </a:prstGeom>
-          <a:noFill/>
-        </p:spPr>
-        <p:txBody>
-          <a:bodyPr wrap="square" rtlCol="0">
-            <a:spAutoFit/>
-          </a:bodyPr>
-          <a:lstStyle/>
-          <a:p>
-            <a:r>
-              <a:rPr lang="es-ES" sz="1600" b="1" dirty="0">
-                <a:latin typeface="+mj-lt"/>
-              </a:rPr>
-              <a:t>¿QUE ES LO QUE DICE Y HACE?</a:t>
-            </a:r>
-          </a:p>
-          <a:p>
-            <a:r>
-              <a:rPr lang="es-ES" sz="1600" b="1" dirty="0">
-                <a:latin typeface="+mj-lt"/>
-              </a:rPr>
-              <a:t>Cliente: </a:t>
-            </a:r>
-            <a:r>
-              <a:rPr lang="es-ES" sz="1600" dirty="0">
-                <a:latin typeface="+mj-lt"/>
-              </a:rPr>
-              <a:t>- Busca opiniones en su comunidad</a:t>
-            </a:r>
-          </a:p>
-          <a:p>
-            <a:r>
-              <a:rPr lang="es-ES" sz="1600" b="1" dirty="0">
-                <a:latin typeface="+mj-lt"/>
-              </a:rPr>
-              <a:t>Proveedor: </a:t>
-            </a:r>
-            <a:r>
-              <a:rPr lang="es-ES" sz="1600" dirty="0">
-                <a:latin typeface="+mj-lt"/>
-              </a:rPr>
-              <a:t>- Presta servicios de buena calidad acordé a sus conocimientos</a:t>
-            </a:r>
-          </a:p>
-        </p:txBody>
-      </p:sp>
-      <p:pic>
-        <p:nvPicPr>
-          <p:cNvPr id="9" name="Imagen 8">
-            <a:extLst>
-              <a:ext uri="{FF2B5EF4-FFF2-40B4-BE49-F238E27FC236}">
-                <a16:creationId xmlns:a16="http://schemas.microsoft.com/office/drawing/2014/main" id="{32A66AC8-AC60-027E-56CD-720039D61A2D}"/>
-              </a:ext>
-            </a:extLst>
-          </p:cNvPr>
-          <p:cNvPicPr>
-            <a:picLocks noChangeAspect="1"/>
-          </p:cNvPicPr>
-          <p:nvPr/>
-        </p:nvPicPr>
-        <p:blipFill>
-          <a:blip r:embed="rId5"/>
-          <a:stretch>
-            <a:fillRect/>
-          </a:stretch>
-        </p:blipFill>
-        <p:spPr>
-          <a:xfrm>
-            <a:off x="8013144" y="4074979"/>
-            <a:ext cx="493269" cy="493269"/>
-          </a:xfrm>
-          <a:prstGeom prst="rect">
-            <a:avLst/>
-          </a:prstGeom>
-        </p:spPr>
-      </p:pic>
-      <p:sp>
-        <p:nvSpPr>
-          <p:cNvPr id="10" name="CuadroTexto 9">
-            <a:extLst>
-              <a:ext uri="{FF2B5EF4-FFF2-40B4-BE49-F238E27FC236}">
-                <a16:creationId xmlns:a16="http://schemas.microsoft.com/office/drawing/2014/main" id="{895EC70C-EC0C-E100-6F6F-28E95B433653}"/>
-              </a:ext>
-            </a:extLst>
-          </p:cNvPr>
-          <p:cNvSpPr txBox="1"/>
-          <p:nvPr/>
-        </p:nvSpPr>
-        <p:spPr>
-          <a:xfrm>
-            <a:off x="232214" y="2283572"/>
-            <a:ext cx="3245036" cy="1323439"/>
-          </a:xfrm>
-          <a:prstGeom prst="rect">
-            <a:avLst/>
-          </a:prstGeom>
-          <a:noFill/>
-        </p:spPr>
-        <p:txBody>
-          <a:bodyPr wrap="square" rtlCol="0">
-            <a:spAutoFit/>
-          </a:bodyPr>
-          <a:lstStyle/>
-          <a:p>
-            <a:r>
-              <a:rPr lang="es-ES" sz="1600" b="1" dirty="0">
-                <a:latin typeface="+mj-lt"/>
-              </a:rPr>
-              <a:t>¿QUE ES LO QUE OYE?</a:t>
-            </a:r>
-          </a:p>
-          <a:p>
-            <a:r>
-              <a:rPr lang="es-ES" sz="1600" b="1" dirty="0">
-                <a:latin typeface="+mj-lt"/>
-              </a:rPr>
-              <a:t>Cliente: </a:t>
-            </a:r>
-            <a:r>
-              <a:rPr lang="es-ES" sz="1600" dirty="0">
-                <a:latin typeface="+mj-lt"/>
-              </a:rPr>
-              <a:t>- Realización de servicios de baja calidad</a:t>
-            </a:r>
-          </a:p>
-          <a:p>
-            <a:r>
-              <a:rPr lang="es-ES" sz="1600" b="1" dirty="0">
-                <a:latin typeface="+mj-lt"/>
-              </a:rPr>
-              <a:t>Proveedor: </a:t>
-            </a:r>
-            <a:r>
-              <a:rPr lang="es-ES" sz="1600" dirty="0">
-                <a:latin typeface="+mj-lt"/>
-              </a:rPr>
-              <a:t>- Oportunidades escasas </a:t>
-            </a:r>
-          </a:p>
-          <a:p>
-            <a:r>
-              <a:rPr lang="es-ES" sz="1600" dirty="0">
-                <a:latin typeface="+mj-lt"/>
-              </a:rPr>
-              <a:t>-Falta de apoyo</a:t>
-            </a:r>
-          </a:p>
-        </p:txBody>
-      </p:sp>
-      <p:pic>
-        <p:nvPicPr>
-          <p:cNvPr id="11" name="Imagen 10">
-            <a:extLst>
-              <a:ext uri="{FF2B5EF4-FFF2-40B4-BE49-F238E27FC236}">
-                <a16:creationId xmlns:a16="http://schemas.microsoft.com/office/drawing/2014/main" id="{9F682A5E-D7ED-6087-D88A-4407AFCB5364}"/>
-              </a:ext>
-            </a:extLst>
-          </p:cNvPr>
-          <p:cNvPicPr>
-            <a:picLocks noChangeAspect="1"/>
-          </p:cNvPicPr>
-          <p:nvPr/>
-        </p:nvPicPr>
-        <p:blipFill>
-          <a:blip r:embed="rId6"/>
-          <a:stretch>
-            <a:fillRect/>
-          </a:stretch>
-        </p:blipFill>
-        <p:spPr>
-          <a:xfrm>
-            <a:off x="3685779" y="2513834"/>
-            <a:ext cx="675711" cy="675711"/>
-          </a:xfrm>
-          <a:prstGeom prst="rect">
-            <a:avLst/>
-          </a:prstGeom>
-        </p:spPr>
-      </p:pic>
-      <p:cxnSp>
-        <p:nvCxnSpPr>
-          <p:cNvPr id="3" name="Conector recto 2">
-            <a:extLst>
-              <a:ext uri="{FF2B5EF4-FFF2-40B4-BE49-F238E27FC236}">
-                <a16:creationId xmlns:a16="http://schemas.microsoft.com/office/drawing/2014/main" id="{E1A5093F-4A92-EC09-2310-355323C2AC97}"/>
-              </a:ext>
-            </a:extLst>
-          </p:cNvPr>
-          <p:cNvCxnSpPr>
-            <a:cxnSpLocks/>
-          </p:cNvCxnSpPr>
-          <p:nvPr/>
-        </p:nvCxnSpPr>
-        <p:spPr>
-          <a:xfrm>
-            <a:off x="44069" y="782885"/>
-            <a:ext cx="12147932" cy="4270184"/>
-          </a:xfrm>
-          <a:prstGeom prst="line">
-            <a:avLst/>
-          </a:prstGeom>
-        </p:spPr>
-        <p:style>
-          <a:lnRef idx="1">
-            <a:schemeClr val="dk1"/>
-          </a:lnRef>
-          <a:fillRef idx="0">
-            <a:schemeClr val="dk1"/>
-          </a:fillRef>
-          <a:effectRef idx="0">
-            <a:schemeClr val="dk1"/>
-          </a:effectRef>
-          <a:fontRef idx="minor">
-            <a:schemeClr val="tx1"/>
-          </a:fontRef>
-        </p:style>
-      </p:cxnSp>
-      <p:cxnSp>
-        <p:nvCxnSpPr>
-          <p:cNvPr id="14" name="Conector recto 13">
-            <a:extLst>
-              <a:ext uri="{FF2B5EF4-FFF2-40B4-BE49-F238E27FC236}">
-                <a16:creationId xmlns:a16="http://schemas.microsoft.com/office/drawing/2014/main" id="{8B73BF79-FB72-C8F9-DEFA-78ECC4197BBB}"/>
-              </a:ext>
-            </a:extLst>
-          </p:cNvPr>
-          <p:cNvCxnSpPr>
-            <a:cxnSpLocks/>
-          </p:cNvCxnSpPr>
-          <p:nvPr/>
-        </p:nvCxnSpPr>
-        <p:spPr>
-          <a:xfrm flipH="1">
-            <a:off x="-45595" y="782885"/>
-            <a:ext cx="12237595" cy="4270184"/>
-          </a:xfrm>
-          <a:prstGeom prst="line">
-            <a:avLst/>
-          </a:prstGeom>
-        </p:spPr>
-        <p:style>
-          <a:lnRef idx="1">
-            <a:schemeClr val="dk1"/>
-          </a:lnRef>
-          <a:fillRef idx="0">
-            <a:schemeClr val="dk1"/>
-          </a:fillRef>
-          <a:effectRef idx="0">
-            <a:schemeClr val="dk1"/>
-          </a:effectRef>
-          <a:fontRef idx="minor">
-            <a:schemeClr val="tx1"/>
-          </a:fontRef>
-        </p:style>
-      </p:cxnSp>
-      <p:cxnSp>
-        <p:nvCxnSpPr>
-          <p:cNvPr id="36" name="Conector recto 35">
-            <a:extLst>
-              <a:ext uri="{FF2B5EF4-FFF2-40B4-BE49-F238E27FC236}">
-                <a16:creationId xmlns:a16="http://schemas.microsoft.com/office/drawing/2014/main" id="{5A048461-5561-3ABE-ECEF-C0F2C6896E59}"/>
-              </a:ext>
-            </a:extLst>
-          </p:cNvPr>
-          <p:cNvCxnSpPr>
-            <a:cxnSpLocks/>
-          </p:cNvCxnSpPr>
-          <p:nvPr/>
-        </p:nvCxnSpPr>
-        <p:spPr>
-          <a:xfrm flipV="1">
-            <a:off x="44068" y="5082467"/>
-            <a:ext cx="12139707" cy="14671"/>
-          </a:xfrm>
-          <a:prstGeom prst="line">
-            <a:avLst/>
-          </a:prstGeom>
-        </p:spPr>
-        <p:style>
-          <a:lnRef idx="1">
-            <a:schemeClr val="dk1"/>
-          </a:lnRef>
-          <a:fillRef idx="0">
-            <a:schemeClr val="dk1"/>
-          </a:fillRef>
-          <a:effectRef idx="0">
-            <a:schemeClr val="dk1"/>
-          </a:effectRef>
-          <a:fontRef idx="minor">
-            <a:schemeClr val="tx1"/>
-          </a:fontRef>
-        </p:style>
-      </p:cxnSp>
-      <p:sp>
-        <p:nvSpPr>
-          <p:cNvPr id="44" name="CuadroTexto 43">
-            <a:extLst>
-              <a:ext uri="{FF2B5EF4-FFF2-40B4-BE49-F238E27FC236}">
-                <a16:creationId xmlns:a16="http://schemas.microsoft.com/office/drawing/2014/main" id="{C43C6928-0F5E-B932-CA55-0AEE5E2C42A8}"/>
-              </a:ext>
-            </a:extLst>
-          </p:cNvPr>
-          <p:cNvSpPr txBox="1"/>
-          <p:nvPr/>
-        </p:nvSpPr>
-        <p:spPr>
-          <a:xfrm>
-            <a:off x="6073203" y="5185620"/>
-            <a:ext cx="5577949" cy="1569660"/>
-          </a:xfrm>
-          <a:prstGeom prst="rect">
-            <a:avLst/>
-          </a:prstGeom>
-          <a:noFill/>
-        </p:spPr>
-        <p:txBody>
-          <a:bodyPr wrap="square" rtlCol="0">
-            <a:spAutoFit/>
-          </a:bodyPr>
-          <a:lstStyle/>
-          <a:p>
-            <a:r>
-              <a:rPr lang="es-ES" sz="1600" b="1" dirty="0">
-                <a:latin typeface="+mj-lt"/>
-              </a:rPr>
-              <a:t>RESULTADOS</a:t>
-            </a:r>
-          </a:p>
-          <a:p>
-            <a:r>
-              <a:rPr lang="es-ES" sz="1600" b="1" dirty="0">
-                <a:latin typeface="+mj-lt"/>
-              </a:rPr>
-              <a:t>Cliente: </a:t>
-            </a:r>
-            <a:r>
-              <a:rPr lang="es-ES" sz="1600" dirty="0">
-                <a:latin typeface="+mj-lt"/>
-              </a:rPr>
-              <a:t>- Servicios adquiridos de excelente calidad</a:t>
-            </a:r>
-          </a:p>
-          <a:p>
-            <a:r>
-              <a:rPr lang="es-ES" sz="1600" b="1" dirty="0">
-                <a:latin typeface="+mj-lt"/>
-              </a:rPr>
-              <a:t>Proveedor: </a:t>
-            </a:r>
-            <a:r>
-              <a:rPr lang="es-ES" sz="1600" dirty="0">
-                <a:latin typeface="+mj-lt"/>
-              </a:rPr>
-              <a:t>- Emprendimiento a gran escala</a:t>
-            </a:r>
-          </a:p>
-          <a:p>
-            <a:r>
-              <a:rPr lang="es-ES" sz="1600" dirty="0">
-                <a:latin typeface="+mj-lt"/>
-              </a:rPr>
-              <a:t>- Superación personal </a:t>
-            </a:r>
-          </a:p>
-          <a:p>
-            <a:r>
-              <a:rPr lang="es-ES" sz="1600" dirty="0">
-                <a:latin typeface="+mj-lt"/>
-              </a:rPr>
-              <a:t>- Más recomendaciones de sus clientes</a:t>
-            </a:r>
-          </a:p>
-          <a:p>
-            <a:r>
-              <a:rPr lang="es-ES" sz="1600" dirty="0">
-                <a:latin typeface="+mj-lt"/>
-              </a:rPr>
-              <a:t>- Éxito en la prestación de servicios</a:t>
-            </a:r>
-          </a:p>
-        </p:txBody>
-      </p:sp>
-      <p:pic>
-        <p:nvPicPr>
-          <p:cNvPr id="47" name="Imagen 46">
-            <a:extLst>
-              <a:ext uri="{FF2B5EF4-FFF2-40B4-BE49-F238E27FC236}">
-                <a16:creationId xmlns:a16="http://schemas.microsoft.com/office/drawing/2014/main" id="{4859D8F0-D5A4-AD92-367C-61E7CC5F4D56}"/>
-              </a:ext>
-            </a:extLst>
-          </p:cNvPr>
-          <p:cNvPicPr>
-            <a:picLocks noChangeAspect="1"/>
-          </p:cNvPicPr>
-          <p:nvPr/>
-        </p:nvPicPr>
-        <p:blipFill>
-          <a:blip r:embed="rId7"/>
-          <a:stretch>
-            <a:fillRect/>
-          </a:stretch>
-        </p:blipFill>
-        <p:spPr>
-          <a:xfrm>
-            <a:off x="11475417" y="5764846"/>
-            <a:ext cx="672516" cy="672516"/>
-          </a:xfrm>
-          <a:prstGeom prst="rect">
-            <a:avLst/>
-          </a:prstGeom>
-        </p:spPr>
-      </p:pic>
-      <p:cxnSp>
-        <p:nvCxnSpPr>
-          <p:cNvPr id="49" name="Conector recto 48">
-            <a:extLst>
-              <a:ext uri="{FF2B5EF4-FFF2-40B4-BE49-F238E27FC236}">
-                <a16:creationId xmlns:a16="http://schemas.microsoft.com/office/drawing/2014/main" id="{8F56039C-1692-4FEA-E302-615D52FD5E24}"/>
-              </a:ext>
-            </a:extLst>
-          </p:cNvPr>
-          <p:cNvCxnSpPr>
-            <a:cxnSpLocks/>
-          </p:cNvCxnSpPr>
-          <p:nvPr/>
-        </p:nvCxnSpPr>
-        <p:spPr>
-          <a:xfrm>
-            <a:off x="5915943" y="5126535"/>
-            <a:ext cx="1893" cy="1718612"/>
-          </a:xfrm>
-          <a:prstGeom prst="line">
-            <a:avLst/>
-          </a:prstGeom>
-        </p:spPr>
-        <p:style>
-          <a:lnRef idx="1">
-            <a:schemeClr val="dk1"/>
-          </a:lnRef>
-          <a:fillRef idx="0">
-            <a:schemeClr val="dk1"/>
-          </a:fillRef>
-          <a:effectRef idx="0">
-            <a:schemeClr val="dk1"/>
-          </a:effectRef>
-          <a:fontRef idx="minor">
-            <a:schemeClr val="tx1"/>
-          </a:fontRef>
-        </p:style>
-      </p:cxnSp>
-      <p:sp>
-        <p:nvSpPr>
-          <p:cNvPr id="52" name="CuadroTexto 51">
-            <a:extLst>
-              <a:ext uri="{FF2B5EF4-FFF2-40B4-BE49-F238E27FC236}">
-                <a16:creationId xmlns:a16="http://schemas.microsoft.com/office/drawing/2014/main" id="{82FD7941-C039-8395-2138-C1E7ABB86D71}"/>
-              </a:ext>
-            </a:extLst>
-          </p:cNvPr>
-          <p:cNvSpPr txBox="1"/>
-          <p:nvPr/>
-        </p:nvSpPr>
-        <p:spPr>
-          <a:xfrm>
-            <a:off x="44068" y="5300749"/>
-            <a:ext cx="4906179" cy="1323439"/>
-          </a:xfrm>
-          <a:prstGeom prst="rect">
-            <a:avLst/>
-          </a:prstGeom>
-          <a:noFill/>
-        </p:spPr>
-        <p:txBody>
-          <a:bodyPr wrap="square" rtlCol="0">
-            <a:spAutoFit/>
-          </a:bodyPr>
-          <a:lstStyle/>
-          <a:p>
-            <a:r>
-              <a:rPr lang="es-ES" sz="1600" b="1" dirty="0">
-                <a:latin typeface="+mj-lt"/>
-              </a:rPr>
-              <a:t>ESFUERZOS</a:t>
-            </a:r>
-          </a:p>
-          <a:p>
-            <a:r>
-              <a:rPr lang="es-ES" sz="1600" b="1" dirty="0">
-                <a:latin typeface="+mj-lt"/>
-              </a:rPr>
-              <a:t>Cliente: </a:t>
-            </a:r>
-            <a:r>
-              <a:rPr lang="es-ES" sz="1600" dirty="0">
-                <a:latin typeface="+mj-lt"/>
-              </a:rPr>
-              <a:t>- No hay soluciones a sus necesidades</a:t>
-            </a:r>
-          </a:p>
-          <a:p>
-            <a:r>
-              <a:rPr lang="es-ES" sz="1600" b="1" dirty="0">
-                <a:latin typeface="+mj-lt"/>
-              </a:rPr>
-              <a:t>Proveedor: </a:t>
-            </a:r>
-            <a:r>
-              <a:rPr lang="es-ES" sz="1600" dirty="0">
-                <a:latin typeface="+mj-lt"/>
-              </a:rPr>
-              <a:t>- No alcanzar sus metas propuestas</a:t>
-            </a:r>
-          </a:p>
-          <a:p>
-            <a:r>
-              <a:rPr lang="es-ES" sz="1600" dirty="0">
-                <a:latin typeface="+mj-lt"/>
-              </a:rPr>
-              <a:t>- Dificultad para darse a conocer</a:t>
-            </a:r>
-          </a:p>
-          <a:p>
-            <a:r>
-              <a:rPr lang="es-ES" sz="1600" dirty="0">
-                <a:latin typeface="+mj-lt"/>
-              </a:rPr>
-              <a:t>- Miedo al fracaso</a:t>
-            </a:r>
-          </a:p>
-        </p:txBody>
-      </p:sp>
-      <p:pic>
-        <p:nvPicPr>
-          <p:cNvPr id="53" name="Imagen 52">
-            <a:extLst>
-              <a:ext uri="{FF2B5EF4-FFF2-40B4-BE49-F238E27FC236}">
-                <a16:creationId xmlns:a16="http://schemas.microsoft.com/office/drawing/2014/main" id="{09DC1441-E76F-7767-EFCB-062CF21A205B}"/>
-              </a:ext>
-            </a:extLst>
-          </p:cNvPr>
-          <p:cNvPicPr>
-            <a:picLocks noChangeAspect="1"/>
-          </p:cNvPicPr>
-          <p:nvPr/>
-        </p:nvPicPr>
-        <p:blipFill>
-          <a:blip r:embed="rId8"/>
-          <a:stretch>
-            <a:fillRect/>
-          </a:stretch>
-        </p:blipFill>
-        <p:spPr>
-          <a:xfrm>
-            <a:off x="4546508" y="5718955"/>
-            <a:ext cx="807477" cy="807477"/>
-          </a:xfrm>
-          <a:prstGeom prst="rect">
-            <a:avLst/>
-          </a:prstGeom>
-        </p:spPr>
-      </p:pic>
+              </a:rPr>
+              <a:t>Diccionario de datos</a:t>
+            </a:r>
+          </a:p>
+        </p:txBody>
+      </p:sp>
     </p:spTree>
     <p:extLst>
       <p:ext uri="{BB962C8B-B14F-4D97-AF65-F5344CB8AC3E}">
-        <p14:creationId xmlns:p14="http://schemas.microsoft.com/office/powerpoint/2010/main" val="3622025240"/>
+        <p14:creationId xmlns:p14="http://schemas.microsoft.com/office/powerpoint/2010/main" val="4196182800"/>
       </p:ext>
     </p:extLst>
   </p:cSld>
@@ -8359,8 +8435,8 @@
         </p:nvSpPr>
         <p:spPr>
           <a:xfrm>
-            <a:off x="3012560" y="421131"/>
-            <a:ext cx="6195235" cy="666786"/>
+            <a:off x="-210038" y="398307"/>
+            <a:ext cx="11078244" cy="666786"/>
           </a:xfrm>
           <a:prstGeom prst="rect">
             <a:avLst/>
@@ -8380,7 +8456,7 @@
                   <a:srgbClr val="FF6C00"/>
                 </a:solidFill>
               </a:rPr>
-              <a:t>Diccionario de datos</a:t>
+              <a:t>Modelado MER (Modelo Entidad Relación)</a:t>
             </a:r>
           </a:p>
         </p:txBody>
@@ -8388,7 +8464,7 @@
     </p:spTree>
     <p:extLst>
       <p:ext uri="{BB962C8B-B14F-4D97-AF65-F5344CB8AC3E}">
-        <p14:creationId xmlns:p14="http://schemas.microsoft.com/office/powerpoint/2010/main" val="4196182800"/>
+        <p14:creationId xmlns:p14="http://schemas.microsoft.com/office/powerpoint/2010/main" val="279892807"/>
       </p:ext>
     </p:extLst>
   </p:cSld>
@@ -8429,8 +8505,8 @@
         </p:nvSpPr>
         <p:spPr>
           <a:xfrm>
-            <a:off x="-210038" y="398307"/>
-            <a:ext cx="11078244" cy="666786"/>
+            <a:off x="6096000" y="5067059"/>
+            <a:ext cx="5868571" cy="1241237"/>
           </a:xfrm>
           <a:prstGeom prst="rect">
             <a:avLst/>
@@ -8450,7 +8526,18 @@
                   <a:srgbClr val="FF6C00"/>
                 </a:solidFill>
               </a:rPr>
-              <a:t>Modelado MER (Modelo Entidad Relación)</a:t>
+              <a:t>Modelado MR </a:t>
+            </a:r>
+          </a:p>
+          <a:p>
+            <a:pPr algn="ctr"/>
+            <a:r>
+              <a:rPr lang="es-ES" sz="3733" b="1" dirty="0">
+                <a:solidFill>
+                  <a:srgbClr val="FF6C00"/>
+                </a:solidFill>
+              </a:rPr>
+              <a:t>(Modelo Relacional)</a:t>
             </a:r>
           </a:p>
         </p:txBody>
@@ -8458,7 +8545,7 @@
     </p:spTree>
     <p:extLst>
       <p:ext uri="{BB962C8B-B14F-4D97-AF65-F5344CB8AC3E}">
-        <p14:creationId xmlns:p14="http://schemas.microsoft.com/office/powerpoint/2010/main" val="279892807"/>
+        <p14:creationId xmlns:p14="http://schemas.microsoft.com/office/powerpoint/2010/main" val="1980260065"/>
       </p:ext>
     </p:extLst>
   </p:cSld>
@@ -8499,8 +8586,8 @@
         </p:nvSpPr>
         <p:spPr>
           <a:xfrm>
-            <a:off x="6096000" y="5067059"/>
-            <a:ext cx="5868571" cy="1241237"/>
+            <a:off x="2998383" y="421131"/>
+            <a:ext cx="6195235" cy="666786"/>
           </a:xfrm>
           <a:prstGeom prst="rect">
             <a:avLst/>
@@ -8520,18 +8607,7 @@
                   <a:srgbClr val="FF6C00"/>
                 </a:solidFill>
               </a:rPr>
-              <a:t>Modelado MR </a:t>
-            </a:r>
-          </a:p>
-          <a:p>
-            <a:pPr algn="ctr"/>
-            <a:r>
-              <a:rPr lang="es-ES" sz="3733" b="1" dirty="0">
-                <a:solidFill>
-                  <a:srgbClr val="FF6C00"/>
-                </a:solidFill>
-              </a:rPr>
-              <a:t>(Modelo Relacional)</a:t>
+              <a:t>Script de la base de datos</a:t>
             </a:r>
           </a:p>
         </p:txBody>
@@ -8539,7 +8615,7 @@
     </p:spTree>
     <p:extLst>
       <p:ext uri="{BB962C8B-B14F-4D97-AF65-F5344CB8AC3E}">
-        <p14:creationId xmlns:p14="http://schemas.microsoft.com/office/powerpoint/2010/main" val="1980260065"/>
+        <p14:creationId xmlns:p14="http://schemas.microsoft.com/office/powerpoint/2010/main" val="3458874268"/>
       </p:ext>
     </p:extLst>
   </p:cSld>
@@ -8568,20 +8644,14 @@
       </p:grpSpPr>
       <p:sp>
         <p:nvSpPr>
-          <p:cNvPr id="5" name="CuadroTexto 4">
-            <a:extLst>
-              <a:ext uri="{FF2B5EF4-FFF2-40B4-BE49-F238E27FC236}">
-                <a16:creationId xmlns:a16="http://schemas.microsoft.com/office/drawing/2014/main" id="{1BE7FA7E-C3EC-4186-AFBD-5BB81C7A131D}"/>
-              </a:ext>
-            </a:extLst>
-          </p:cNvPr>
+          <p:cNvPr id="2" name="CuadroTexto 1"/>
           <p:cNvSpPr txBox="1"/>
           <p:nvPr/>
         </p:nvSpPr>
         <p:spPr>
           <a:xfrm>
-            <a:off x="2998383" y="421131"/>
-            <a:ext cx="6195235" cy="666786"/>
+            <a:off x="510491" y="332660"/>
+            <a:ext cx="4408840" cy="830997"/>
           </a:xfrm>
           <a:prstGeom prst="rect">
             <a:avLst/>
@@ -8594,35 +8664,121 @@
           </a:bodyPr>
           <a:lstStyle/>
           <a:p>
-            <a:pPr algn="ctr"/>
-            <a:r>
-              <a:rPr lang="es-ES" sz="3733" b="1" dirty="0">
+            <a:r>
+              <a:rPr lang="es-ES" sz="4800" b="1" dirty="0">
                 <a:solidFill>
-                  <a:srgbClr val="FF6C00"/>
+                  <a:schemeClr val="bg1"/>
                 </a:solidFill>
               </a:rPr>
-              <a:t>Diseño del </a:t>
-            </a:r>
-            <a:r>
-              <a:rPr lang="es-ES" sz="3733" b="1" dirty="0" err="1">
-                <a:solidFill>
-                  <a:srgbClr val="FF6C00"/>
-                </a:solidFill>
-              </a:rPr>
-              <a:t>index</a:t>
-            </a:r>
-            <a:endParaRPr lang="es-ES" sz="3733" b="1" dirty="0">
-              <a:solidFill>
-                <a:srgbClr val="FF6C00"/>
-              </a:solidFill>
+              <a:t>Conclusiones </a:t>
+            </a:r>
+          </a:p>
+        </p:txBody>
+      </p:sp>
+      <p:sp>
+        <p:nvSpPr>
+          <p:cNvPr id="8" name="CuadroTexto 7">
+            <a:extLst>
+              <a:ext uri="{FF2B5EF4-FFF2-40B4-BE49-F238E27FC236}">
+                <a16:creationId xmlns:a16="http://schemas.microsoft.com/office/drawing/2014/main" id="{F8C7B26D-E9A2-4838-8972-83BB0387A627}"/>
+              </a:ext>
+            </a:extLst>
+          </p:cNvPr>
+          <p:cNvSpPr txBox="1"/>
+          <p:nvPr/>
+        </p:nvSpPr>
+        <p:spPr>
+          <a:xfrm>
+            <a:off x="184424" y="1821465"/>
+            <a:ext cx="11823152" cy="3416320"/>
+          </a:xfrm>
+          <a:prstGeom prst="rect">
+            <a:avLst/>
+          </a:prstGeom>
+          <a:noFill/>
+        </p:spPr>
+        <p:txBody>
+          <a:bodyPr wrap="square" rtlCol="0">
+            <a:spAutoFit/>
+          </a:bodyPr>
+          <a:lstStyle/>
+          <a:p>
+            <a:pPr marL="380990" indent="-380990" algn="just" defTabSz="1257621" hangingPunct="0">
+              <a:buFontTx/>
+              <a:buChar char="-"/>
+            </a:pPr>
+            <a:r>
+              <a:rPr lang="es-ES" sz="2400" dirty="0">
+                <a:ea typeface="Helvetica Neue"/>
+                <a:cs typeface="Calibir"/>
+                <a:sym typeface="Helvetica Neue"/>
+              </a:rPr>
+              <a:t>Tras la documentación mostrada, podemos deducir que los objetivos planteados están dirigidos a solucionar la problemática principal de nuestro proyecto, dado que actualmente no se ve resuelta por completo en el mercado, y de allí se derivan oportunidades para </a:t>
+            </a:r>
+            <a:r>
+              <a:rPr lang="es-ES" sz="2400" dirty="0" err="1">
+                <a:ea typeface="Helvetica Neue"/>
+                <a:cs typeface="Calibir"/>
+                <a:sym typeface="Helvetica Neue"/>
+              </a:rPr>
+              <a:t>Service</a:t>
+            </a:r>
+            <a:r>
+              <a:rPr lang="es-ES" sz="2400" dirty="0">
+                <a:ea typeface="Helvetica Neue"/>
+                <a:cs typeface="Calibir"/>
+                <a:sym typeface="Helvetica Neue"/>
+              </a:rPr>
+              <a:t> </a:t>
+            </a:r>
+            <a:r>
+              <a:rPr lang="es-ES" sz="2400" dirty="0" err="1">
+                <a:ea typeface="Helvetica Neue"/>
+                <a:cs typeface="Calibir"/>
+                <a:sym typeface="Helvetica Neue"/>
+              </a:rPr>
+              <a:t>Market</a:t>
+            </a:r>
+            <a:r>
+              <a:rPr lang="es-ES" sz="2400" dirty="0">
+                <a:ea typeface="Helvetica Neue"/>
+                <a:cs typeface="Calibir"/>
+                <a:sym typeface="Helvetica Neue"/>
+              </a:rPr>
+              <a:t>.</a:t>
+            </a:r>
+          </a:p>
+          <a:p>
+            <a:pPr marL="380990" indent="-380990" algn="just" defTabSz="1257621" hangingPunct="0">
+              <a:buFontTx/>
+              <a:buChar char="-"/>
+            </a:pPr>
+            <a:endParaRPr lang="es-ES" sz="2400" dirty="0">
+              <a:ea typeface="Helvetica Neue"/>
+              <a:cs typeface="Calibir"/>
+              <a:sym typeface="Helvetica Neue"/>
             </a:endParaRPr>
+          </a:p>
+          <a:p>
+            <a:pPr marL="380990" indent="-380990" algn="just" defTabSz="1257621" hangingPunct="0">
+              <a:buFontTx/>
+              <a:buChar char="-"/>
+            </a:pPr>
+            <a:r>
+              <a:rPr lang="es-ES" sz="2400" dirty="0">
+                <a:ea typeface="Helvetica Neue"/>
+                <a:cs typeface="Calibir"/>
+                <a:sym typeface="Helvetica Neue"/>
+              </a:rPr>
+              <a:t>Según los datos expuestos, podemos concluir que nuestra aplicación web va a ser un canal de comunicación para clientes y prestadores de servicios que estén dispuestos a darse a conocer, generando así mas ganancias, una negociación a una escala mayor y aumentando la credibilidad de aquellos prestadores de servicios que requieran una ayuda.</a:t>
+            </a:r>
           </a:p>
         </p:txBody>
       </p:sp>
     </p:spTree>
     <p:extLst>
       <p:ext uri="{BB962C8B-B14F-4D97-AF65-F5344CB8AC3E}">
-        <p14:creationId xmlns:p14="http://schemas.microsoft.com/office/powerpoint/2010/main" val="3430940337"/>
+        <p14:creationId xmlns:p14="http://schemas.microsoft.com/office/powerpoint/2010/main" val="224373756"/>
       </p:ext>
     </p:extLst>
   </p:cSld>
@@ -8651,239 +8807,6 @@
       </p:grpSpPr>
       <p:sp>
         <p:nvSpPr>
-          <p:cNvPr id="5" name="CuadroTexto 4">
-            <a:extLst>
-              <a:ext uri="{FF2B5EF4-FFF2-40B4-BE49-F238E27FC236}">
-                <a16:creationId xmlns:a16="http://schemas.microsoft.com/office/drawing/2014/main" id="{1BE7FA7E-C3EC-4186-AFBD-5BB81C7A131D}"/>
-              </a:ext>
-            </a:extLst>
-          </p:cNvPr>
-          <p:cNvSpPr txBox="1"/>
-          <p:nvPr/>
-        </p:nvSpPr>
-        <p:spPr>
-          <a:xfrm>
-            <a:off x="2998383" y="421131"/>
-            <a:ext cx="6195235" cy="666786"/>
-          </a:xfrm>
-          <a:prstGeom prst="rect">
-            <a:avLst/>
-          </a:prstGeom>
-          <a:noFill/>
-        </p:spPr>
-        <p:txBody>
-          <a:bodyPr wrap="square" rtlCol="0">
-            <a:spAutoFit/>
-          </a:bodyPr>
-          <a:lstStyle/>
-          <a:p>
-            <a:pPr algn="ctr"/>
-            <a:r>
-              <a:rPr lang="es-ES" sz="3733" b="1" dirty="0">
-                <a:solidFill>
-                  <a:srgbClr val="FF6C00"/>
-                </a:solidFill>
-              </a:rPr>
-              <a:t>Script de la base de datos</a:t>
-            </a:r>
-          </a:p>
-        </p:txBody>
-      </p:sp>
-    </p:spTree>
-    <p:extLst>
-      <p:ext uri="{BB962C8B-B14F-4D97-AF65-F5344CB8AC3E}">
-        <p14:creationId xmlns:p14="http://schemas.microsoft.com/office/powerpoint/2010/main" val="3458874268"/>
-      </p:ext>
-    </p:extLst>
-  </p:cSld>
-  <p:clrMapOvr>
-    <a:masterClrMapping/>
-  </p:clrMapOvr>
-</p:sld>
-</file>
-
-<file path=ppt/slides/slide35.xml><?xml version="1.0" encoding="utf-8"?>
-<p:sld xmlns:a="http://schemas.openxmlformats.org/drawingml/2006/main" xmlns:r="http://schemas.openxmlformats.org/officeDocument/2006/relationships" xmlns:p="http://schemas.openxmlformats.org/presentationml/2006/main">
-  <p:cSld>
-    <p:spTree>
-      <p:nvGrpSpPr>
-        <p:cNvPr id="1" name=""/>
-        <p:cNvGrpSpPr/>
-        <p:nvPr/>
-      </p:nvGrpSpPr>
-      <p:grpSpPr>
-        <a:xfrm>
-          <a:off x="0" y="0"/>
-          <a:ext cx="0" cy="0"/>
-          <a:chOff x="0" y="0"/>
-          <a:chExt cx="0" cy="0"/>
-        </a:xfrm>
-      </p:grpSpPr>
-      <p:sp>
-        <p:nvSpPr>
-          <p:cNvPr id="2" name="CuadroTexto 1"/>
-          <p:cNvSpPr txBox="1"/>
-          <p:nvPr/>
-        </p:nvSpPr>
-        <p:spPr>
-          <a:xfrm>
-            <a:off x="510491" y="332660"/>
-            <a:ext cx="4408840" cy="830997"/>
-          </a:xfrm>
-          <a:prstGeom prst="rect">
-            <a:avLst/>
-          </a:prstGeom>
-          <a:noFill/>
-        </p:spPr>
-        <p:txBody>
-          <a:bodyPr wrap="square" rtlCol="0">
-            <a:spAutoFit/>
-          </a:bodyPr>
-          <a:lstStyle/>
-          <a:p>
-            <a:r>
-              <a:rPr lang="es-ES" sz="4800" b="1" dirty="0">
-                <a:solidFill>
-                  <a:schemeClr val="bg1"/>
-                </a:solidFill>
-              </a:rPr>
-              <a:t>Conclusiones </a:t>
-            </a:r>
-          </a:p>
-        </p:txBody>
-      </p:sp>
-      <p:sp>
-        <p:nvSpPr>
-          <p:cNvPr id="8" name="CuadroTexto 7">
-            <a:extLst>
-              <a:ext uri="{FF2B5EF4-FFF2-40B4-BE49-F238E27FC236}">
-                <a16:creationId xmlns:a16="http://schemas.microsoft.com/office/drawing/2014/main" id="{F8C7B26D-E9A2-4838-8972-83BB0387A627}"/>
-              </a:ext>
-            </a:extLst>
-          </p:cNvPr>
-          <p:cNvSpPr txBox="1"/>
-          <p:nvPr/>
-        </p:nvSpPr>
-        <p:spPr>
-          <a:xfrm>
-            <a:off x="184424" y="1821465"/>
-            <a:ext cx="11823152" cy="3416320"/>
-          </a:xfrm>
-          <a:prstGeom prst="rect">
-            <a:avLst/>
-          </a:prstGeom>
-          <a:noFill/>
-        </p:spPr>
-        <p:txBody>
-          <a:bodyPr wrap="square" rtlCol="0">
-            <a:spAutoFit/>
-          </a:bodyPr>
-          <a:lstStyle/>
-          <a:p>
-            <a:pPr marL="380990" indent="-380990" algn="just" defTabSz="1257621" hangingPunct="0">
-              <a:buFontTx/>
-              <a:buChar char="-"/>
-            </a:pPr>
-            <a:r>
-              <a:rPr lang="es-ES" sz="2400" dirty="0">
-                <a:ea typeface="Helvetica Neue"/>
-                <a:cs typeface="Calibir"/>
-                <a:sym typeface="Helvetica Neue"/>
-              </a:rPr>
-              <a:t>Tras la documentación mostrada, podemos deducir que los objetivos planteados están dirigidos a solucionar la problemática principal de nuestro proyecto, dado que actualmente no se ve resuelta por completo en el mercado, y de allí se derivan oportunidades para </a:t>
-            </a:r>
-            <a:r>
-              <a:rPr lang="es-ES" sz="2400" dirty="0" err="1">
-                <a:ea typeface="Helvetica Neue"/>
-                <a:cs typeface="Calibir"/>
-                <a:sym typeface="Helvetica Neue"/>
-              </a:rPr>
-              <a:t>Service</a:t>
-            </a:r>
-            <a:r>
-              <a:rPr lang="es-ES" sz="2400" dirty="0">
-                <a:ea typeface="Helvetica Neue"/>
-                <a:cs typeface="Calibir"/>
-                <a:sym typeface="Helvetica Neue"/>
-              </a:rPr>
-              <a:t> </a:t>
-            </a:r>
-            <a:r>
-              <a:rPr lang="es-ES" sz="2400" dirty="0" err="1">
-                <a:ea typeface="Helvetica Neue"/>
-                <a:cs typeface="Calibir"/>
-                <a:sym typeface="Helvetica Neue"/>
-              </a:rPr>
-              <a:t>Market</a:t>
-            </a:r>
-            <a:r>
-              <a:rPr lang="es-ES" sz="2400" dirty="0">
-                <a:ea typeface="Helvetica Neue"/>
-                <a:cs typeface="Calibir"/>
-                <a:sym typeface="Helvetica Neue"/>
-              </a:rPr>
-              <a:t>.</a:t>
-            </a:r>
-          </a:p>
-          <a:p>
-            <a:pPr marL="380990" indent="-380990" algn="just" defTabSz="1257621" hangingPunct="0">
-              <a:buFontTx/>
-              <a:buChar char="-"/>
-            </a:pPr>
-            <a:endParaRPr lang="es-ES" sz="2400" dirty="0">
-              <a:ea typeface="Helvetica Neue"/>
-              <a:cs typeface="Calibir"/>
-              <a:sym typeface="Helvetica Neue"/>
-            </a:endParaRPr>
-          </a:p>
-          <a:p>
-            <a:pPr marL="380990" indent="-380990" algn="just" defTabSz="1257621" hangingPunct="0">
-              <a:buFontTx/>
-              <a:buChar char="-"/>
-            </a:pPr>
-            <a:r>
-              <a:rPr lang="es-ES" sz="2400" dirty="0">
-                <a:ea typeface="Helvetica Neue"/>
-                <a:cs typeface="Calibir"/>
-                <a:sym typeface="Helvetica Neue"/>
-              </a:rPr>
-              <a:t>Según los datos expuestos, podemos concluir que nuestra aplicación web va a ser un canal de comunicación para clientes y prestadores de servicios que estén dispuestos a darse a conocer, generando así mas ganancias, una negociación a una escala mayor y aumentando la credibilidad de aquellos prestadores de servicios que requieran una ayuda.</a:t>
-            </a:r>
-          </a:p>
-        </p:txBody>
-      </p:sp>
-    </p:spTree>
-    <p:extLst>
-      <p:ext uri="{BB962C8B-B14F-4D97-AF65-F5344CB8AC3E}">
-        <p14:creationId xmlns:p14="http://schemas.microsoft.com/office/powerpoint/2010/main" val="224373756"/>
-      </p:ext>
-    </p:extLst>
-  </p:cSld>
-  <p:clrMapOvr>
-    <a:masterClrMapping/>
-  </p:clrMapOvr>
-</p:sld>
-</file>
-
-<file path=ppt/slides/slide36.xml><?xml version="1.0" encoding="utf-8"?>
-<p:sld xmlns:a="http://schemas.openxmlformats.org/drawingml/2006/main" xmlns:r="http://schemas.openxmlformats.org/officeDocument/2006/relationships" xmlns:p="http://schemas.openxmlformats.org/presentationml/2006/main">
-  <p:cSld>
-    <p:spTree>
-      <p:nvGrpSpPr>
-        <p:cNvPr id="1" name=""/>
-        <p:cNvGrpSpPr/>
-        <p:nvPr/>
-      </p:nvGrpSpPr>
-      <p:grpSpPr>
-        <a:xfrm>
-          <a:off x="0" y="0"/>
-          <a:ext cx="0" cy="0"/>
-          <a:chOff x="0" y="0"/>
-          <a:chExt cx="0" cy="0"/>
-        </a:xfrm>
-      </p:grpSpPr>
-      <p:sp>
-        <p:nvSpPr>
           <p:cNvPr id="2" name="CuadroTexto 1"/>
           <p:cNvSpPr txBox="1"/>
           <p:nvPr/>
@@ -9309,7 +9232,7 @@
 </p:sld>
 </file>
 
-<file path=ppt/slides/slide37.xml><?xml version="1.0" encoding="utf-8"?>
+<file path=ppt/slides/slide35.xml><?xml version="1.0" encoding="utf-8"?>
 <p:sld xmlns:a="http://schemas.openxmlformats.org/drawingml/2006/main" xmlns:r="http://schemas.openxmlformats.org/officeDocument/2006/relationships" xmlns:p="http://schemas.openxmlformats.org/presentationml/2006/main">
   <p:cSld>
     <p:spTree>
@@ -11504,7 +11427,7 @@
                 <a:latin typeface="Calibri" panose="020F0502020204030204" pitchFamily="34" charset="0"/>
                 <a:cs typeface="Calibri" panose="020F0502020204030204" pitchFamily="34" charset="0"/>
               </a:rPr>
-              <a:t>- Publicidad para vendedores.</a:t>
+              <a:t>- Publicidad para prestadores de servicios.</a:t>
             </a:r>
           </a:p>
         </p:txBody>

</xml_diff>

<commit_message>
script base de datos
</commit_message>
<xml_diff>
--- a/PROYECTO FORMATIVO.pptx
+++ b/PROYECTO FORMATIVO.pptx
@@ -283,7 +283,7 @@
           <a:p>
             <a:fld id="{88369B9F-131C-2846-AB8F-CEE154B4CAEB}" type="datetimeFigureOut">
               <a:rPr lang="es-CO" smtClean="0"/>
-              <a:t>27/11/2022</a:t>
+              <a:t>28/11/2022</a:t>
             </a:fld>
             <a:endParaRPr lang="es-CO"/>
           </a:p>
@@ -460,7 +460,7 @@
           <a:p>
             <a:fld id="{9660CB96-A603-FF42-AE46-F5F75F80A67B}" type="datetimeFigureOut">
               <a:rPr lang="es-CO" smtClean="0"/>
-              <a:t>27/11/2022</a:t>
+              <a:t>28/11/2022</a:t>
             </a:fld>
             <a:endParaRPr lang="es-CO"/>
           </a:p>
@@ -1129,7 +1129,7 @@
           <a:p>
             <a:fld id="{BD986248-06F7-A441-A47A-264EBD310E11}" type="datetimeFigureOut">
               <a:rPr lang="es-CO" smtClean="0"/>
-              <a:t>27/11/2022</a:t>
+              <a:t>28/11/2022</a:t>
             </a:fld>
             <a:endParaRPr lang="es-CO"/>
           </a:p>
@@ -1329,7 +1329,7 @@
           <a:p>
             <a:fld id="{BD986248-06F7-A441-A47A-264EBD310E11}" type="datetimeFigureOut">
               <a:rPr lang="es-CO" smtClean="0"/>
-              <a:t>27/11/2022</a:t>
+              <a:t>28/11/2022</a:t>
             </a:fld>
             <a:endParaRPr lang="es-CO"/>
           </a:p>
@@ -1539,7 +1539,7 @@
           <a:p>
             <a:fld id="{BD986248-06F7-A441-A47A-264EBD310E11}" type="datetimeFigureOut">
               <a:rPr lang="es-CO" smtClean="0"/>
-              <a:t>27/11/2022</a:t>
+              <a:t>28/11/2022</a:t>
             </a:fld>
             <a:endParaRPr lang="es-CO"/>
           </a:p>
@@ -1802,7 +1802,7 @@
           <a:p>
             <a:fld id="{BD986248-06F7-A441-A47A-264EBD310E11}" type="datetimeFigureOut">
               <a:rPr lang="es-CO" smtClean="0"/>
-              <a:t>27/11/2022</a:t>
+              <a:t>28/11/2022</a:t>
             </a:fld>
             <a:endParaRPr lang="es-CO"/>
           </a:p>
@@ -2068,7 +2068,7 @@
           <a:p>
             <a:fld id="{BD986248-06F7-A441-A47A-264EBD310E11}" type="datetimeFigureOut">
               <a:rPr lang="es-CO" smtClean="0"/>
-              <a:t>27/11/2022</a:t>
+              <a:t>28/11/2022</a:t>
             </a:fld>
             <a:endParaRPr lang="es-CO"/>
           </a:p>
@@ -2344,7 +2344,7 @@
           <a:p>
             <a:fld id="{BD986248-06F7-A441-A47A-264EBD310E11}" type="datetimeFigureOut">
               <a:rPr lang="es-CO" smtClean="0"/>
-              <a:t>27/11/2022</a:t>
+              <a:t>28/11/2022</a:t>
             </a:fld>
             <a:endParaRPr lang="es-CO"/>
           </a:p>
@@ -2612,7 +2612,7 @@
           <a:p>
             <a:fld id="{BD986248-06F7-A441-A47A-264EBD310E11}" type="datetimeFigureOut">
               <a:rPr lang="es-CO" smtClean="0"/>
-              <a:t>27/11/2022</a:t>
+              <a:t>28/11/2022</a:t>
             </a:fld>
             <a:endParaRPr lang="es-CO"/>
           </a:p>
@@ -3027,7 +3027,7 @@
           <a:p>
             <a:fld id="{BD986248-06F7-A441-A47A-264EBD310E11}" type="datetimeFigureOut">
               <a:rPr lang="es-CO" smtClean="0"/>
-              <a:t>27/11/2022</a:t>
+              <a:t>28/11/2022</a:t>
             </a:fld>
             <a:endParaRPr lang="es-CO"/>
           </a:p>
@@ -3169,7 +3169,7 @@
           <a:p>
             <a:fld id="{BD986248-06F7-A441-A47A-264EBD310E11}" type="datetimeFigureOut">
               <a:rPr lang="es-CO" smtClean="0"/>
-              <a:t>27/11/2022</a:t>
+              <a:t>28/11/2022</a:t>
             </a:fld>
             <a:endParaRPr lang="es-CO"/>
           </a:p>
@@ -3282,7 +3282,7 @@
           <a:p>
             <a:fld id="{BD986248-06F7-A441-A47A-264EBD310E11}" type="datetimeFigureOut">
               <a:rPr lang="es-CO" smtClean="0"/>
-              <a:t>27/11/2022</a:t>
+              <a:t>28/11/2022</a:t>
             </a:fld>
             <a:endParaRPr lang="es-CO"/>
           </a:p>
@@ -3595,7 +3595,7 @@
           <a:p>
             <a:fld id="{BD986248-06F7-A441-A47A-264EBD310E11}" type="datetimeFigureOut">
               <a:rPr lang="es-CO" smtClean="0"/>
-              <a:t>27/11/2022</a:t>
+              <a:t>28/11/2022</a:t>
             </a:fld>
             <a:endParaRPr lang="es-CO"/>
           </a:p>
@@ -3884,7 +3884,7 @@
           <a:p>
             <a:fld id="{BD986248-06F7-A441-A47A-264EBD310E11}" type="datetimeFigureOut">
               <a:rPr lang="es-CO" smtClean="0"/>
-              <a:t>27/11/2022</a:t>
+              <a:t>28/11/2022</a:t>
             </a:fld>
             <a:endParaRPr lang="es-CO"/>
           </a:p>
@@ -4127,7 +4127,7 @@
           <a:p>
             <a:fld id="{BD986248-06F7-A441-A47A-264EBD310E11}" type="datetimeFigureOut">
               <a:rPr lang="es-CO" smtClean="0"/>
-              <a:t>27/11/2022</a:t>
+              <a:t>28/11/2022</a:t>
             </a:fld>
             <a:endParaRPr lang="es-CO"/>
           </a:p>
@@ -8018,6 +8018,36 @@
           <a:chExt cx="0" cy="0"/>
         </a:xfrm>
       </p:grpSpPr>
+      <p:pic>
+        <p:nvPicPr>
+          <p:cNvPr id="3" name="Imagen 2">
+            <a:extLst>
+              <a:ext uri="{FF2B5EF4-FFF2-40B4-BE49-F238E27FC236}">
+                <a16:creationId xmlns:a16="http://schemas.microsoft.com/office/drawing/2014/main" id="{65A446D2-A0D7-0AC9-1B40-932F5E0C2CE9}"/>
+              </a:ext>
+            </a:extLst>
+          </p:cNvPr>
+          <p:cNvPicPr>
+            <a:picLocks noChangeAspect="1"/>
+          </p:cNvPicPr>
+          <p:nvPr/>
+        </p:nvPicPr>
+        <p:blipFill>
+          <a:blip r:embed="rId2"/>
+          <a:stretch>
+            <a:fillRect/>
+          </a:stretch>
+        </p:blipFill>
+        <p:spPr>
+          <a:xfrm>
+            <a:off x="0" y="0"/>
+            <a:ext cx="5563892" cy="6858000"/>
+          </a:xfrm>
+          <a:prstGeom prst="rect">
+            <a:avLst/>
+          </a:prstGeom>
+        </p:spPr>
+      </p:pic>
       <p:sp>
         <p:nvSpPr>
           <p:cNvPr id="8" name="CuadroTexto 7">
@@ -8032,7 +8062,7 @@
         </p:nvSpPr>
         <p:spPr>
           <a:xfrm>
-            <a:off x="2542918" y="104170"/>
+            <a:off x="4681685" y="987573"/>
             <a:ext cx="7106163" cy="830997"/>
           </a:xfrm>
           <a:prstGeom prst="rect">

</xml_diff>